<commit_message>
Code fixes and updates to detection reports (regex_tags and split_tags detections combined).
</commit_message>
<xml_diff>
--- a/java/TikaTextDetection/test/data/Testing TIKA DETECTION.pptx
+++ b/java/TikaTextDetection/test/data/Testing TIKA DETECTION.pptx
@@ -1,6 +1,6 @@
 
 <file path=ppt/presentation.xml><?xml version="1.0" encoding="utf-8"?>
-<p:presentation xmlns:a="http://schemas.openxmlformats.org/drawingml/2006/main" xmlns:p="http://schemas.openxmlformats.org/presentationml/2006/main" xmlns:r="http://schemas.openxmlformats.org/officeDocument/2006/relationships">
+<p:presentation xmlns:a="http://schemas.openxmlformats.org/drawingml/2006/main" xmlns:p="http://schemas.openxmlformats.org/presentationml/2006/main" xmlns:r="http://schemas.openxmlformats.org/officeDocument/2006/relationships" xmlns:p14="http://schemas.microsoft.com/office/powerpoint/2010/main" xmlns:p15="http://schemas.microsoft.com/office/powerpoint/2012/main" xmlns:mc="http://schemas.openxmlformats.org/markup-compatibility/2006">
   <p:sldMasterIdLst>
     <p:sldMasterId id="2147483648" r:id="rId2"/>
     <p:sldMasterId id="2147483661" r:id="rId3"/>
@@ -11,6 +11,9 @@
     <p:sldId id="258" r:id="rId6"/>
     <p:sldId id="259" r:id="rId7"/>
     <p:sldId id="260" r:id="rId8"/>
+    <p:sldId id="261" r:id="rId9"/>
+    <p:sldId id="262" r:id="rId10"/>
+    <p:sldId id="263" r:id="rId11"/>
   </p:sldIdLst>
   <p:sldSz cx="12192000" cy="6858000"/>
   <p:notesSz cx="7772400" cy="10058400"/>
@@ -18,7 +21,7 @@
 </file>
 
 <file path=ppt/slideLayouts/slideLayout1.xml><?xml version="1.0" encoding="utf-8"?>
-<p:sldLayout xmlns:a="http://schemas.openxmlformats.org/drawingml/2006/main" xmlns:p="http://schemas.openxmlformats.org/presentationml/2006/main" xmlns:r="http://schemas.openxmlformats.org/officeDocument/2006/relationships" type="blank" preserve="1">
+<p:sldLayout xmlns:a="http://schemas.openxmlformats.org/drawingml/2006/main" xmlns:p="http://schemas.openxmlformats.org/presentationml/2006/main" xmlns:r="http://schemas.openxmlformats.org/officeDocument/2006/relationships" xmlns:p14="http://schemas.microsoft.com/office/powerpoint/2010/main" xmlns:p15="http://schemas.microsoft.com/office/powerpoint/2012/main" xmlns:mc="http://schemas.openxmlformats.org/markup-compatibility/2006" type="blank" preserve="1">
   <p:cSld name="Blank Slide">
     <p:spTree>
       <p:nvGrpSpPr>
@@ -40,7 +43,7 @@
 </file>
 
 <file path=ppt/slideLayouts/slideLayout10.xml><?xml version="1.0" encoding="utf-8"?>
-<p:sldLayout xmlns:a="http://schemas.openxmlformats.org/drawingml/2006/main" xmlns:p="http://schemas.openxmlformats.org/presentationml/2006/main" xmlns:r="http://schemas.openxmlformats.org/officeDocument/2006/relationships" type="objOverTx" preserve="1">
+<p:sldLayout xmlns:a="http://schemas.openxmlformats.org/drawingml/2006/main" xmlns:p="http://schemas.openxmlformats.org/presentationml/2006/main" xmlns:r="http://schemas.openxmlformats.org/officeDocument/2006/relationships" xmlns:p14="http://schemas.microsoft.com/office/powerpoint/2010/main" xmlns:p15="http://schemas.microsoft.com/office/powerpoint/2012/main" xmlns:mc="http://schemas.openxmlformats.org/markup-compatibility/2006" type="objOverTx" preserve="1">
   <p:cSld name="Title, Content over Content">
     <p:spTree>
       <p:nvGrpSpPr>
@@ -113,7 +116,9 @@
           </a:prstGeom>
         </p:spPr>
         <p:txBody>
-          <a:bodyPr lIns="0" rIns="0" tIns="0" bIns="0"/>
+          <a:bodyPr lIns="0" rIns="0" tIns="0" bIns="0">
+            <a:normAutofit/>
+          </a:bodyPr>
           <a:p>
             <a:endParaRPr b="0" lang="en-US" sz="3200" spc="-1" strike="noStrike">
               <a:solidFill>
@@ -149,7 +154,9 @@
           </a:prstGeom>
         </p:spPr>
         <p:txBody>
-          <a:bodyPr lIns="0" rIns="0" tIns="0" bIns="0"/>
+          <a:bodyPr lIns="0" rIns="0" tIns="0" bIns="0">
+            <a:normAutofit/>
+          </a:bodyPr>
           <a:p>
             <a:endParaRPr b="0" lang="en-US" sz="3200" spc="-1" strike="noStrike">
               <a:solidFill>
@@ -171,7 +178,7 @@
 </file>
 
 <file path=ppt/slideLayouts/slideLayout11.xml><?xml version="1.0" encoding="utf-8"?>
-<p:sldLayout xmlns:a="http://schemas.openxmlformats.org/drawingml/2006/main" xmlns:p="http://schemas.openxmlformats.org/presentationml/2006/main" xmlns:r="http://schemas.openxmlformats.org/officeDocument/2006/relationships" type="fourObj" preserve="1">
+<p:sldLayout xmlns:a="http://schemas.openxmlformats.org/drawingml/2006/main" xmlns:p="http://schemas.openxmlformats.org/presentationml/2006/main" xmlns:r="http://schemas.openxmlformats.org/officeDocument/2006/relationships" xmlns:p14="http://schemas.microsoft.com/office/powerpoint/2010/main" xmlns:p15="http://schemas.microsoft.com/office/powerpoint/2012/main" xmlns:mc="http://schemas.openxmlformats.org/markup-compatibility/2006" type="fourObj" preserve="1">
   <p:cSld name="Title, 4 Content">
     <p:spTree>
       <p:nvGrpSpPr>
@@ -244,7 +251,9 @@
           </a:prstGeom>
         </p:spPr>
         <p:txBody>
-          <a:bodyPr lIns="0" rIns="0" tIns="0" bIns="0"/>
+          <a:bodyPr lIns="0" rIns="0" tIns="0" bIns="0">
+            <a:normAutofit/>
+          </a:bodyPr>
           <a:p>
             <a:endParaRPr b="0" lang="en-US" sz="3200" spc="-1" strike="noStrike">
               <a:solidFill>
@@ -280,7 +289,9 @@
           </a:prstGeom>
         </p:spPr>
         <p:txBody>
-          <a:bodyPr lIns="0" rIns="0" tIns="0" bIns="0"/>
+          <a:bodyPr lIns="0" rIns="0" tIns="0" bIns="0">
+            <a:normAutofit/>
+          </a:bodyPr>
           <a:p>
             <a:endParaRPr b="0" lang="en-US" sz="3200" spc="-1" strike="noStrike">
               <a:solidFill>
@@ -316,7 +327,9 @@
           </a:prstGeom>
         </p:spPr>
         <p:txBody>
-          <a:bodyPr lIns="0" rIns="0" tIns="0" bIns="0"/>
+          <a:bodyPr lIns="0" rIns="0" tIns="0" bIns="0">
+            <a:normAutofit/>
+          </a:bodyPr>
           <a:p>
             <a:endParaRPr b="0" lang="en-US" sz="3200" spc="-1" strike="noStrike">
               <a:solidFill>
@@ -352,7 +365,9 @@
           </a:prstGeom>
         </p:spPr>
         <p:txBody>
-          <a:bodyPr lIns="0" rIns="0" tIns="0" bIns="0"/>
+          <a:bodyPr lIns="0" rIns="0" tIns="0" bIns="0">
+            <a:normAutofit/>
+          </a:bodyPr>
           <a:p>
             <a:endParaRPr b="0" lang="en-US" sz="3200" spc="-1" strike="noStrike">
               <a:solidFill>
@@ -374,7 +389,7 @@
 </file>
 
 <file path=ppt/slideLayouts/slideLayout12.xml><?xml version="1.0" encoding="utf-8"?>
-<p:sldLayout xmlns:a="http://schemas.openxmlformats.org/drawingml/2006/main" xmlns:p="http://schemas.openxmlformats.org/presentationml/2006/main" xmlns:r="http://schemas.openxmlformats.org/officeDocument/2006/relationships" type="blank" preserve="1">
+<p:sldLayout xmlns:a="http://schemas.openxmlformats.org/drawingml/2006/main" xmlns:p="http://schemas.openxmlformats.org/presentationml/2006/main" xmlns:r="http://schemas.openxmlformats.org/officeDocument/2006/relationships" xmlns:p14="http://schemas.microsoft.com/office/powerpoint/2010/main" xmlns:p15="http://schemas.microsoft.com/office/powerpoint/2012/main" xmlns:mc="http://schemas.openxmlformats.org/markup-compatibility/2006" type="blank" preserve="1">
   <p:cSld name="Title, 6 Content">
     <p:spTree>
       <p:nvGrpSpPr>
@@ -440,14 +455,16 @@
         <p:spPr>
           <a:xfrm>
             <a:off x="609480" y="1604520"/>
-            <a:ext cx="10972440" cy="3977280"/>
-          </a:xfrm>
-          <a:prstGeom prst="rect">
-            <a:avLst/>
-          </a:prstGeom>
-        </p:spPr>
-        <p:txBody>
-          <a:bodyPr lIns="0" rIns="0" tIns="0" bIns="0"/>
+            <a:ext cx="3533040" cy="1896840"/>
+          </a:xfrm>
+          <a:prstGeom prst="rect">
+            <a:avLst/>
+          </a:prstGeom>
+        </p:spPr>
+        <p:txBody>
+          <a:bodyPr lIns="0" rIns="0" tIns="0" bIns="0">
+            <a:normAutofit/>
+          </a:bodyPr>
           <a:p>
             <a:endParaRPr b="0" lang="en-US" sz="3200" spc="-1" strike="noStrike">
               <a:solidFill>
@@ -475,15 +492,17 @@
         </p:nvSpPr>
         <p:spPr>
           <a:xfrm>
-            <a:off x="609480" y="1604520"/>
-            <a:ext cx="10972440" cy="3977280"/>
-          </a:xfrm>
-          <a:prstGeom prst="rect">
-            <a:avLst/>
-          </a:prstGeom>
-        </p:spPr>
-        <p:txBody>
-          <a:bodyPr lIns="0" rIns="0" tIns="0" bIns="0"/>
+            <a:off x="4319640" y="1604520"/>
+            <a:ext cx="3533040" cy="1896840"/>
+          </a:xfrm>
+          <a:prstGeom prst="rect">
+            <a:avLst/>
+          </a:prstGeom>
+        </p:spPr>
+        <p:txBody>
+          <a:bodyPr lIns="0" rIns="0" tIns="0" bIns="0">
+            <a:normAutofit/>
+          </a:bodyPr>
           <a:p>
             <a:endParaRPr b="0" lang="en-US" sz="3200" spc="-1" strike="noStrike">
               <a:solidFill>
@@ -499,59 +518,165 @@
           </a:p>
         </p:txBody>
       </p:sp>
-      <p:pic>
-        <p:nvPicPr>
-          <p:cNvPr id="34" name="" descr=""/>
-          <p:cNvPicPr/>
-          <p:nvPr/>
-        </p:nvPicPr>
-        <p:blipFill>
-          <a:blip r:embed="rId2"/>
-          <a:stretch/>
-        </p:blipFill>
-        <p:spPr>
-          <a:xfrm>
-            <a:off x="3602880" y="1604520"/>
-            <a:ext cx="4984920" cy="3977280"/>
-          </a:xfrm>
-          <a:prstGeom prst="rect">
-            <a:avLst/>
-          </a:prstGeom>
-          <a:ln>
-            <a:noFill/>
-          </a:ln>
-        </p:spPr>
-      </p:pic>
-      <p:pic>
-        <p:nvPicPr>
-          <p:cNvPr id="35" name="" descr=""/>
-          <p:cNvPicPr/>
-          <p:nvPr/>
-        </p:nvPicPr>
-        <p:blipFill>
-          <a:blip r:embed="rId3"/>
-          <a:stretch/>
-        </p:blipFill>
-        <p:spPr>
-          <a:xfrm>
-            <a:off x="3602880" y="1604520"/>
-            <a:ext cx="4984920" cy="3977280"/>
-          </a:xfrm>
-          <a:prstGeom prst="rect">
-            <a:avLst/>
-          </a:prstGeom>
-          <a:ln>
-            <a:noFill/>
-          </a:ln>
-        </p:spPr>
-      </p:pic>
+      <p:sp>
+        <p:nvSpPr>
+          <p:cNvPr id="34" name="PlaceHolder 4"/>
+          <p:cNvSpPr>
+            <a:spLocks noGrp="1"/>
+          </p:cNvSpPr>
+          <p:nvPr>
+            <p:ph type="body"/>
+          </p:nvPr>
+        </p:nvSpPr>
+        <p:spPr>
+          <a:xfrm>
+            <a:off x="8029800" y="1604520"/>
+            <a:ext cx="3533040" cy="1896840"/>
+          </a:xfrm>
+          <a:prstGeom prst="rect">
+            <a:avLst/>
+          </a:prstGeom>
+        </p:spPr>
+        <p:txBody>
+          <a:bodyPr lIns="0" rIns="0" tIns="0" bIns="0">
+            <a:normAutofit/>
+          </a:bodyPr>
+          <a:p>
+            <a:endParaRPr b="0" lang="en-US" sz="3200" spc="-1" strike="noStrike">
+              <a:solidFill>
+                <a:srgbClr val="000000"/>
+              </a:solidFill>
+              <a:uFill>
+                <a:solidFill>
+                  <a:srgbClr val="ffffff"/>
+                </a:solidFill>
+              </a:uFill>
+              <a:latin typeface="Arial"/>
+            </a:endParaRPr>
+          </a:p>
+        </p:txBody>
+      </p:sp>
+      <p:sp>
+        <p:nvSpPr>
+          <p:cNvPr id="35" name="PlaceHolder 5"/>
+          <p:cNvSpPr>
+            <a:spLocks noGrp="1"/>
+          </p:cNvSpPr>
+          <p:nvPr>
+            <p:ph type="body"/>
+          </p:nvPr>
+        </p:nvSpPr>
+        <p:spPr>
+          <a:xfrm>
+            <a:off x="8029800" y="3682080"/>
+            <a:ext cx="3533040" cy="1896840"/>
+          </a:xfrm>
+          <a:prstGeom prst="rect">
+            <a:avLst/>
+          </a:prstGeom>
+        </p:spPr>
+        <p:txBody>
+          <a:bodyPr lIns="0" rIns="0" tIns="0" bIns="0">
+            <a:normAutofit/>
+          </a:bodyPr>
+          <a:p>
+            <a:endParaRPr b="0" lang="en-US" sz="3200" spc="-1" strike="noStrike">
+              <a:solidFill>
+                <a:srgbClr val="000000"/>
+              </a:solidFill>
+              <a:uFill>
+                <a:solidFill>
+                  <a:srgbClr val="ffffff"/>
+                </a:solidFill>
+              </a:uFill>
+              <a:latin typeface="Arial"/>
+            </a:endParaRPr>
+          </a:p>
+        </p:txBody>
+      </p:sp>
+      <p:sp>
+        <p:nvSpPr>
+          <p:cNvPr id="36" name="PlaceHolder 6"/>
+          <p:cNvSpPr>
+            <a:spLocks noGrp="1"/>
+          </p:cNvSpPr>
+          <p:nvPr>
+            <p:ph type="body"/>
+          </p:nvPr>
+        </p:nvSpPr>
+        <p:spPr>
+          <a:xfrm>
+            <a:off x="4319640" y="3682080"/>
+            <a:ext cx="3533040" cy="1896840"/>
+          </a:xfrm>
+          <a:prstGeom prst="rect">
+            <a:avLst/>
+          </a:prstGeom>
+        </p:spPr>
+        <p:txBody>
+          <a:bodyPr lIns="0" rIns="0" tIns="0" bIns="0">
+            <a:normAutofit/>
+          </a:bodyPr>
+          <a:p>
+            <a:endParaRPr b="0" lang="en-US" sz="3200" spc="-1" strike="noStrike">
+              <a:solidFill>
+                <a:srgbClr val="000000"/>
+              </a:solidFill>
+              <a:uFill>
+                <a:solidFill>
+                  <a:srgbClr val="ffffff"/>
+                </a:solidFill>
+              </a:uFill>
+              <a:latin typeface="Arial"/>
+            </a:endParaRPr>
+          </a:p>
+        </p:txBody>
+      </p:sp>
+      <p:sp>
+        <p:nvSpPr>
+          <p:cNvPr id="37" name="PlaceHolder 7"/>
+          <p:cNvSpPr>
+            <a:spLocks noGrp="1"/>
+          </p:cNvSpPr>
+          <p:nvPr>
+            <p:ph type="body"/>
+          </p:nvPr>
+        </p:nvSpPr>
+        <p:spPr>
+          <a:xfrm>
+            <a:off x="609480" y="3682080"/>
+            <a:ext cx="3533040" cy="1896840"/>
+          </a:xfrm>
+          <a:prstGeom prst="rect">
+            <a:avLst/>
+          </a:prstGeom>
+        </p:spPr>
+        <p:txBody>
+          <a:bodyPr lIns="0" rIns="0" tIns="0" bIns="0">
+            <a:normAutofit/>
+          </a:bodyPr>
+          <a:p>
+            <a:endParaRPr b="0" lang="en-US" sz="3200" spc="-1" strike="noStrike">
+              <a:solidFill>
+                <a:srgbClr val="000000"/>
+              </a:solidFill>
+              <a:uFill>
+                <a:solidFill>
+                  <a:srgbClr val="ffffff"/>
+                </a:solidFill>
+              </a:uFill>
+              <a:latin typeface="Arial"/>
+            </a:endParaRPr>
+          </a:p>
+        </p:txBody>
+      </p:sp>
     </p:spTree>
   </p:cSld>
 </p:sldLayout>
 </file>
 
 <file path=ppt/slideLayouts/slideLayout13.xml><?xml version="1.0" encoding="utf-8"?>
-<p:sldLayout xmlns:a="http://schemas.openxmlformats.org/drawingml/2006/main" xmlns:p="http://schemas.openxmlformats.org/presentationml/2006/main" xmlns:r="http://schemas.openxmlformats.org/officeDocument/2006/relationships" type="blank" preserve="1">
+<p:sldLayout xmlns:a="http://schemas.openxmlformats.org/drawingml/2006/main" xmlns:p="http://schemas.openxmlformats.org/presentationml/2006/main" xmlns:r="http://schemas.openxmlformats.org/officeDocument/2006/relationships" xmlns:p14="http://schemas.microsoft.com/office/powerpoint/2010/main" xmlns:p15="http://schemas.microsoft.com/office/powerpoint/2012/main" xmlns:mc="http://schemas.openxmlformats.org/markup-compatibility/2006" type="blank" preserve="1">
   <p:cSld name="Blank Slide">
     <p:spTree>
       <p:nvGrpSpPr>
@@ -573,7 +698,7 @@
 </file>
 
 <file path=ppt/slideLayouts/slideLayout14.xml><?xml version="1.0" encoding="utf-8"?>
-<p:sldLayout xmlns:a="http://schemas.openxmlformats.org/drawingml/2006/main" xmlns:p="http://schemas.openxmlformats.org/presentationml/2006/main" xmlns:r="http://schemas.openxmlformats.org/officeDocument/2006/relationships" type="tx" preserve="1">
+<p:sldLayout xmlns:a="http://schemas.openxmlformats.org/drawingml/2006/main" xmlns:p="http://schemas.openxmlformats.org/presentationml/2006/main" xmlns:r="http://schemas.openxmlformats.org/officeDocument/2006/relationships" xmlns:p14="http://schemas.microsoft.com/office/powerpoint/2010/main" xmlns:p15="http://schemas.microsoft.com/office/powerpoint/2012/main" xmlns:mc="http://schemas.openxmlformats.org/markup-compatibility/2006" type="tx" preserve="1">
   <p:cSld name="Title Slide">
     <p:spTree>
       <p:nvGrpSpPr>
@@ -591,7 +716,7 @@
       </p:grpSpPr>
       <p:sp>
         <p:nvSpPr>
-          <p:cNvPr id="38" name="PlaceHolder 1"/>
+          <p:cNvPr id="40" name="PlaceHolder 1"/>
           <p:cNvSpPr>
             <a:spLocks noGrp="1"/>
           </p:cNvSpPr>
@@ -628,7 +753,7 @@
       </p:sp>
       <p:sp>
         <p:nvSpPr>
-          <p:cNvPr id="39" name="PlaceHolder 2"/>
+          <p:cNvPr id="41" name="PlaceHolder 2"/>
           <p:cNvSpPr>
             <a:spLocks noGrp="1"/>
           </p:cNvSpPr>
@@ -669,7 +794,7 @@
 </file>
 
 <file path=ppt/slideLayouts/slideLayout15.xml><?xml version="1.0" encoding="utf-8"?>
-<p:sldLayout xmlns:a="http://schemas.openxmlformats.org/drawingml/2006/main" xmlns:p="http://schemas.openxmlformats.org/presentationml/2006/main" xmlns:r="http://schemas.openxmlformats.org/officeDocument/2006/relationships" type="obj" preserve="1">
+<p:sldLayout xmlns:a="http://schemas.openxmlformats.org/drawingml/2006/main" xmlns:p="http://schemas.openxmlformats.org/presentationml/2006/main" xmlns:r="http://schemas.openxmlformats.org/officeDocument/2006/relationships" xmlns:p14="http://schemas.microsoft.com/office/powerpoint/2010/main" xmlns:p15="http://schemas.microsoft.com/office/powerpoint/2012/main" xmlns:mc="http://schemas.openxmlformats.org/markup-compatibility/2006" type="obj" preserve="1">
   <p:cSld name="Title, Content">
     <p:spTree>
       <p:nvGrpSpPr>
@@ -687,7 +812,7 @@
       </p:grpSpPr>
       <p:sp>
         <p:nvSpPr>
-          <p:cNvPr id="40" name="PlaceHolder 1"/>
+          <p:cNvPr id="42" name="PlaceHolder 1"/>
           <p:cNvSpPr>
             <a:spLocks noGrp="1"/>
           </p:cNvSpPr>
@@ -724,7 +849,7 @@
       </p:sp>
       <p:sp>
         <p:nvSpPr>
-          <p:cNvPr id="41" name="PlaceHolder 2"/>
+          <p:cNvPr id="43" name="PlaceHolder 2"/>
           <p:cNvSpPr>
             <a:spLocks noGrp="1"/>
           </p:cNvSpPr>
@@ -742,7 +867,9 @@
           </a:prstGeom>
         </p:spPr>
         <p:txBody>
-          <a:bodyPr lIns="0" rIns="0" tIns="0" bIns="0"/>
+          <a:bodyPr lIns="0" rIns="0" tIns="0" bIns="0">
+            <a:normAutofit/>
+          </a:bodyPr>
           <a:p>
             <a:endParaRPr b="0" lang="en-US" sz="3200" spc="-1" strike="noStrike">
               <a:solidFill>
@@ -764,7 +891,7 @@
 </file>
 
 <file path=ppt/slideLayouts/slideLayout16.xml><?xml version="1.0" encoding="utf-8"?>
-<p:sldLayout xmlns:a="http://schemas.openxmlformats.org/drawingml/2006/main" xmlns:p="http://schemas.openxmlformats.org/presentationml/2006/main" xmlns:r="http://schemas.openxmlformats.org/officeDocument/2006/relationships" type="twoObj" preserve="1">
+<p:sldLayout xmlns:a="http://schemas.openxmlformats.org/drawingml/2006/main" xmlns:p="http://schemas.openxmlformats.org/presentationml/2006/main" xmlns:r="http://schemas.openxmlformats.org/officeDocument/2006/relationships" xmlns:p14="http://schemas.microsoft.com/office/powerpoint/2010/main" xmlns:p15="http://schemas.microsoft.com/office/powerpoint/2012/main" xmlns:mc="http://schemas.openxmlformats.org/markup-compatibility/2006" type="twoObj" preserve="1">
   <p:cSld name="Title, 2 Content">
     <p:spTree>
       <p:nvGrpSpPr>
@@ -782,7 +909,7 @@
       </p:grpSpPr>
       <p:sp>
         <p:nvSpPr>
-          <p:cNvPr id="42" name="PlaceHolder 1"/>
+          <p:cNvPr id="44" name="PlaceHolder 1"/>
           <p:cNvSpPr>
             <a:spLocks noGrp="1"/>
           </p:cNvSpPr>
@@ -819,7 +946,7 @@
       </p:sp>
       <p:sp>
         <p:nvSpPr>
-          <p:cNvPr id="43" name="PlaceHolder 2"/>
+          <p:cNvPr id="45" name="PlaceHolder 2"/>
           <p:cNvSpPr>
             <a:spLocks noGrp="1"/>
           </p:cNvSpPr>
@@ -837,7 +964,9 @@
           </a:prstGeom>
         </p:spPr>
         <p:txBody>
-          <a:bodyPr lIns="0" rIns="0" tIns="0" bIns="0"/>
+          <a:bodyPr lIns="0" rIns="0" tIns="0" bIns="0">
+            <a:normAutofit/>
+          </a:bodyPr>
           <a:p>
             <a:endParaRPr b="0" lang="en-US" sz="3200" spc="-1" strike="noStrike">
               <a:solidFill>
@@ -855,7 +984,7 @@
       </p:sp>
       <p:sp>
         <p:nvSpPr>
-          <p:cNvPr id="44" name="PlaceHolder 3"/>
+          <p:cNvPr id="46" name="PlaceHolder 3"/>
           <p:cNvSpPr>
             <a:spLocks noGrp="1"/>
           </p:cNvSpPr>
@@ -873,7 +1002,9 @@
           </a:prstGeom>
         </p:spPr>
         <p:txBody>
-          <a:bodyPr lIns="0" rIns="0" tIns="0" bIns="0"/>
+          <a:bodyPr lIns="0" rIns="0" tIns="0" bIns="0">
+            <a:normAutofit/>
+          </a:bodyPr>
           <a:p>
             <a:endParaRPr b="0" lang="en-US" sz="3200" spc="-1" strike="noStrike">
               <a:solidFill>
@@ -895,7 +1026,7 @@
 </file>
 
 <file path=ppt/slideLayouts/slideLayout17.xml><?xml version="1.0" encoding="utf-8"?>
-<p:sldLayout xmlns:a="http://schemas.openxmlformats.org/drawingml/2006/main" xmlns:p="http://schemas.openxmlformats.org/presentationml/2006/main" xmlns:r="http://schemas.openxmlformats.org/officeDocument/2006/relationships" type="titleOnly" preserve="1">
+<p:sldLayout xmlns:a="http://schemas.openxmlformats.org/drawingml/2006/main" xmlns:p="http://schemas.openxmlformats.org/presentationml/2006/main" xmlns:r="http://schemas.openxmlformats.org/officeDocument/2006/relationships" xmlns:p14="http://schemas.microsoft.com/office/powerpoint/2010/main" xmlns:p15="http://schemas.microsoft.com/office/powerpoint/2012/main" xmlns:mc="http://schemas.openxmlformats.org/markup-compatibility/2006" type="titleOnly" preserve="1">
   <p:cSld name="Title Only">
     <p:spTree>
       <p:nvGrpSpPr>
@@ -913,7 +1044,7 @@
       </p:grpSpPr>
       <p:sp>
         <p:nvSpPr>
-          <p:cNvPr id="45" name="PlaceHolder 1"/>
+          <p:cNvPr id="47" name="PlaceHolder 1"/>
           <p:cNvSpPr>
             <a:spLocks noGrp="1"/>
           </p:cNvSpPr>
@@ -954,7 +1085,7 @@
 </file>
 
 <file path=ppt/slideLayouts/slideLayout18.xml><?xml version="1.0" encoding="utf-8"?>
-<p:sldLayout xmlns:a="http://schemas.openxmlformats.org/drawingml/2006/main" xmlns:p="http://schemas.openxmlformats.org/presentationml/2006/main" xmlns:r="http://schemas.openxmlformats.org/officeDocument/2006/relationships" type="objOnly" preserve="1">
+<p:sldLayout xmlns:a="http://schemas.openxmlformats.org/drawingml/2006/main" xmlns:p="http://schemas.openxmlformats.org/presentationml/2006/main" xmlns:r="http://schemas.openxmlformats.org/officeDocument/2006/relationships" xmlns:p14="http://schemas.microsoft.com/office/powerpoint/2010/main" xmlns:p15="http://schemas.microsoft.com/office/powerpoint/2012/main" xmlns:mc="http://schemas.openxmlformats.org/markup-compatibility/2006" type="objOnly" preserve="1">
   <p:cSld name="Centered Text">
     <p:spTree>
       <p:nvGrpSpPr>
@@ -972,7 +1103,7 @@
       </p:grpSpPr>
       <p:sp>
         <p:nvSpPr>
-          <p:cNvPr id="46" name="PlaceHolder 1"/>
+          <p:cNvPr id="48" name="PlaceHolder 1"/>
           <p:cNvSpPr>
             <a:spLocks noGrp="1"/>
           </p:cNvSpPr>
@@ -1013,7 +1144,7 @@
 </file>
 
 <file path=ppt/slideLayouts/slideLayout19.xml><?xml version="1.0" encoding="utf-8"?>
-<p:sldLayout xmlns:a="http://schemas.openxmlformats.org/drawingml/2006/main" xmlns:p="http://schemas.openxmlformats.org/presentationml/2006/main" xmlns:r="http://schemas.openxmlformats.org/officeDocument/2006/relationships" type="twoObjAndObj" preserve="1">
+<p:sldLayout xmlns:a="http://schemas.openxmlformats.org/drawingml/2006/main" xmlns:p="http://schemas.openxmlformats.org/presentationml/2006/main" xmlns:r="http://schemas.openxmlformats.org/officeDocument/2006/relationships" xmlns:p14="http://schemas.microsoft.com/office/powerpoint/2010/main" xmlns:p15="http://schemas.microsoft.com/office/powerpoint/2012/main" xmlns:mc="http://schemas.openxmlformats.org/markup-compatibility/2006" type="twoObjAndObj" preserve="1">
   <p:cSld name="Title, 2 Content and Content">
     <p:spTree>
       <p:nvGrpSpPr>
@@ -1031,7 +1162,7 @@
       </p:grpSpPr>
       <p:sp>
         <p:nvSpPr>
-          <p:cNvPr id="47" name="PlaceHolder 1"/>
+          <p:cNvPr id="49" name="PlaceHolder 1"/>
           <p:cNvSpPr>
             <a:spLocks noGrp="1"/>
           </p:cNvSpPr>
@@ -1068,7 +1199,7 @@
       </p:sp>
       <p:sp>
         <p:nvSpPr>
-          <p:cNvPr id="48" name="PlaceHolder 2"/>
+          <p:cNvPr id="50" name="PlaceHolder 2"/>
           <p:cNvSpPr>
             <a:spLocks noGrp="1"/>
           </p:cNvSpPr>
@@ -1086,7 +1217,9 @@
           </a:prstGeom>
         </p:spPr>
         <p:txBody>
-          <a:bodyPr lIns="0" rIns="0" tIns="0" bIns="0"/>
+          <a:bodyPr lIns="0" rIns="0" tIns="0" bIns="0">
+            <a:normAutofit/>
+          </a:bodyPr>
           <a:p>
             <a:endParaRPr b="0" lang="en-US" sz="3200" spc="-1" strike="noStrike">
               <a:solidFill>
@@ -1104,7 +1237,7 @@
       </p:sp>
       <p:sp>
         <p:nvSpPr>
-          <p:cNvPr id="49" name="PlaceHolder 3"/>
+          <p:cNvPr id="51" name="PlaceHolder 3"/>
           <p:cNvSpPr>
             <a:spLocks noGrp="1"/>
           </p:cNvSpPr>
@@ -1122,7 +1255,9 @@
           </a:prstGeom>
         </p:spPr>
         <p:txBody>
-          <a:bodyPr lIns="0" rIns="0" tIns="0" bIns="0"/>
+          <a:bodyPr lIns="0" rIns="0" tIns="0" bIns="0">
+            <a:normAutofit/>
+          </a:bodyPr>
           <a:p>
             <a:endParaRPr b="0" lang="en-US" sz="3200" spc="-1" strike="noStrike">
               <a:solidFill>
@@ -1140,7 +1275,7 @@
       </p:sp>
       <p:sp>
         <p:nvSpPr>
-          <p:cNvPr id="50" name="PlaceHolder 4"/>
+          <p:cNvPr id="52" name="PlaceHolder 4"/>
           <p:cNvSpPr>
             <a:spLocks noGrp="1"/>
           </p:cNvSpPr>
@@ -1158,7 +1293,9 @@
           </a:prstGeom>
         </p:spPr>
         <p:txBody>
-          <a:bodyPr lIns="0" rIns="0" tIns="0" bIns="0"/>
+          <a:bodyPr lIns="0" rIns="0" tIns="0" bIns="0">
+            <a:normAutofit/>
+          </a:bodyPr>
           <a:p>
             <a:endParaRPr b="0" lang="en-US" sz="3200" spc="-1" strike="noStrike">
               <a:solidFill>
@@ -1180,7 +1317,7 @@
 </file>
 
 <file path=ppt/slideLayouts/slideLayout2.xml><?xml version="1.0" encoding="utf-8"?>
-<p:sldLayout xmlns:a="http://schemas.openxmlformats.org/drawingml/2006/main" xmlns:p="http://schemas.openxmlformats.org/presentationml/2006/main" xmlns:r="http://schemas.openxmlformats.org/officeDocument/2006/relationships" type="tx" preserve="1">
+<p:sldLayout xmlns:a="http://schemas.openxmlformats.org/drawingml/2006/main" xmlns:p="http://schemas.openxmlformats.org/presentationml/2006/main" xmlns:r="http://schemas.openxmlformats.org/officeDocument/2006/relationships" xmlns:p14="http://schemas.microsoft.com/office/powerpoint/2010/main" xmlns:p15="http://schemas.microsoft.com/office/powerpoint/2012/main" xmlns:mc="http://schemas.openxmlformats.org/markup-compatibility/2006" type="tx" preserve="1">
   <p:cSld name="Title Slide">
     <p:spTree>
       <p:nvGrpSpPr>
@@ -1276,7 +1413,7 @@
 </file>
 
 <file path=ppt/slideLayouts/slideLayout20.xml><?xml version="1.0" encoding="utf-8"?>
-<p:sldLayout xmlns:a="http://schemas.openxmlformats.org/drawingml/2006/main" xmlns:p="http://schemas.openxmlformats.org/presentationml/2006/main" xmlns:r="http://schemas.openxmlformats.org/officeDocument/2006/relationships" type="objAndTwoObj" preserve="1">
+<p:sldLayout xmlns:a="http://schemas.openxmlformats.org/drawingml/2006/main" xmlns:p="http://schemas.openxmlformats.org/presentationml/2006/main" xmlns:r="http://schemas.openxmlformats.org/officeDocument/2006/relationships" xmlns:p14="http://schemas.microsoft.com/office/powerpoint/2010/main" xmlns:p15="http://schemas.microsoft.com/office/powerpoint/2012/main" xmlns:mc="http://schemas.openxmlformats.org/markup-compatibility/2006" type="objAndTwoObj" preserve="1">
   <p:cSld name="Title Content and 2 Content">
     <p:spTree>
       <p:nvGrpSpPr>
@@ -1294,7 +1431,7 @@
       </p:grpSpPr>
       <p:sp>
         <p:nvSpPr>
-          <p:cNvPr id="51" name="PlaceHolder 1"/>
+          <p:cNvPr id="53" name="PlaceHolder 1"/>
           <p:cNvSpPr>
             <a:spLocks noGrp="1"/>
           </p:cNvSpPr>
@@ -1331,7 +1468,7 @@
       </p:sp>
       <p:sp>
         <p:nvSpPr>
-          <p:cNvPr id="52" name="PlaceHolder 2"/>
+          <p:cNvPr id="54" name="PlaceHolder 2"/>
           <p:cNvSpPr>
             <a:spLocks noGrp="1"/>
           </p:cNvSpPr>
@@ -1349,7 +1486,9 @@
           </a:prstGeom>
         </p:spPr>
         <p:txBody>
-          <a:bodyPr lIns="0" rIns="0" tIns="0" bIns="0"/>
+          <a:bodyPr lIns="0" rIns="0" tIns="0" bIns="0">
+            <a:normAutofit/>
+          </a:bodyPr>
           <a:p>
             <a:endParaRPr b="0" lang="en-US" sz="3200" spc="-1" strike="noStrike">
               <a:solidFill>
@@ -1367,7 +1506,7 @@
       </p:sp>
       <p:sp>
         <p:nvSpPr>
-          <p:cNvPr id="53" name="PlaceHolder 3"/>
+          <p:cNvPr id="55" name="PlaceHolder 3"/>
           <p:cNvSpPr>
             <a:spLocks noGrp="1"/>
           </p:cNvSpPr>
@@ -1385,7 +1524,9 @@
           </a:prstGeom>
         </p:spPr>
         <p:txBody>
-          <a:bodyPr lIns="0" rIns="0" tIns="0" bIns="0"/>
+          <a:bodyPr lIns="0" rIns="0" tIns="0" bIns="0">
+            <a:normAutofit/>
+          </a:bodyPr>
           <a:p>
             <a:endParaRPr b="0" lang="en-US" sz="3200" spc="-1" strike="noStrike">
               <a:solidFill>
@@ -1403,7 +1544,7 @@
       </p:sp>
       <p:sp>
         <p:nvSpPr>
-          <p:cNvPr id="54" name="PlaceHolder 4"/>
+          <p:cNvPr id="56" name="PlaceHolder 4"/>
           <p:cNvSpPr>
             <a:spLocks noGrp="1"/>
           </p:cNvSpPr>
@@ -1421,7 +1562,9 @@
           </a:prstGeom>
         </p:spPr>
         <p:txBody>
-          <a:bodyPr lIns="0" rIns="0" tIns="0" bIns="0"/>
+          <a:bodyPr lIns="0" rIns="0" tIns="0" bIns="0">
+            <a:normAutofit/>
+          </a:bodyPr>
           <a:p>
             <a:endParaRPr b="0" lang="en-US" sz="3200" spc="-1" strike="noStrike">
               <a:solidFill>
@@ -1443,7 +1586,7 @@
 </file>
 
 <file path=ppt/slideLayouts/slideLayout21.xml><?xml version="1.0" encoding="utf-8"?>
-<p:sldLayout xmlns:a="http://schemas.openxmlformats.org/drawingml/2006/main" xmlns:p="http://schemas.openxmlformats.org/presentationml/2006/main" xmlns:r="http://schemas.openxmlformats.org/officeDocument/2006/relationships" type="twoObjOverTx" preserve="1">
+<p:sldLayout xmlns:a="http://schemas.openxmlformats.org/drawingml/2006/main" xmlns:p="http://schemas.openxmlformats.org/presentationml/2006/main" xmlns:r="http://schemas.openxmlformats.org/officeDocument/2006/relationships" xmlns:p14="http://schemas.microsoft.com/office/powerpoint/2010/main" xmlns:p15="http://schemas.microsoft.com/office/powerpoint/2012/main" xmlns:mc="http://schemas.openxmlformats.org/markup-compatibility/2006" type="twoObjOverTx" preserve="1">
   <p:cSld name="Title, 2 Content over Content">
     <p:spTree>
       <p:nvGrpSpPr>
@@ -1461,7 +1604,7 @@
       </p:grpSpPr>
       <p:sp>
         <p:nvSpPr>
-          <p:cNvPr id="55" name="PlaceHolder 1"/>
+          <p:cNvPr id="57" name="PlaceHolder 1"/>
           <p:cNvSpPr>
             <a:spLocks noGrp="1"/>
           </p:cNvSpPr>
@@ -1498,7 +1641,7 @@
       </p:sp>
       <p:sp>
         <p:nvSpPr>
-          <p:cNvPr id="56" name="PlaceHolder 2"/>
+          <p:cNvPr id="58" name="PlaceHolder 2"/>
           <p:cNvSpPr>
             <a:spLocks noGrp="1"/>
           </p:cNvSpPr>
@@ -1516,7 +1659,9 @@
           </a:prstGeom>
         </p:spPr>
         <p:txBody>
-          <a:bodyPr lIns="0" rIns="0" tIns="0" bIns="0"/>
+          <a:bodyPr lIns="0" rIns="0" tIns="0" bIns="0">
+            <a:normAutofit/>
+          </a:bodyPr>
           <a:p>
             <a:endParaRPr b="0" lang="en-US" sz="3200" spc="-1" strike="noStrike">
               <a:solidFill>
@@ -1534,7 +1679,7 @@
       </p:sp>
       <p:sp>
         <p:nvSpPr>
-          <p:cNvPr id="57" name="PlaceHolder 3"/>
+          <p:cNvPr id="59" name="PlaceHolder 3"/>
           <p:cNvSpPr>
             <a:spLocks noGrp="1"/>
           </p:cNvSpPr>
@@ -1552,7 +1697,9 @@
           </a:prstGeom>
         </p:spPr>
         <p:txBody>
-          <a:bodyPr lIns="0" rIns="0" tIns="0" bIns="0"/>
+          <a:bodyPr lIns="0" rIns="0" tIns="0" bIns="0">
+            <a:normAutofit/>
+          </a:bodyPr>
           <a:p>
             <a:endParaRPr b="0" lang="en-US" sz="3200" spc="-1" strike="noStrike">
               <a:solidFill>
@@ -1570,7 +1717,7 @@
       </p:sp>
       <p:sp>
         <p:nvSpPr>
-          <p:cNvPr id="58" name="PlaceHolder 4"/>
+          <p:cNvPr id="60" name="PlaceHolder 4"/>
           <p:cNvSpPr>
             <a:spLocks noGrp="1"/>
           </p:cNvSpPr>
@@ -1588,7 +1735,9 @@
           </a:prstGeom>
         </p:spPr>
         <p:txBody>
-          <a:bodyPr lIns="0" rIns="0" tIns="0" bIns="0"/>
+          <a:bodyPr lIns="0" rIns="0" tIns="0" bIns="0">
+            <a:normAutofit/>
+          </a:bodyPr>
           <a:p>
             <a:endParaRPr b="0" lang="en-US" sz="3200" spc="-1" strike="noStrike">
               <a:solidFill>
@@ -1610,7 +1759,7 @@
 </file>
 
 <file path=ppt/slideLayouts/slideLayout22.xml><?xml version="1.0" encoding="utf-8"?>
-<p:sldLayout xmlns:a="http://schemas.openxmlformats.org/drawingml/2006/main" xmlns:p="http://schemas.openxmlformats.org/presentationml/2006/main" xmlns:r="http://schemas.openxmlformats.org/officeDocument/2006/relationships" type="objOverTx" preserve="1">
+<p:sldLayout xmlns:a="http://schemas.openxmlformats.org/drawingml/2006/main" xmlns:p="http://schemas.openxmlformats.org/presentationml/2006/main" xmlns:r="http://schemas.openxmlformats.org/officeDocument/2006/relationships" xmlns:p14="http://schemas.microsoft.com/office/powerpoint/2010/main" xmlns:p15="http://schemas.microsoft.com/office/powerpoint/2012/main" xmlns:mc="http://schemas.openxmlformats.org/markup-compatibility/2006" type="objOverTx" preserve="1">
   <p:cSld name="Title, Content over Content">
     <p:spTree>
       <p:nvGrpSpPr>
@@ -1628,7 +1777,7 @@
       </p:grpSpPr>
       <p:sp>
         <p:nvSpPr>
-          <p:cNvPr id="59" name="PlaceHolder 1"/>
+          <p:cNvPr id="61" name="PlaceHolder 1"/>
           <p:cNvSpPr>
             <a:spLocks noGrp="1"/>
           </p:cNvSpPr>
@@ -1665,7 +1814,7 @@
       </p:sp>
       <p:sp>
         <p:nvSpPr>
-          <p:cNvPr id="60" name="PlaceHolder 2"/>
+          <p:cNvPr id="62" name="PlaceHolder 2"/>
           <p:cNvSpPr>
             <a:spLocks noGrp="1"/>
           </p:cNvSpPr>
@@ -1683,7 +1832,9 @@
           </a:prstGeom>
         </p:spPr>
         <p:txBody>
-          <a:bodyPr lIns="0" rIns="0" tIns="0" bIns="0"/>
+          <a:bodyPr lIns="0" rIns="0" tIns="0" bIns="0">
+            <a:normAutofit/>
+          </a:bodyPr>
           <a:p>
             <a:endParaRPr b="0" lang="en-US" sz="3200" spc="-1" strike="noStrike">
               <a:solidFill>
@@ -1701,7 +1852,7 @@
       </p:sp>
       <p:sp>
         <p:nvSpPr>
-          <p:cNvPr id="61" name="PlaceHolder 3"/>
+          <p:cNvPr id="63" name="PlaceHolder 3"/>
           <p:cNvSpPr>
             <a:spLocks noGrp="1"/>
           </p:cNvSpPr>
@@ -1719,7 +1870,9 @@
           </a:prstGeom>
         </p:spPr>
         <p:txBody>
-          <a:bodyPr lIns="0" rIns="0" tIns="0" bIns="0"/>
+          <a:bodyPr lIns="0" rIns="0" tIns="0" bIns="0">
+            <a:normAutofit/>
+          </a:bodyPr>
           <a:p>
             <a:endParaRPr b="0" lang="en-US" sz="3200" spc="-1" strike="noStrike">
               <a:solidFill>
@@ -1741,7 +1894,7 @@
 </file>
 
 <file path=ppt/slideLayouts/slideLayout23.xml><?xml version="1.0" encoding="utf-8"?>
-<p:sldLayout xmlns:a="http://schemas.openxmlformats.org/drawingml/2006/main" xmlns:p="http://schemas.openxmlformats.org/presentationml/2006/main" xmlns:r="http://schemas.openxmlformats.org/officeDocument/2006/relationships" type="fourObj" preserve="1">
+<p:sldLayout xmlns:a="http://schemas.openxmlformats.org/drawingml/2006/main" xmlns:p="http://schemas.openxmlformats.org/presentationml/2006/main" xmlns:r="http://schemas.openxmlformats.org/officeDocument/2006/relationships" xmlns:p14="http://schemas.microsoft.com/office/powerpoint/2010/main" xmlns:p15="http://schemas.microsoft.com/office/powerpoint/2012/main" xmlns:mc="http://schemas.openxmlformats.org/markup-compatibility/2006" type="fourObj" preserve="1">
   <p:cSld name="Title, 4 Content">
     <p:spTree>
       <p:nvGrpSpPr>
@@ -1759,7 +1912,7 @@
       </p:grpSpPr>
       <p:sp>
         <p:nvSpPr>
-          <p:cNvPr id="62" name="PlaceHolder 1"/>
+          <p:cNvPr id="64" name="PlaceHolder 1"/>
           <p:cNvSpPr>
             <a:spLocks noGrp="1"/>
           </p:cNvSpPr>
@@ -1796,7 +1949,7 @@
       </p:sp>
       <p:sp>
         <p:nvSpPr>
-          <p:cNvPr id="63" name="PlaceHolder 2"/>
+          <p:cNvPr id="65" name="PlaceHolder 2"/>
           <p:cNvSpPr>
             <a:spLocks noGrp="1"/>
           </p:cNvSpPr>
@@ -1814,7 +1967,9 @@
           </a:prstGeom>
         </p:spPr>
         <p:txBody>
-          <a:bodyPr lIns="0" rIns="0" tIns="0" bIns="0"/>
+          <a:bodyPr lIns="0" rIns="0" tIns="0" bIns="0">
+            <a:normAutofit/>
+          </a:bodyPr>
           <a:p>
             <a:endParaRPr b="0" lang="en-US" sz="3200" spc="-1" strike="noStrike">
               <a:solidFill>
@@ -1832,7 +1987,7 @@
       </p:sp>
       <p:sp>
         <p:nvSpPr>
-          <p:cNvPr id="64" name="PlaceHolder 3"/>
+          <p:cNvPr id="66" name="PlaceHolder 3"/>
           <p:cNvSpPr>
             <a:spLocks noGrp="1"/>
           </p:cNvSpPr>
@@ -1850,7 +2005,9 @@
           </a:prstGeom>
         </p:spPr>
         <p:txBody>
-          <a:bodyPr lIns="0" rIns="0" tIns="0" bIns="0"/>
+          <a:bodyPr lIns="0" rIns="0" tIns="0" bIns="0">
+            <a:normAutofit/>
+          </a:bodyPr>
           <a:p>
             <a:endParaRPr b="0" lang="en-US" sz="3200" spc="-1" strike="noStrike">
               <a:solidFill>
@@ -1868,7 +2025,7 @@
       </p:sp>
       <p:sp>
         <p:nvSpPr>
-          <p:cNvPr id="65" name="PlaceHolder 4"/>
+          <p:cNvPr id="67" name="PlaceHolder 4"/>
           <p:cNvSpPr>
             <a:spLocks noGrp="1"/>
           </p:cNvSpPr>
@@ -1886,7 +2043,9 @@
           </a:prstGeom>
         </p:spPr>
         <p:txBody>
-          <a:bodyPr lIns="0" rIns="0" tIns="0" bIns="0"/>
+          <a:bodyPr lIns="0" rIns="0" tIns="0" bIns="0">
+            <a:normAutofit/>
+          </a:bodyPr>
           <a:p>
             <a:endParaRPr b="0" lang="en-US" sz="3200" spc="-1" strike="noStrike">
               <a:solidFill>
@@ -1904,7 +2063,7 @@
       </p:sp>
       <p:sp>
         <p:nvSpPr>
-          <p:cNvPr id="66" name="PlaceHolder 5"/>
+          <p:cNvPr id="68" name="PlaceHolder 5"/>
           <p:cNvSpPr>
             <a:spLocks noGrp="1"/>
           </p:cNvSpPr>
@@ -1922,7 +2081,9 @@
           </a:prstGeom>
         </p:spPr>
         <p:txBody>
-          <a:bodyPr lIns="0" rIns="0" tIns="0" bIns="0"/>
+          <a:bodyPr lIns="0" rIns="0" tIns="0" bIns="0">
+            <a:normAutofit/>
+          </a:bodyPr>
           <a:p>
             <a:endParaRPr b="0" lang="en-US" sz="3200" spc="-1" strike="noStrike">
               <a:solidFill>
@@ -1944,7 +2105,7 @@
 </file>
 
 <file path=ppt/slideLayouts/slideLayout24.xml><?xml version="1.0" encoding="utf-8"?>
-<p:sldLayout xmlns:a="http://schemas.openxmlformats.org/drawingml/2006/main" xmlns:p="http://schemas.openxmlformats.org/presentationml/2006/main" xmlns:r="http://schemas.openxmlformats.org/officeDocument/2006/relationships" type="blank" preserve="1">
+<p:sldLayout xmlns:a="http://schemas.openxmlformats.org/drawingml/2006/main" xmlns:p="http://schemas.openxmlformats.org/presentationml/2006/main" xmlns:r="http://schemas.openxmlformats.org/officeDocument/2006/relationships" xmlns:p14="http://schemas.microsoft.com/office/powerpoint/2010/main" xmlns:p15="http://schemas.microsoft.com/office/powerpoint/2012/main" xmlns:mc="http://schemas.openxmlformats.org/markup-compatibility/2006" type="blank" preserve="1">
   <p:cSld name="Title, 6 Content">
     <p:spTree>
       <p:nvGrpSpPr>
@@ -1962,7 +2123,7 @@
       </p:grpSpPr>
       <p:sp>
         <p:nvSpPr>
-          <p:cNvPr id="67" name="PlaceHolder 1"/>
+          <p:cNvPr id="69" name="PlaceHolder 1"/>
           <p:cNvSpPr>
             <a:spLocks noGrp="1"/>
           </p:cNvSpPr>
@@ -1999,7 +2160,7 @@
       </p:sp>
       <p:sp>
         <p:nvSpPr>
-          <p:cNvPr id="68" name="PlaceHolder 2"/>
+          <p:cNvPr id="70" name="PlaceHolder 2"/>
           <p:cNvSpPr>
             <a:spLocks noGrp="1"/>
           </p:cNvSpPr>
@@ -2010,14 +2171,16 @@
         <p:spPr>
           <a:xfrm>
             <a:off x="609480" y="1604520"/>
-            <a:ext cx="10972440" cy="3977280"/>
-          </a:xfrm>
-          <a:prstGeom prst="rect">
-            <a:avLst/>
-          </a:prstGeom>
-        </p:spPr>
-        <p:txBody>
-          <a:bodyPr lIns="0" rIns="0" tIns="0" bIns="0"/>
+            <a:ext cx="3533040" cy="1896840"/>
+          </a:xfrm>
+          <a:prstGeom prst="rect">
+            <a:avLst/>
+          </a:prstGeom>
+        </p:spPr>
+        <p:txBody>
+          <a:bodyPr lIns="0" rIns="0" tIns="0" bIns="0">
+            <a:normAutofit/>
+          </a:bodyPr>
           <a:p>
             <a:endParaRPr b="0" lang="en-US" sz="3200" spc="-1" strike="noStrike">
               <a:solidFill>
@@ -2035,7 +2198,7 @@
       </p:sp>
       <p:sp>
         <p:nvSpPr>
-          <p:cNvPr id="69" name="PlaceHolder 3"/>
+          <p:cNvPr id="71" name="PlaceHolder 3"/>
           <p:cNvSpPr>
             <a:spLocks noGrp="1"/>
           </p:cNvSpPr>
@@ -2045,15 +2208,17 @@
         </p:nvSpPr>
         <p:spPr>
           <a:xfrm>
-            <a:off x="609480" y="1604520"/>
-            <a:ext cx="10972440" cy="3977280"/>
-          </a:xfrm>
-          <a:prstGeom prst="rect">
-            <a:avLst/>
-          </a:prstGeom>
-        </p:spPr>
-        <p:txBody>
-          <a:bodyPr lIns="0" rIns="0" tIns="0" bIns="0"/>
+            <a:off x="4319640" y="1604520"/>
+            <a:ext cx="3533040" cy="1896840"/>
+          </a:xfrm>
+          <a:prstGeom prst="rect">
+            <a:avLst/>
+          </a:prstGeom>
+        </p:spPr>
+        <p:txBody>
+          <a:bodyPr lIns="0" rIns="0" tIns="0" bIns="0">
+            <a:normAutofit/>
+          </a:bodyPr>
           <a:p>
             <a:endParaRPr b="0" lang="en-US" sz="3200" spc="-1" strike="noStrike">
               <a:solidFill>
@@ -2069,59 +2234,165 @@
           </a:p>
         </p:txBody>
       </p:sp>
-      <p:pic>
-        <p:nvPicPr>
-          <p:cNvPr id="70" name="" descr=""/>
-          <p:cNvPicPr/>
-          <p:nvPr/>
-        </p:nvPicPr>
-        <p:blipFill>
-          <a:blip r:embed="rId2"/>
-          <a:stretch/>
-        </p:blipFill>
-        <p:spPr>
-          <a:xfrm>
-            <a:off x="3602880" y="1604520"/>
-            <a:ext cx="4984920" cy="3977280"/>
-          </a:xfrm>
-          <a:prstGeom prst="rect">
-            <a:avLst/>
-          </a:prstGeom>
-          <a:ln>
-            <a:noFill/>
-          </a:ln>
-        </p:spPr>
-      </p:pic>
-      <p:pic>
-        <p:nvPicPr>
-          <p:cNvPr id="71" name="" descr=""/>
-          <p:cNvPicPr/>
-          <p:nvPr/>
-        </p:nvPicPr>
-        <p:blipFill>
-          <a:blip r:embed="rId3"/>
-          <a:stretch/>
-        </p:blipFill>
-        <p:spPr>
-          <a:xfrm>
-            <a:off x="3602880" y="1604520"/>
-            <a:ext cx="4984920" cy="3977280"/>
-          </a:xfrm>
-          <a:prstGeom prst="rect">
-            <a:avLst/>
-          </a:prstGeom>
-          <a:ln>
-            <a:noFill/>
-          </a:ln>
-        </p:spPr>
-      </p:pic>
+      <p:sp>
+        <p:nvSpPr>
+          <p:cNvPr id="72" name="PlaceHolder 4"/>
+          <p:cNvSpPr>
+            <a:spLocks noGrp="1"/>
+          </p:cNvSpPr>
+          <p:nvPr>
+            <p:ph type="body"/>
+          </p:nvPr>
+        </p:nvSpPr>
+        <p:spPr>
+          <a:xfrm>
+            <a:off x="8029800" y="1604520"/>
+            <a:ext cx="3533040" cy="1896840"/>
+          </a:xfrm>
+          <a:prstGeom prst="rect">
+            <a:avLst/>
+          </a:prstGeom>
+        </p:spPr>
+        <p:txBody>
+          <a:bodyPr lIns="0" rIns="0" tIns="0" bIns="0">
+            <a:normAutofit/>
+          </a:bodyPr>
+          <a:p>
+            <a:endParaRPr b="0" lang="en-US" sz="3200" spc="-1" strike="noStrike">
+              <a:solidFill>
+                <a:srgbClr val="000000"/>
+              </a:solidFill>
+              <a:uFill>
+                <a:solidFill>
+                  <a:srgbClr val="ffffff"/>
+                </a:solidFill>
+              </a:uFill>
+              <a:latin typeface="Arial"/>
+            </a:endParaRPr>
+          </a:p>
+        </p:txBody>
+      </p:sp>
+      <p:sp>
+        <p:nvSpPr>
+          <p:cNvPr id="73" name="PlaceHolder 5"/>
+          <p:cNvSpPr>
+            <a:spLocks noGrp="1"/>
+          </p:cNvSpPr>
+          <p:nvPr>
+            <p:ph type="body"/>
+          </p:nvPr>
+        </p:nvSpPr>
+        <p:spPr>
+          <a:xfrm>
+            <a:off x="8029800" y="3682080"/>
+            <a:ext cx="3533040" cy="1896840"/>
+          </a:xfrm>
+          <a:prstGeom prst="rect">
+            <a:avLst/>
+          </a:prstGeom>
+        </p:spPr>
+        <p:txBody>
+          <a:bodyPr lIns="0" rIns="0" tIns="0" bIns="0">
+            <a:normAutofit/>
+          </a:bodyPr>
+          <a:p>
+            <a:endParaRPr b="0" lang="en-US" sz="3200" spc="-1" strike="noStrike">
+              <a:solidFill>
+                <a:srgbClr val="000000"/>
+              </a:solidFill>
+              <a:uFill>
+                <a:solidFill>
+                  <a:srgbClr val="ffffff"/>
+                </a:solidFill>
+              </a:uFill>
+              <a:latin typeface="Arial"/>
+            </a:endParaRPr>
+          </a:p>
+        </p:txBody>
+      </p:sp>
+      <p:sp>
+        <p:nvSpPr>
+          <p:cNvPr id="74" name="PlaceHolder 6"/>
+          <p:cNvSpPr>
+            <a:spLocks noGrp="1"/>
+          </p:cNvSpPr>
+          <p:nvPr>
+            <p:ph type="body"/>
+          </p:nvPr>
+        </p:nvSpPr>
+        <p:spPr>
+          <a:xfrm>
+            <a:off x="4319640" y="3682080"/>
+            <a:ext cx="3533040" cy="1896840"/>
+          </a:xfrm>
+          <a:prstGeom prst="rect">
+            <a:avLst/>
+          </a:prstGeom>
+        </p:spPr>
+        <p:txBody>
+          <a:bodyPr lIns="0" rIns="0" tIns="0" bIns="0">
+            <a:normAutofit/>
+          </a:bodyPr>
+          <a:p>
+            <a:endParaRPr b="0" lang="en-US" sz="3200" spc="-1" strike="noStrike">
+              <a:solidFill>
+                <a:srgbClr val="000000"/>
+              </a:solidFill>
+              <a:uFill>
+                <a:solidFill>
+                  <a:srgbClr val="ffffff"/>
+                </a:solidFill>
+              </a:uFill>
+              <a:latin typeface="Arial"/>
+            </a:endParaRPr>
+          </a:p>
+        </p:txBody>
+      </p:sp>
+      <p:sp>
+        <p:nvSpPr>
+          <p:cNvPr id="75" name="PlaceHolder 7"/>
+          <p:cNvSpPr>
+            <a:spLocks noGrp="1"/>
+          </p:cNvSpPr>
+          <p:nvPr>
+            <p:ph type="body"/>
+          </p:nvPr>
+        </p:nvSpPr>
+        <p:spPr>
+          <a:xfrm>
+            <a:off x="609480" y="3682080"/>
+            <a:ext cx="3533040" cy="1896840"/>
+          </a:xfrm>
+          <a:prstGeom prst="rect">
+            <a:avLst/>
+          </a:prstGeom>
+        </p:spPr>
+        <p:txBody>
+          <a:bodyPr lIns="0" rIns="0" tIns="0" bIns="0">
+            <a:normAutofit/>
+          </a:bodyPr>
+          <a:p>
+            <a:endParaRPr b="0" lang="en-US" sz="3200" spc="-1" strike="noStrike">
+              <a:solidFill>
+                <a:srgbClr val="000000"/>
+              </a:solidFill>
+              <a:uFill>
+                <a:solidFill>
+                  <a:srgbClr val="ffffff"/>
+                </a:solidFill>
+              </a:uFill>
+              <a:latin typeface="Arial"/>
+            </a:endParaRPr>
+          </a:p>
+        </p:txBody>
+      </p:sp>
     </p:spTree>
   </p:cSld>
 </p:sldLayout>
 </file>
 
 <file path=ppt/slideLayouts/slideLayout3.xml><?xml version="1.0" encoding="utf-8"?>
-<p:sldLayout xmlns:a="http://schemas.openxmlformats.org/drawingml/2006/main" xmlns:p="http://schemas.openxmlformats.org/presentationml/2006/main" xmlns:r="http://schemas.openxmlformats.org/officeDocument/2006/relationships" type="obj" preserve="1">
+<p:sldLayout xmlns:a="http://schemas.openxmlformats.org/drawingml/2006/main" xmlns:p="http://schemas.openxmlformats.org/presentationml/2006/main" xmlns:r="http://schemas.openxmlformats.org/officeDocument/2006/relationships" xmlns:p14="http://schemas.microsoft.com/office/powerpoint/2010/main" xmlns:p15="http://schemas.microsoft.com/office/powerpoint/2012/main" xmlns:mc="http://schemas.openxmlformats.org/markup-compatibility/2006" type="obj" preserve="1">
   <p:cSld name="Title, Content">
     <p:spTree>
       <p:nvGrpSpPr>
@@ -2194,7 +2465,9 @@
           </a:prstGeom>
         </p:spPr>
         <p:txBody>
-          <a:bodyPr lIns="0" rIns="0" tIns="0" bIns="0"/>
+          <a:bodyPr lIns="0" rIns="0" tIns="0" bIns="0">
+            <a:normAutofit/>
+          </a:bodyPr>
           <a:p>
             <a:endParaRPr b="0" lang="en-US" sz="3200" spc="-1" strike="noStrike">
               <a:solidFill>
@@ -2216,7 +2489,7 @@
 </file>
 
 <file path=ppt/slideLayouts/slideLayout4.xml><?xml version="1.0" encoding="utf-8"?>
-<p:sldLayout xmlns:a="http://schemas.openxmlformats.org/drawingml/2006/main" xmlns:p="http://schemas.openxmlformats.org/presentationml/2006/main" xmlns:r="http://schemas.openxmlformats.org/officeDocument/2006/relationships" type="twoObj" preserve="1">
+<p:sldLayout xmlns:a="http://schemas.openxmlformats.org/drawingml/2006/main" xmlns:p="http://schemas.openxmlformats.org/presentationml/2006/main" xmlns:r="http://schemas.openxmlformats.org/officeDocument/2006/relationships" xmlns:p14="http://schemas.microsoft.com/office/powerpoint/2010/main" xmlns:p15="http://schemas.microsoft.com/office/powerpoint/2012/main" xmlns:mc="http://schemas.openxmlformats.org/markup-compatibility/2006" type="twoObj" preserve="1">
   <p:cSld name="Title, 2 Content">
     <p:spTree>
       <p:nvGrpSpPr>
@@ -2289,7 +2562,9 @@
           </a:prstGeom>
         </p:spPr>
         <p:txBody>
-          <a:bodyPr lIns="0" rIns="0" tIns="0" bIns="0"/>
+          <a:bodyPr lIns="0" rIns="0" tIns="0" bIns="0">
+            <a:normAutofit/>
+          </a:bodyPr>
           <a:p>
             <a:endParaRPr b="0" lang="en-US" sz="3200" spc="-1" strike="noStrike">
               <a:solidFill>
@@ -2325,7 +2600,9 @@
           </a:prstGeom>
         </p:spPr>
         <p:txBody>
-          <a:bodyPr lIns="0" rIns="0" tIns="0" bIns="0"/>
+          <a:bodyPr lIns="0" rIns="0" tIns="0" bIns="0">
+            <a:normAutofit/>
+          </a:bodyPr>
           <a:p>
             <a:endParaRPr b="0" lang="en-US" sz="3200" spc="-1" strike="noStrike">
               <a:solidFill>
@@ -2347,7 +2624,7 @@
 </file>
 
 <file path=ppt/slideLayouts/slideLayout5.xml><?xml version="1.0" encoding="utf-8"?>
-<p:sldLayout xmlns:a="http://schemas.openxmlformats.org/drawingml/2006/main" xmlns:p="http://schemas.openxmlformats.org/presentationml/2006/main" xmlns:r="http://schemas.openxmlformats.org/officeDocument/2006/relationships" type="titleOnly" preserve="1">
+<p:sldLayout xmlns:a="http://schemas.openxmlformats.org/drawingml/2006/main" xmlns:p="http://schemas.openxmlformats.org/presentationml/2006/main" xmlns:r="http://schemas.openxmlformats.org/officeDocument/2006/relationships" xmlns:p14="http://schemas.microsoft.com/office/powerpoint/2010/main" xmlns:p15="http://schemas.microsoft.com/office/powerpoint/2012/main" xmlns:mc="http://schemas.openxmlformats.org/markup-compatibility/2006" type="titleOnly" preserve="1">
   <p:cSld name="Title Only">
     <p:spTree>
       <p:nvGrpSpPr>
@@ -2406,7 +2683,7 @@
 </file>
 
 <file path=ppt/slideLayouts/slideLayout6.xml><?xml version="1.0" encoding="utf-8"?>
-<p:sldLayout xmlns:a="http://schemas.openxmlformats.org/drawingml/2006/main" xmlns:p="http://schemas.openxmlformats.org/presentationml/2006/main" xmlns:r="http://schemas.openxmlformats.org/officeDocument/2006/relationships" type="objOnly" preserve="1">
+<p:sldLayout xmlns:a="http://schemas.openxmlformats.org/drawingml/2006/main" xmlns:p="http://schemas.openxmlformats.org/presentationml/2006/main" xmlns:r="http://schemas.openxmlformats.org/officeDocument/2006/relationships" xmlns:p14="http://schemas.microsoft.com/office/powerpoint/2010/main" xmlns:p15="http://schemas.microsoft.com/office/powerpoint/2012/main" xmlns:mc="http://schemas.openxmlformats.org/markup-compatibility/2006" type="objOnly" preserve="1">
   <p:cSld name="Centered Text">
     <p:spTree>
       <p:nvGrpSpPr>
@@ -2465,7 +2742,7 @@
 </file>
 
 <file path=ppt/slideLayouts/slideLayout7.xml><?xml version="1.0" encoding="utf-8"?>
-<p:sldLayout xmlns:a="http://schemas.openxmlformats.org/drawingml/2006/main" xmlns:p="http://schemas.openxmlformats.org/presentationml/2006/main" xmlns:r="http://schemas.openxmlformats.org/officeDocument/2006/relationships" type="twoObjAndObj" preserve="1">
+<p:sldLayout xmlns:a="http://schemas.openxmlformats.org/drawingml/2006/main" xmlns:p="http://schemas.openxmlformats.org/presentationml/2006/main" xmlns:r="http://schemas.openxmlformats.org/officeDocument/2006/relationships" xmlns:p14="http://schemas.microsoft.com/office/powerpoint/2010/main" xmlns:p15="http://schemas.microsoft.com/office/powerpoint/2012/main" xmlns:mc="http://schemas.openxmlformats.org/markup-compatibility/2006" type="twoObjAndObj" preserve="1">
   <p:cSld name="Title, 2 Content and Content">
     <p:spTree>
       <p:nvGrpSpPr>
@@ -2538,7 +2815,9 @@
           </a:prstGeom>
         </p:spPr>
         <p:txBody>
-          <a:bodyPr lIns="0" rIns="0" tIns="0" bIns="0"/>
+          <a:bodyPr lIns="0" rIns="0" tIns="0" bIns="0">
+            <a:normAutofit/>
+          </a:bodyPr>
           <a:p>
             <a:endParaRPr b="0" lang="en-US" sz="3200" spc="-1" strike="noStrike">
               <a:solidFill>
@@ -2574,7 +2853,9 @@
           </a:prstGeom>
         </p:spPr>
         <p:txBody>
-          <a:bodyPr lIns="0" rIns="0" tIns="0" bIns="0"/>
+          <a:bodyPr lIns="0" rIns="0" tIns="0" bIns="0">
+            <a:normAutofit/>
+          </a:bodyPr>
           <a:p>
             <a:endParaRPr b="0" lang="en-US" sz="3200" spc="-1" strike="noStrike">
               <a:solidFill>
@@ -2610,7 +2891,9 @@
           </a:prstGeom>
         </p:spPr>
         <p:txBody>
-          <a:bodyPr lIns="0" rIns="0" tIns="0" bIns="0"/>
+          <a:bodyPr lIns="0" rIns="0" tIns="0" bIns="0">
+            <a:normAutofit/>
+          </a:bodyPr>
           <a:p>
             <a:endParaRPr b="0" lang="en-US" sz="3200" spc="-1" strike="noStrike">
               <a:solidFill>
@@ -2632,7 +2915,7 @@
 </file>
 
 <file path=ppt/slideLayouts/slideLayout8.xml><?xml version="1.0" encoding="utf-8"?>
-<p:sldLayout xmlns:a="http://schemas.openxmlformats.org/drawingml/2006/main" xmlns:p="http://schemas.openxmlformats.org/presentationml/2006/main" xmlns:r="http://schemas.openxmlformats.org/officeDocument/2006/relationships" type="objAndTwoObj" preserve="1">
+<p:sldLayout xmlns:a="http://schemas.openxmlformats.org/drawingml/2006/main" xmlns:p="http://schemas.openxmlformats.org/presentationml/2006/main" xmlns:r="http://schemas.openxmlformats.org/officeDocument/2006/relationships" xmlns:p14="http://schemas.microsoft.com/office/powerpoint/2010/main" xmlns:p15="http://schemas.microsoft.com/office/powerpoint/2012/main" xmlns:mc="http://schemas.openxmlformats.org/markup-compatibility/2006" type="objAndTwoObj" preserve="1">
   <p:cSld name="Title Content and 2 Content">
     <p:spTree>
       <p:nvGrpSpPr>
@@ -2705,7 +2988,9 @@
           </a:prstGeom>
         </p:spPr>
         <p:txBody>
-          <a:bodyPr lIns="0" rIns="0" tIns="0" bIns="0"/>
+          <a:bodyPr lIns="0" rIns="0" tIns="0" bIns="0">
+            <a:normAutofit/>
+          </a:bodyPr>
           <a:p>
             <a:endParaRPr b="0" lang="en-US" sz="3200" spc="-1" strike="noStrike">
               <a:solidFill>
@@ -2741,7 +3026,9 @@
           </a:prstGeom>
         </p:spPr>
         <p:txBody>
-          <a:bodyPr lIns="0" rIns="0" tIns="0" bIns="0"/>
+          <a:bodyPr lIns="0" rIns="0" tIns="0" bIns="0">
+            <a:normAutofit/>
+          </a:bodyPr>
           <a:p>
             <a:endParaRPr b="0" lang="en-US" sz="3200" spc="-1" strike="noStrike">
               <a:solidFill>
@@ -2777,7 +3064,9 @@
           </a:prstGeom>
         </p:spPr>
         <p:txBody>
-          <a:bodyPr lIns="0" rIns="0" tIns="0" bIns="0"/>
+          <a:bodyPr lIns="0" rIns="0" tIns="0" bIns="0">
+            <a:normAutofit/>
+          </a:bodyPr>
           <a:p>
             <a:endParaRPr b="0" lang="en-US" sz="3200" spc="-1" strike="noStrike">
               <a:solidFill>
@@ -2799,7 +3088,7 @@
 </file>
 
 <file path=ppt/slideLayouts/slideLayout9.xml><?xml version="1.0" encoding="utf-8"?>
-<p:sldLayout xmlns:a="http://schemas.openxmlformats.org/drawingml/2006/main" xmlns:p="http://schemas.openxmlformats.org/presentationml/2006/main" xmlns:r="http://schemas.openxmlformats.org/officeDocument/2006/relationships" type="twoObjOverTx" preserve="1">
+<p:sldLayout xmlns:a="http://schemas.openxmlformats.org/drawingml/2006/main" xmlns:p="http://schemas.openxmlformats.org/presentationml/2006/main" xmlns:r="http://schemas.openxmlformats.org/officeDocument/2006/relationships" xmlns:p14="http://schemas.microsoft.com/office/powerpoint/2010/main" xmlns:p15="http://schemas.microsoft.com/office/powerpoint/2012/main" xmlns:mc="http://schemas.openxmlformats.org/markup-compatibility/2006" type="twoObjOverTx" preserve="1">
   <p:cSld name="Title, 2 Content over Content">
     <p:spTree>
       <p:nvGrpSpPr>
@@ -2872,7 +3161,9 @@
           </a:prstGeom>
         </p:spPr>
         <p:txBody>
-          <a:bodyPr lIns="0" rIns="0" tIns="0" bIns="0"/>
+          <a:bodyPr lIns="0" rIns="0" tIns="0" bIns="0">
+            <a:normAutofit/>
+          </a:bodyPr>
           <a:p>
             <a:endParaRPr b="0" lang="en-US" sz="3200" spc="-1" strike="noStrike">
               <a:solidFill>
@@ -2908,7 +3199,9 @@
           </a:prstGeom>
         </p:spPr>
         <p:txBody>
-          <a:bodyPr lIns="0" rIns="0" tIns="0" bIns="0"/>
+          <a:bodyPr lIns="0" rIns="0" tIns="0" bIns="0">
+            <a:normAutofit/>
+          </a:bodyPr>
           <a:p>
             <a:endParaRPr b="0" lang="en-US" sz="3200" spc="-1" strike="noStrike">
               <a:solidFill>
@@ -2944,7 +3237,9 @@
           </a:prstGeom>
         </p:spPr>
         <p:txBody>
-          <a:bodyPr lIns="0" rIns="0" tIns="0" bIns="0"/>
+          <a:bodyPr lIns="0" rIns="0" tIns="0" bIns="0">
+            <a:normAutofit/>
+          </a:bodyPr>
           <a:p>
             <a:endParaRPr b="0" lang="en-US" sz="3200" spc="-1" strike="noStrike">
               <a:solidFill>
@@ -2966,7 +3261,7 @@
 </file>
 
 <file path=ppt/slideMasters/slideMaster1.xml><?xml version="1.0" encoding="utf-8"?>
-<p:sldMaster xmlns:a="http://schemas.openxmlformats.org/drawingml/2006/main" xmlns:p="http://schemas.openxmlformats.org/presentationml/2006/main" xmlns:r="http://schemas.openxmlformats.org/officeDocument/2006/relationships">
+<p:sldMaster xmlns:a="http://schemas.openxmlformats.org/drawingml/2006/main" xmlns:p="http://schemas.openxmlformats.org/presentationml/2006/main" xmlns:r="http://schemas.openxmlformats.org/officeDocument/2006/relationships" xmlns:p14="http://schemas.microsoft.com/office/powerpoint/2010/main" xmlns:p15="http://schemas.microsoft.com/office/powerpoint/2012/main" xmlns:mc="http://schemas.openxmlformats.org/markup-compatibility/2006">
   <p:cSld>
     <p:bg>
       <p:bgPr>
@@ -3060,9 +3355,14 @@
           </a:prstGeom>
         </p:spPr>
         <p:txBody>
-          <a:bodyPr lIns="0" rIns="0" tIns="0" bIns="0"/>
+          <a:bodyPr lIns="0" rIns="0" tIns="0" bIns="0">
+            <a:normAutofit/>
+          </a:bodyPr>
           <a:p>
             <a:pPr marL="432000" indent="-324000">
+              <a:spcBef>
+                <a:spcPts val="1417"/>
+              </a:spcBef>
               <a:buClr>
                 <a:srgbClr val="000000"/>
               </a:buClr>
@@ -3098,6 +3398,9 @@
           </a:p>
           <a:p>
             <a:pPr lvl="1" marL="864000" indent="-324000">
+              <a:spcBef>
+                <a:spcPts val="1134"/>
+              </a:spcBef>
               <a:buClr>
                 <a:srgbClr val="000000"/>
               </a:buClr>
@@ -3133,6 +3436,9 @@
           </a:p>
           <a:p>
             <a:pPr lvl="2" marL="1296000" indent="-288000">
+              <a:spcBef>
+                <a:spcPts val="850"/>
+              </a:spcBef>
               <a:buClr>
                 <a:srgbClr val="000000"/>
               </a:buClr>
@@ -3168,6 +3474,9 @@
           </a:p>
           <a:p>
             <a:pPr lvl="3" marL="1728000" indent="-216000">
+              <a:spcBef>
+                <a:spcPts val="567"/>
+              </a:spcBef>
               <a:buClr>
                 <a:srgbClr val="000000"/>
               </a:buClr>
@@ -3203,6 +3512,9 @@
           </a:p>
           <a:p>
             <a:pPr lvl="4" marL="2160000" indent="-216000">
+              <a:spcBef>
+                <a:spcPts val="283"/>
+              </a:spcBef>
               <a:buClr>
                 <a:srgbClr val="000000"/>
               </a:buClr>
@@ -3238,6 +3550,9 @@
           </a:p>
           <a:p>
             <a:pPr lvl="5" marL="2592000" indent="-216000">
+              <a:spcBef>
+                <a:spcPts val="283"/>
+              </a:spcBef>
               <a:buClr>
                 <a:srgbClr val="000000"/>
               </a:buClr>
@@ -3273,6 +3588,9 @@
           </a:p>
           <a:p>
             <a:pPr lvl="6" marL="3024000" indent="-216000">
+              <a:spcBef>
+                <a:spcPts val="283"/>
+              </a:spcBef>
               <a:buClr>
                 <a:srgbClr val="000000"/>
               </a:buClr>
@@ -3329,7 +3647,7 @@
 </file>
 
 <file path=ppt/slideMasters/slideMaster2.xml><?xml version="1.0" encoding="utf-8"?>
-<p:sldMaster xmlns:a="http://schemas.openxmlformats.org/drawingml/2006/main" xmlns:p="http://schemas.openxmlformats.org/presentationml/2006/main" xmlns:r="http://schemas.openxmlformats.org/officeDocument/2006/relationships">
+<p:sldMaster xmlns:a="http://schemas.openxmlformats.org/drawingml/2006/main" xmlns:p="http://schemas.openxmlformats.org/presentationml/2006/main" xmlns:r="http://schemas.openxmlformats.org/officeDocument/2006/relationships" xmlns:p14="http://schemas.microsoft.com/office/powerpoint/2010/main" xmlns:p15="http://schemas.microsoft.com/office/powerpoint/2012/main" xmlns:mc="http://schemas.openxmlformats.org/markup-compatibility/2006">
   <p:cSld>
     <p:bg>
       <p:bgPr>
@@ -3354,7 +3672,7 @@
       </p:grpSpPr>
       <p:sp>
         <p:nvSpPr>
-          <p:cNvPr id="36" name="PlaceHolder 1"/>
+          <p:cNvPr id="38" name="PlaceHolder 1"/>
           <p:cNvSpPr>
             <a:spLocks noGrp="1"/>
           </p:cNvSpPr>
@@ -3405,7 +3723,7 @@
       </p:sp>
       <p:sp>
         <p:nvSpPr>
-          <p:cNvPr id="37" name="PlaceHolder 2"/>
+          <p:cNvPr id="39" name="PlaceHolder 2"/>
           <p:cNvSpPr>
             <a:spLocks noGrp="1"/>
           </p:cNvSpPr>
@@ -3423,9 +3741,14 @@
           </a:prstGeom>
         </p:spPr>
         <p:txBody>
-          <a:bodyPr lIns="0" rIns="0" tIns="0" bIns="0"/>
+          <a:bodyPr lIns="0" rIns="0" tIns="0" bIns="0">
+            <a:normAutofit/>
+          </a:bodyPr>
           <a:p>
             <a:pPr marL="432000" indent="-324000">
+              <a:spcBef>
+                <a:spcPts val="1417"/>
+              </a:spcBef>
               <a:buClr>
                 <a:srgbClr val="000000"/>
               </a:buClr>
@@ -3461,6 +3784,9 @@
           </a:p>
           <a:p>
             <a:pPr lvl="1" marL="864000" indent="-324000">
+              <a:spcBef>
+                <a:spcPts val="1134"/>
+              </a:spcBef>
               <a:buClr>
                 <a:srgbClr val="000000"/>
               </a:buClr>
@@ -3496,6 +3822,9 @@
           </a:p>
           <a:p>
             <a:pPr lvl="2" marL="1296000" indent="-288000">
+              <a:spcBef>
+                <a:spcPts val="850"/>
+              </a:spcBef>
               <a:buClr>
                 <a:srgbClr val="000000"/>
               </a:buClr>
@@ -3531,6 +3860,9 @@
           </a:p>
           <a:p>
             <a:pPr lvl="3" marL="1728000" indent="-216000">
+              <a:spcBef>
+                <a:spcPts val="567"/>
+              </a:spcBef>
               <a:buClr>
                 <a:srgbClr val="000000"/>
               </a:buClr>
@@ -3566,6 +3898,9 @@
           </a:p>
           <a:p>
             <a:pPr lvl="4" marL="2160000" indent="-216000">
+              <a:spcBef>
+                <a:spcPts val="283"/>
+              </a:spcBef>
               <a:buClr>
                 <a:srgbClr val="000000"/>
               </a:buClr>
@@ -3601,6 +3936,9 @@
           </a:p>
           <a:p>
             <a:pPr lvl="5" marL="2592000" indent="-216000">
+              <a:spcBef>
+                <a:spcPts val="283"/>
+              </a:spcBef>
               <a:buClr>
                 <a:srgbClr val="000000"/>
               </a:buClr>
@@ -3636,6 +3974,9 @@
           </a:p>
           <a:p>
             <a:pPr lvl="6" marL="3024000" indent="-216000">
+              <a:spcBef>
+                <a:spcPts val="283"/>
+              </a:spcBef>
               <a:buClr>
                 <a:srgbClr val="000000"/>
               </a:buClr>
@@ -3692,7 +4033,7 @@
 </file>
 
 <file path=ppt/slides/slide1.xml><?xml version="1.0" encoding="utf-8"?>
-<p:sld xmlns:a="http://schemas.openxmlformats.org/drawingml/2006/main" xmlns:p="http://schemas.openxmlformats.org/presentationml/2006/main" xmlns:r="http://schemas.openxmlformats.org/officeDocument/2006/relationships">
+<p:sld xmlns:a="http://schemas.openxmlformats.org/drawingml/2006/main" xmlns:p="http://schemas.openxmlformats.org/presentationml/2006/main" xmlns:r="http://schemas.openxmlformats.org/officeDocument/2006/relationships" xmlns:p14="http://schemas.microsoft.com/office/powerpoint/2010/main" xmlns:p15="http://schemas.microsoft.com/office/powerpoint/2012/main" xmlns:mc="http://schemas.openxmlformats.org/markup-compatibility/2006">
   <p:cSld>
     <p:spTree>
       <p:nvGrpSpPr>
@@ -3710,14 +4051,14 @@
       </p:grpSpPr>
       <p:sp>
         <p:nvSpPr>
-          <p:cNvPr id="72" name="CustomShape 1"/>
+          <p:cNvPr id="76" name="CustomShape 1"/>
           <p:cNvSpPr/>
           <p:nvPr/>
         </p:nvSpPr>
         <p:spPr>
           <a:xfrm>
             <a:off x="1523880" y="1122480"/>
-            <a:ext cx="9142200" cy="2385720"/>
+            <a:ext cx="9140040" cy="2383560"/>
           </a:xfrm>
           <a:prstGeom prst="rect">
             <a:avLst/>
@@ -3754,32 +4095,32 @@
                 <a:latin typeface="Calibri Light"/>
                 <a:ea typeface="DejaVu Sans"/>
               </a:rPr>
-              <a:t>Testing TIKA DETECTION</a:t>
+              <a:t>Testing Text Detection</a:t>
             </a:r>
-            <a:endParaRPr b="0" lang="en-US" sz="1800" spc="-1" strike="noStrike">
-              <a:solidFill>
-                <a:srgbClr val="000000"/>
-              </a:solidFill>
-              <a:uFill>
-                <a:solidFill>
-                  <a:srgbClr val="ffffff"/>
-                </a:solidFill>
-              </a:uFill>
-              <a:latin typeface="Arial"/>
-            </a:endParaRPr>
-          </a:p>
-        </p:txBody>
-      </p:sp>
-      <p:sp>
-        <p:nvSpPr>
-          <p:cNvPr id="73" name="CustomShape 2"/>
+            <a:endParaRPr b="0" lang="en-US" sz="6000" spc="-1" strike="noStrike">
+              <a:solidFill>
+                <a:srgbClr val="000000"/>
+              </a:solidFill>
+              <a:uFill>
+                <a:solidFill>
+                  <a:srgbClr val="ffffff"/>
+                </a:solidFill>
+              </a:uFill>
+              <a:latin typeface="Arial"/>
+            </a:endParaRPr>
+          </a:p>
+        </p:txBody>
+      </p:sp>
+      <p:sp>
+        <p:nvSpPr>
+          <p:cNvPr id="77" name="CustomShape 2"/>
           <p:cNvSpPr/>
           <p:nvPr/>
         </p:nvSpPr>
         <p:spPr>
           <a:xfrm>
             <a:off x="1523880" y="3602160"/>
-            <a:ext cx="9142200" cy="1653840"/>
+            <a:ext cx="9140040" cy="1651680"/>
           </a:xfrm>
           <a:prstGeom prst="rect">
             <a:avLst/>
@@ -3818,7 +4159,7 @@
               </a:rPr>
               <a:t>Slide 1</a:t>
             </a:r>
-            <a:endParaRPr b="0" lang="en-US" sz="1800" spc="-1" strike="noStrike">
+            <a:endParaRPr b="0" lang="en-US" sz="2400" spc="-1" strike="noStrike">
               <a:solidFill>
                 <a:srgbClr val="000000"/>
               </a:solidFill>
@@ -3865,7 +4206,7 @@
 </file>
 
 <file path=ppt/slides/slide2.xml><?xml version="1.0" encoding="utf-8"?>
-<p:sld xmlns:a="http://schemas.openxmlformats.org/drawingml/2006/main" xmlns:p="http://schemas.openxmlformats.org/presentationml/2006/main" xmlns:r="http://schemas.openxmlformats.org/officeDocument/2006/relationships">
+<p:sld xmlns:a="http://schemas.openxmlformats.org/drawingml/2006/main" xmlns:p="http://schemas.openxmlformats.org/presentationml/2006/main" xmlns:r="http://schemas.openxmlformats.org/officeDocument/2006/relationships" xmlns:p14="http://schemas.microsoft.com/office/powerpoint/2010/main" xmlns:p15="http://schemas.microsoft.com/office/powerpoint/2012/main" xmlns:mc="http://schemas.openxmlformats.org/markup-compatibility/2006">
   <p:cSld>
     <p:spTree>
       <p:nvGrpSpPr>
@@ -3883,14 +4224,14 @@
       </p:grpSpPr>
       <p:sp>
         <p:nvSpPr>
-          <p:cNvPr id="74" name="CustomShape 1"/>
+          <p:cNvPr id="78" name="CustomShape 1"/>
           <p:cNvSpPr/>
           <p:nvPr/>
         </p:nvSpPr>
         <p:spPr>
           <a:xfrm>
             <a:off x="838080" y="365040"/>
-            <a:ext cx="10513800" cy="1323720"/>
+            <a:ext cx="10511640" cy="1321560"/>
           </a:xfrm>
           <a:prstGeom prst="rect">
             <a:avLst/>
@@ -3929,30 +4270,30 @@
               </a:rPr>
               <a:t>Testing:</a:t>
             </a:r>
-            <a:endParaRPr b="0" lang="en-US" sz="1800" spc="-1" strike="noStrike">
-              <a:solidFill>
-                <a:srgbClr val="000000"/>
-              </a:solidFill>
-              <a:uFill>
-                <a:solidFill>
-                  <a:srgbClr val="ffffff"/>
-                </a:solidFill>
-              </a:uFill>
-              <a:latin typeface="Arial"/>
-            </a:endParaRPr>
-          </a:p>
-        </p:txBody>
-      </p:sp>
-      <p:sp>
-        <p:nvSpPr>
-          <p:cNvPr id="75" name="CustomShape 2"/>
+            <a:endParaRPr b="0" lang="en-US" sz="4400" spc="-1" strike="noStrike">
+              <a:solidFill>
+                <a:srgbClr val="000000"/>
+              </a:solidFill>
+              <a:uFill>
+                <a:solidFill>
+                  <a:srgbClr val="ffffff"/>
+                </a:solidFill>
+              </a:uFill>
+              <a:latin typeface="Arial"/>
+            </a:endParaRPr>
+          </a:p>
+        </p:txBody>
+      </p:sp>
+      <p:sp>
+        <p:nvSpPr>
+          <p:cNvPr id="79" name="CustomShape 2"/>
           <p:cNvSpPr/>
           <p:nvPr/>
         </p:nvSpPr>
         <p:spPr>
           <a:xfrm>
             <a:off x="838080" y="1825560"/>
-            <a:ext cx="10513800" cy="4349520"/>
+            <a:ext cx="10511640" cy="4347360"/>
           </a:xfrm>
           <a:prstGeom prst="rect">
             <a:avLst/>
@@ -3991,7 +4332,7 @@
               </a:rPr>
               <a:t>はベンゾジアゼピン系抗不安薬、抗けいれん薬、鎮静薬である。日本国外では代表的な睡眠薬でもあり、（骨格）筋弛緩作用もある。アルコール・ベンゾジアゼピン離脱症候群の管理にも用いられる。</a:t>
             </a:r>
-            <a:endParaRPr b="0" lang="en-US" sz="1800" spc="-1" strike="noStrike">
+            <a:endParaRPr b="0" lang="en-US" sz="2800" spc="-1" strike="noStrike">
               <a:solidFill>
                 <a:srgbClr val="000000"/>
               </a:solidFill>
@@ -4009,7 +4350,7 @@
                 <a:spcPct val="90000"/>
               </a:lnSpc>
             </a:pPr>
-            <a:endParaRPr b="0" lang="en-US" sz="1800" spc="-1" strike="noStrike">
+            <a:endParaRPr b="0" lang="en-US" sz="2800" spc="-1" strike="noStrike">
               <a:solidFill>
                 <a:srgbClr val="000000"/>
               </a:solidFill>
@@ -4162,7 +4503,7 @@
               </a:rPr>
               <a:t>もその「エッセンシャルドラッグ」リストにジアゼパムを掲載してい</a:t>
             </a:r>
-            <a:endParaRPr b="0" lang="en-US" sz="1800" spc="-1" strike="noStrike">
+            <a:endParaRPr b="0" lang="en-US" sz="2800" spc="-1" strike="noStrike">
               <a:solidFill>
                 <a:srgbClr val="000000"/>
               </a:solidFill>
@@ -4209,7 +4550,7 @@
 </file>
 
 <file path=ppt/slides/slide3.xml><?xml version="1.0" encoding="utf-8"?>
-<p:sld xmlns:a="http://schemas.openxmlformats.org/drawingml/2006/main" xmlns:p="http://schemas.openxmlformats.org/presentationml/2006/main" xmlns:r="http://schemas.openxmlformats.org/officeDocument/2006/relationships">
+<p:sld xmlns:a="http://schemas.openxmlformats.org/drawingml/2006/main" xmlns:p="http://schemas.openxmlformats.org/presentationml/2006/main" xmlns:r="http://schemas.openxmlformats.org/officeDocument/2006/relationships" xmlns:p14="http://schemas.microsoft.com/office/powerpoint/2010/main" xmlns:p15="http://schemas.microsoft.com/office/powerpoint/2012/main" xmlns:mc="http://schemas.openxmlformats.org/markup-compatibility/2006">
   <p:cSld>
     <p:spTree>
       <p:nvGrpSpPr>
@@ -4227,14 +4568,14 @@
       </p:grpSpPr>
       <p:sp>
         <p:nvSpPr>
-          <p:cNvPr id="76" name="CustomShape 1"/>
+          <p:cNvPr id="80" name="CustomShape 1"/>
           <p:cNvSpPr/>
           <p:nvPr/>
         </p:nvSpPr>
         <p:spPr>
           <a:xfrm>
             <a:off x="838080" y="365040"/>
-            <a:ext cx="10513800" cy="1323720"/>
+            <a:ext cx="10511640" cy="1321560"/>
           </a:xfrm>
           <a:prstGeom prst="rect">
             <a:avLst/>
@@ -4273,30 +4614,30 @@
               </a:rPr>
               <a:t>Title 3</a:t>
             </a:r>
-            <a:endParaRPr b="0" lang="en-US" sz="1800" spc="-1" strike="noStrike">
-              <a:solidFill>
-                <a:srgbClr val="000000"/>
-              </a:solidFill>
-              <a:uFill>
-                <a:solidFill>
-                  <a:srgbClr val="ffffff"/>
-                </a:solidFill>
-              </a:uFill>
-              <a:latin typeface="Arial"/>
-            </a:endParaRPr>
-          </a:p>
-        </p:txBody>
-      </p:sp>
-      <p:sp>
-        <p:nvSpPr>
-          <p:cNvPr id="77" name="CustomShape 2"/>
+            <a:endParaRPr b="0" lang="en-US" sz="4400" spc="-1" strike="noStrike">
+              <a:solidFill>
+                <a:srgbClr val="000000"/>
+              </a:solidFill>
+              <a:uFill>
+                <a:solidFill>
+                  <a:srgbClr val="ffffff"/>
+                </a:solidFill>
+              </a:uFill>
+              <a:latin typeface="Arial"/>
+            </a:endParaRPr>
+          </a:p>
+        </p:txBody>
+      </p:sp>
+      <p:sp>
+        <p:nvSpPr>
+          <p:cNvPr id="81" name="CustomShape 2"/>
           <p:cNvSpPr/>
           <p:nvPr/>
         </p:nvSpPr>
         <p:spPr>
           <a:xfrm>
             <a:off x="838080" y="1825560"/>
-            <a:ext cx="10513800" cy="4349520"/>
+            <a:ext cx="10511640" cy="4347360"/>
           </a:xfrm>
           <a:prstGeom prst="rect">
             <a:avLst/>
@@ -4315,7 +4656,7 @@
         <p:txBody>
           <a:bodyPr lIns="90000" rIns="90000" tIns="45000" bIns="45000"/>
           <a:p>
-            <a:pPr marL="228600" indent="-226800">
+            <a:pPr marL="228600" indent="-224640">
               <a:lnSpc>
                 <a:spcPct val="90000"/>
               </a:lnSpc>
@@ -4338,9 +4679,9 @@
                 <a:latin typeface="Calibri"/>
                 <a:ea typeface="DejaVu Sans"/>
               </a:rPr>
-              <a:t>Slide 3 test text 000-000-0000</a:t>
+              <a:t>Slide 3: citizen 000-000-0000</a:t>
             </a:r>
-            <a:endParaRPr b="0" lang="en-US" sz="1800" spc="-1" strike="noStrike">
+            <a:endParaRPr b="0" lang="en-US" sz="2800" spc="-1" strike="noStrike">
               <a:solidFill>
                 <a:srgbClr val="000000"/>
               </a:solidFill>
@@ -4387,7 +4728,7 @@
 </file>
 
 <file path=ppt/slides/slide4.xml><?xml version="1.0" encoding="utf-8"?>
-<p:sld xmlns:a="http://schemas.openxmlformats.org/drawingml/2006/main" xmlns:p="http://schemas.openxmlformats.org/presentationml/2006/main" xmlns:r="http://schemas.openxmlformats.org/officeDocument/2006/relationships">
+<p:sld xmlns:a="http://schemas.openxmlformats.org/drawingml/2006/main" xmlns:p="http://schemas.openxmlformats.org/presentationml/2006/main" xmlns:r="http://schemas.openxmlformats.org/officeDocument/2006/relationships" xmlns:p14="http://schemas.microsoft.com/office/powerpoint/2010/main" xmlns:p15="http://schemas.microsoft.com/office/powerpoint/2012/main" xmlns:mc="http://schemas.openxmlformats.org/markup-compatibility/2006">
   <p:cSld>
     <p:spTree>
       <p:nvGrpSpPr>
@@ -4405,14 +4746,14 @@
       </p:grpSpPr>
       <p:sp>
         <p:nvSpPr>
-          <p:cNvPr id="78" name="CustomShape 1"/>
+          <p:cNvPr id="82" name="CustomShape 1"/>
           <p:cNvSpPr/>
           <p:nvPr/>
         </p:nvSpPr>
         <p:spPr>
           <a:xfrm>
             <a:off x="838080" y="365040"/>
-            <a:ext cx="10513800" cy="1323720"/>
+            <a:ext cx="10511640" cy="1321560"/>
           </a:xfrm>
           <a:prstGeom prst="rect">
             <a:avLst/>
@@ -4428,53 +4769,17 @@
           <a:effectRef idx="0"/>
           <a:fontRef idx="minor"/>
         </p:style>
-        <p:txBody>
-          <a:bodyPr lIns="90000" rIns="90000" tIns="45000" bIns="45000" anchor="ctr"/>
-          <a:p>
-            <a:pPr>
-              <a:lnSpc>
-                <a:spcPct val="90000"/>
-              </a:lnSpc>
-            </a:pPr>
-            <a:r>
-              <a:rPr b="0" lang="en-US" sz="4400" spc="-1" strike="noStrike">
-                <a:solidFill>
-                  <a:srgbClr val="000000"/>
-                </a:solidFill>
-                <a:uFill>
-                  <a:solidFill>
-                    <a:srgbClr val="ffffff"/>
-                  </a:solidFill>
-                </a:uFill>
-                <a:latin typeface="Calibri Light"/>
-                <a:ea typeface="DejaVu Sans"/>
-              </a:rPr>
-              <a:t>Title 4</a:t>
-            </a:r>
-            <a:endParaRPr b="0" lang="en-US" sz="1800" spc="-1" strike="noStrike">
-              <a:solidFill>
-                <a:srgbClr val="000000"/>
-              </a:solidFill>
-              <a:uFill>
-                <a:solidFill>
-                  <a:srgbClr val="ffffff"/>
-                </a:solidFill>
-              </a:uFill>
-              <a:latin typeface="Arial"/>
-            </a:endParaRPr>
-          </a:p>
-        </p:txBody>
-      </p:sp>
-      <p:sp>
-        <p:nvSpPr>
-          <p:cNvPr id="79" name="CustomShape 2"/>
+      </p:sp>
+      <p:sp>
+        <p:nvSpPr>
+          <p:cNvPr id="83" name="CustomShape 2"/>
           <p:cNvSpPr/>
           <p:nvPr/>
         </p:nvSpPr>
         <p:spPr>
           <a:xfrm>
             <a:off x="838080" y="1825560"/>
-            <a:ext cx="10513800" cy="4349520"/>
+            <a:ext cx="10511640" cy="4347360"/>
           </a:xfrm>
           <a:prstGeom prst="rect">
             <a:avLst/>
@@ -4493,7 +4798,7 @@
         <p:txBody>
           <a:bodyPr lIns="90000" rIns="90000" tIns="45000" bIns="45000"/>
           <a:p>
-            <a:pPr marL="228600" indent="-226800">
+            <a:pPr marL="228600" indent="-224640">
               <a:lnSpc>
                 <a:spcPct val="90000"/>
               </a:lnSpc>
@@ -4516,9 +4821,9 @@
                 <a:latin typeface="Calibri"/>
                 <a:ea typeface="DejaVu Sans"/>
               </a:rPr>
-              <a:t>Slide 4 test text</a:t>
+              <a:t>An automobile races down the street.</a:t>
             </a:r>
-            <a:endParaRPr b="0" lang="en-US" sz="1800" spc="-1" strike="noStrike">
+            <a:endParaRPr b="0" lang="en-US" sz="2800" spc="-1" strike="noStrike">
               <a:solidFill>
                 <a:srgbClr val="000000"/>
               </a:solidFill>
@@ -4565,7 +4870,7 @@
 </file>
 
 <file path=ppt/slides/slide5.xml><?xml version="1.0" encoding="utf-8"?>
-<p:sld xmlns:a="http://schemas.openxmlformats.org/drawingml/2006/main" xmlns:p="http://schemas.openxmlformats.org/presentationml/2006/main" xmlns:r="http://schemas.openxmlformats.org/officeDocument/2006/relationships">
+<p:sld xmlns:a="http://schemas.openxmlformats.org/drawingml/2006/main" xmlns:p="http://schemas.openxmlformats.org/presentationml/2006/main" xmlns:r="http://schemas.openxmlformats.org/officeDocument/2006/relationships" xmlns:p14="http://schemas.microsoft.com/office/powerpoint/2010/main" xmlns:p15="http://schemas.microsoft.com/office/powerpoint/2012/main" xmlns:mc="http://schemas.openxmlformats.org/markup-compatibility/2006">
   <p:cSld>
     <p:spTree>
       <p:nvGrpSpPr>
@@ -4581,16 +4886,349 @@
           <a:chExt cx="0" cy="0"/>
         </a:xfrm>
       </p:grpSpPr>
-      <p:sp>
-        <p:nvSpPr>
-          <p:cNvPr id="80" name="CustomShape 1"/>
+    </p:spTree>
+  </p:cSld>
+  <p:timing>
+    <p:tnLst>
+      <p:par>
+        <p:cTn id="9" dur="indefinite" restart="never" nodeType="tmRoot">
+          <p:childTnLst>
+            <p:seq>
+              <p:cTn id="10" nodeType="mainSeq"/>
+              <p:prevCondLst>
+                <p:cond delay="0" evt="onPrev">
+                  <p:tgtEl>
+                    <p:sldTgt/>
+                  </p:tgtEl>
+                </p:cond>
+              </p:prevCondLst>
+              <p:nextCondLst>
+                <p:cond delay="0" evt="onNext">
+                  <p:tgtEl>
+                    <p:sldTgt/>
+                  </p:tgtEl>
+                </p:cond>
+              </p:nextCondLst>
+            </p:seq>
+          </p:childTnLst>
+        </p:cTn>
+      </p:par>
+    </p:tnLst>
+  </p:timing>
+</p:sld>
+</file>
+
+<file path=ppt/slides/slide6.xml><?xml version="1.0" encoding="utf-8"?>
+<p:sld xmlns:a="http://schemas.openxmlformats.org/drawingml/2006/main" xmlns:p="http://schemas.openxmlformats.org/presentationml/2006/main" xmlns:r="http://schemas.openxmlformats.org/officeDocument/2006/relationships" xmlns:p14="http://schemas.microsoft.com/office/powerpoint/2010/main" xmlns:p15="http://schemas.microsoft.com/office/powerpoint/2012/main" xmlns:mc="http://schemas.openxmlformats.org/markup-compatibility/2006">
+  <p:cSld>
+    <p:spTree>
+      <p:nvGrpSpPr>
+        <p:cNvPr id="1" name=""/>
+        <p:cNvGrpSpPr/>
+        <p:nvPr/>
+      </p:nvGrpSpPr>
+      <p:grpSpPr>
+        <a:xfrm>
+          <a:off x="0" y="0"/>
+          <a:ext cx="0" cy="0"/>
+          <a:chOff x="0" y="0"/>
+          <a:chExt cx="0" cy="0"/>
+        </a:xfrm>
+      </p:grpSpPr>
+      <p:sp>
+        <p:nvSpPr>
+          <p:cNvPr id="84" name="CustomShape 1"/>
           <p:cNvSpPr/>
           <p:nvPr/>
         </p:nvSpPr>
         <p:spPr>
           <a:xfrm>
             <a:off x="838080" y="365040"/>
-            <a:ext cx="10513800" cy="1323720"/>
+            <a:ext cx="10511640" cy="1321560"/>
+          </a:xfrm>
+          <a:prstGeom prst="rect">
+            <a:avLst/>
+          </a:prstGeom>
+          <a:noFill/>
+          <a:ln>
+            <a:noFill/>
+          </a:ln>
+        </p:spPr>
+        <p:style>
+          <a:lnRef idx="0"/>
+          <a:fillRef idx="0"/>
+          <a:effectRef idx="0"/>
+          <a:fontRef idx="minor"/>
+        </p:style>
+      </p:sp>
+      <p:sp>
+        <p:nvSpPr>
+          <p:cNvPr id="85" name="CustomShape 2"/>
+          <p:cNvSpPr/>
+          <p:nvPr/>
+        </p:nvSpPr>
+        <p:spPr>
+          <a:xfrm>
+            <a:off x="838080" y="1825560"/>
+            <a:ext cx="10511640" cy="4347360"/>
+          </a:xfrm>
+          <a:prstGeom prst="rect">
+            <a:avLst/>
+          </a:prstGeom>
+          <a:noFill/>
+          <a:ln>
+            <a:noFill/>
+          </a:ln>
+        </p:spPr>
+        <p:style>
+          <a:lnRef idx="0"/>
+          <a:fillRef idx="0"/>
+          <a:effectRef idx="0"/>
+          <a:fontRef idx="minor"/>
+        </p:style>
+        <p:txBody>
+          <a:bodyPr lIns="90000" rIns="90000" tIns="45000" bIns="45000"/>
+          <a:p>
+            <a:pPr marL="228600" indent="-224640">
+              <a:lnSpc>
+                <a:spcPct val="90000"/>
+              </a:lnSpc>
+              <a:buClr>
+                <a:srgbClr val="000000"/>
+              </a:buClr>
+              <a:buFont typeface="Arial"/>
+              <a:buChar char="•"/>
+            </a:pPr>
+            <a:r>
+              <a:rPr b="0" lang="en-US" sz="2800" spc="-1" strike="noStrike">
+                <a:solidFill>
+                  <a:srgbClr val="000000"/>
+                </a:solidFill>
+                <a:uFill>
+                  <a:solidFill>
+                    <a:srgbClr val="ffffff"/>
+                  </a:solidFill>
+                </a:uFill>
+                <a:latin typeface="Calibri"/>
+                <a:ea typeface="DejaVu Sans"/>
+              </a:rPr>
+              <a:t>Passenger passport</a:t>
+            </a:r>
+            <a:endParaRPr b="0" lang="en-US" sz="2800" spc="-1" strike="noStrike">
+              <a:solidFill>
+                <a:srgbClr val="000000"/>
+              </a:solidFill>
+              <a:uFill>
+                <a:solidFill>
+                  <a:srgbClr val="ffffff"/>
+                </a:solidFill>
+              </a:uFill>
+              <a:latin typeface="Arial"/>
+            </a:endParaRPr>
+          </a:p>
+        </p:txBody>
+      </p:sp>
+    </p:spTree>
+  </p:cSld>
+  <p:timing>
+    <p:tnLst>
+      <p:par>
+        <p:cTn id="11" dur="indefinite" restart="never" nodeType="tmRoot">
+          <p:childTnLst>
+            <p:seq>
+              <p:cTn id="12" nodeType="mainSeq"/>
+              <p:prevCondLst>
+                <p:cond delay="0" evt="onPrev">
+                  <p:tgtEl>
+                    <p:sldTgt/>
+                  </p:tgtEl>
+                </p:cond>
+              </p:prevCondLst>
+              <p:nextCondLst>
+                <p:cond delay="0" evt="onNext">
+                  <p:tgtEl>
+                    <p:sldTgt/>
+                  </p:tgtEl>
+                </p:cond>
+              </p:nextCondLst>
+            </p:seq>
+          </p:childTnLst>
+        </p:cTn>
+      </p:par>
+    </p:tnLst>
+  </p:timing>
+</p:sld>
+</file>
+
+<file path=ppt/slides/slide7.xml><?xml version="1.0" encoding="utf-8"?>
+<p:sld xmlns:a="http://schemas.openxmlformats.org/drawingml/2006/main" xmlns:p="http://schemas.openxmlformats.org/presentationml/2006/main" xmlns:r="http://schemas.openxmlformats.org/officeDocument/2006/relationships" xmlns:p14="http://schemas.microsoft.com/office/powerpoint/2010/main" xmlns:p15="http://schemas.microsoft.com/office/powerpoint/2012/main" xmlns:mc="http://schemas.openxmlformats.org/markup-compatibility/2006">
+  <p:cSld>
+    <p:spTree>
+      <p:nvGrpSpPr>
+        <p:cNvPr id="1" name=""/>
+        <p:cNvGrpSpPr/>
+        <p:nvPr/>
+      </p:nvGrpSpPr>
+      <p:grpSpPr>
+        <a:xfrm>
+          <a:off x="0" y="0"/>
+          <a:ext cx="0" cy="0"/>
+          <a:chOff x="0" y="0"/>
+          <a:chExt cx="0" cy="0"/>
+        </a:xfrm>
+      </p:grpSpPr>
+      <p:sp>
+        <p:nvSpPr>
+          <p:cNvPr id="86" name="CustomShape 1"/>
+          <p:cNvSpPr/>
+          <p:nvPr/>
+        </p:nvSpPr>
+        <p:spPr>
+          <a:xfrm>
+            <a:off x="838080" y="365040"/>
+            <a:ext cx="10511640" cy="1321560"/>
+          </a:xfrm>
+          <a:prstGeom prst="rect">
+            <a:avLst/>
+          </a:prstGeom>
+          <a:noFill/>
+          <a:ln>
+            <a:noFill/>
+          </a:ln>
+        </p:spPr>
+        <p:style>
+          <a:lnRef idx="0"/>
+          <a:fillRef idx="0"/>
+          <a:effectRef idx="0"/>
+          <a:fontRef idx="minor"/>
+        </p:style>
+      </p:sp>
+      <p:sp>
+        <p:nvSpPr>
+          <p:cNvPr id="87" name="CustomShape 2"/>
+          <p:cNvSpPr/>
+          <p:nvPr/>
+        </p:nvSpPr>
+        <p:spPr>
+          <a:xfrm>
+            <a:off x="838080" y="1825560"/>
+            <a:ext cx="10511640" cy="4347360"/>
+          </a:xfrm>
+          <a:prstGeom prst="rect">
+            <a:avLst/>
+          </a:prstGeom>
+          <a:noFill/>
+          <a:ln>
+            <a:noFill/>
+          </a:ln>
+        </p:spPr>
+        <p:style>
+          <a:lnRef idx="0"/>
+          <a:fillRef idx="0"/>
+          <a:effectRef idx="0"/>
+          <a:fontRef idx="minor"/>
+        </p:style>
+        <p:txBody>
+          <a:bodyPr lIns="90000" rIns="90000" tIns="45000" bIns="45000"/>
+          <a:p>
+            <a:pPr marL="228600" indent="-224640">
+              <a:lnSpc>
+                <a:spcPct val="90000"/>
+              </a:lnSpc>
+              <a:buClr>
+                <a:srgbClr val="000000"/>
+              </a:buClr>
+              <a:buFont typeface="Arial"/>
+              <a:buChar char="•"/>
+            </a:pPr>
+            <a:r>
+              <a:rPr b="0" lang="en-US" sz="2800" spc="-1" strike="noStrike">
+                <a:solidFill>
+                  <a:srgbClr val="000000"/>
+                </a:solidFill>
+                <a:uFill>
+                  <a:solidFill>
+                    <a:srgbClr val="ffffff"/>
+                  </a:solidFill>
+                </a:uFill>
+                <a:latin typeface="Calibri"/>
+                <a:ea typeface="DejaVu Sans"/>
+              </a:rPr>
+              <a:t>Financial code 00-000-0000</a:t>
+            </a:r>
+            <a:endParaRPr b="0" lang="en-US" sz="2800" spc="-1" strike="noStrike">
+              <a:solidFill>
+                <a:srgbClr val="000000"/>
+              </a:solidFill>
+              <a:uFill>
+                <a:solidFill>
+                  <a:srgbClr val="ffffff"/>
+                </a:solidFill>
+              </a:uFill>
+              <a:latin typeface="Arial"/>
+            </a:endParaRPr>
+          </a:p>
+        </p:txBody>
+      </p:sp>
+    </p:spTree>
+  </p:cSld>
+  <p:timing>
+    <p:tnLst>
+      <p:par>
+        <p:cTn id="13" dur="indefinite" restart="never" nodeType="tmRoot">
+          <p:childTnLst>
+            <p:seq>
+              <p:cTn id="14" nodeType="mainSeq"/>
+              <p:prevCondLst>
+                <p:cond delay="0" evt="onPrev">
+                  <p:tgtEl>
+                    <p:sldTgt/>
+                  </p:tgtEl>
+                </p:cond>
+              </p:prevCondLst>
+              <p:nextCondLst>
+                <p:cond delay="0" evt="onNext">
+                  <p:tgtEl>
+                    <p:sldTgt/>
+                  </p:tgtEl>
+                </p:cond>
+              </p:nextCondLst>
+            </p:seq>
+          </p:childTnLst>
+        </p:cTn>
+      </p:par>
+    </p:tnLst>
+  </p:timing>
+</p:sld>
+</file>
+
+<file path=ppt/slides/slide8.xml><?xml version="1.0" encoding="utf-8"?>
+<p:sld xmlns:a="http://schemas.openxmlformats.org/drawingml/2006/main" xmlns:p="http://schemas.openxmlformats.org/presentationml/2006/main" xmlns:r="http://schemas.openxmlformats.org/officeDocument/2006/relationships" xmlns:p14="http://schemas.microsoft.com/office/powerpoint/2010/main" xmlns:p15="http://schemas.microsoft.com/office/powerpoint/2012/main" xmlns:mc="http://schemas.openxmlformats.org/markup-compatibility/2006">
+  <p:cSld>
+    <p:spTree>
+      <p:nvGrpSpPr>
+        <p:cNvPr id="1" name=""/>
+        <p:cNvGrpSpPr/>
+        <p:nvPr/>
+      </p:nvGrpSpPr>
+      <p:grpSpPr>
+        <a:xfrm>
+          <a:off x="0" y="0"/>
+          <a:ext cx="0" cy="0"/>
+          <a:chOff x="0" y="0"/>
+          <a:chExt cx="0" cy="0"/>
+        </a:xfrm>
+      </p:grpSpPr>
+      <p:sp>
+        <p:nvSpPr>
+          <p:cNvPr id="88" name="CustomShape 1"/>
+          <p:cNvSpPr/>
+          <p:nvPr/>
+        </p:nvSpPr>
+        <p:spPr>
+          <a:xfrm>
+            <a:off x="838080" y="365040"/>
+            <a:ext cx="10511640" cy="1321560"/>
           </a:xfrm>
           <a:prstGeom prst="rect">
             <a:avLst/>
@@ -4629,30 +5267,30 @@
               </a:rPr>
               <a:t>End</a:t>
             </a:r>
-            <a:endParaRPr b="0" lang="en-US" sz="1800" spc="-1" strike="noStrike">
-              <a:solidFill>
-                <a:srgbClr val="000000"/>
-              </a:solidFill>
-              <a:uFill>
-                <a:solidFill>
-                  <a:srgbClr val="ffffff"/>
-                </a:solidFill>
-              </a:uFill>
-              <a:latin typeface="Arial"/>
-            </a:endParaRPr>
-          </a:p>
-        </p:txBody>
-      </p:sp>
-      <p:sp>
-        <p:nvSpPr>
-          <p:cNvPr id="81" name="CustomShape 2"/>
+            <a:endParaRPr b="0" lang="en-US" sz="4400" spc="-1" strike="noStrike">
+              <a:solidFill>
+                <a:srgbClr val="000000"/>
+              </a:solidFill>
+              <a:uFill>
+                <a:solidFill>
+                  <a:srgbClr val="ffffff"/>
+                </a:solidFill>
+              </a:uFill>
+              <a:latin typeface="Arial"/>
+            </a:endParaRPr>
+          </a:p>
+        </p:txBody>
+      </p:sp>
+      <p:sp>
+        <p:nvSpPr>
+          <p:cNvPr id="89" name="CustomShape 2"/>
           <p:cNvSpPr/>
           <p:nvPr/>
         </p:nvSpPr>
         <p:spPr>
           <a:xfrm>
             <a:off x="838080" y="1825560"/>
-            <a:ext cx="10513800" cy="4349520"/>
+            <a:ext cx="10511640" cy="4347360"/>
           </a:xfrm>
           <a:prstGeom prst="rect">
             <a:avLst/>
@@ -4671,7 +5309,7 @@
         <p:txBody>
           <a:bodyPr lIns="90000" rIns="90000" tIns="45000" bIns="45000"/>
           <a:p>
-            <a:pPr marL="228600" indent="-226800">
+            <a:pPr marL="228600" indent="-224640">
               <a:lnSpc>
                 <a:spcPct val="90000"/>
               </a:lnSpc>
@@ -4694,9 +5332,9 @@
                 <a:latin typeface="Calibri"/>
                 <a:ea typeface="DejaVu Sans"/>
               </a:rPr>
-              <a:t>End slide test text</a:t>
+              <a:t>End slide test text 01/01/2011</a:t>
             </a:r>
-            <a:endParaRPr b="0" lang="en-US" sz="1800" spc="-1" strike="noStrike">
+            <a:endParaRPr b="0" lang="en-US" sz="2800" spc="-1" strike="noStrike">
               <a:solidFill>
                 <a:srgbClr val="000000"/>
               </a:solidFill>
@@ -4715,10 +5353,10 @@
   <p:timing>
     <p:tnLst>
       <p:par>
-        <p:cTn id="9" dur="indefinite" restart="never" nodeType="tmRoot">
+        <p:cTn id="15" dur="indefinite" restart="never" nodeType="tmRoot">
           <p:childTnLst>
             <p:seq>
-              <p:cTn id="10" nodeType="mainSeq"/>
+              <p:cTn id="16" nodeType="mainSeq"/>
               <p:prevCondLst>
                 <p:cond delay="0" evt="onPrev">
                   <p:tgtEl>

</xml_diff>

<commit_message>
Updated metadata format, included mpf detection errors, added new test case.
</commit_message>
<xml_diff>
--- a/java/TikaTextDetection/test/data/Testing TIKA DETECTION.pptx
+++ b/java/TikaTextDetection/test/data/Testing TIKA DETECTION.pptx
@@ -14,6 +14,7 @@
     <p:sldId id="261" r:id="rId9"/>
     <p:sldId id="262" r:id="rId10"/>
     <p:sldId id="263" r:id="rId11"/>
+    <p:sldId id="264" r:id="rId12"/>
   </p:sldIdLst>
   <p:sldSz cx="12192000" cy="6858000"/>
   <p:notesSz cx="7772400" cy="10058400"/>
@@ -3319,7 +3320,21 @@
                 </a:uFill>
                 <a:latin typeface="Arial"/>
               </a:rPr>
-              <a:t>Click to edit the title text format</a:t>
+              <a:t>Click to edit the </a:t>
+            </a:r>
+            <a:r>
+              <a:rPr b="0" lang="en-US" sz="4400" spc="-1" strike="noStrike">
+                <a:solidFill>
+                  <a:srgbClr val="000000"/>
+                </a:solidFill>
+                <a:uFill>
+                  <a:solidFill>
+                    <a:srgbClr val="ffffff"/>
+                  </a:solidFill>
+                </a:uFill>
+                <a:latin typeface="Arial"/>
+              </a:rPr>
+              <a:t>title text format</a:t>
             </a:r>
             <a:endParaRPr b="0" lang="en-US" sz="4400" spc="-1" strike="noStrike">
               <a:solidFill>
@@ -4058,7 +4073,7 @@
         <p:spPr>
           <a:xfrm>
             <a:off x="1523880" y="1122480"/>
-            <a:ext cx="9140040" cy="2383560"/>
+            <a:ext cx="9139680" cy="2383200"/>
           </a:xfrm>
           <a:prstGeom prst="rect">
             <a:avLst/>
@@ -4120,7 +4135,7 @@
         <p:spPr>
           <a:xfrm>
             <a:off x="1523880" y="3602160"/>
-            <a:ext cx="9140040" cy="1651680"/>
+            <a:ext cx="9139680" cy="1651320"/>
           </a:xfrm>
           <a:prstGeom prst="rect">
             <a:avLst/>
@@ -4231,7 +4246,7 @@
         <p:spPr>
           <a:xfrm>
             <a:off x="838080" y="365040"/>
-            <a:ext cx="10511640" cy="1321560"/>
+            <a:ext cx="10511280" cy="1321200"/>
           </a:xfrm>
           <a:prstGeom prst="rect">
             <a:avLst/>
@@ -4293,7 +4308,7 @@
         <p:spPr>
           <a:xfrm>
             <a:off x="838080" y="1825560"/>
-            <a:ext cx="10511640" cy="4347360"/>
+            <a:ext cx="10511280" cy="4347000"/>
           </a:xfrm>
           <a:prstGeom prst="rect">
             <a:avLst/>
@@ -4575,7 +4590,7 @@
         <p:spPr>
           <a:xfrm>
             <a:off x="838080" y="365040"/>
-            <a:ext cx="10511640" cy="1321560"/>
+            <a:ext cx="10511280" cy="1321200"/>
           </a:xfrm>
           <a:prstGeom prst="rect">
             <a:avLst/>
@@ -4637,7 +4652,7 @@
         <p:spPr>
           <a:xfrm>
             <a:off x="838080" y="1825560"/>
-            <a:ext cx="10511640" cy="4347360"/>
+            <a:ext cx="10511280" cy="4347000"/>
           </a:xfrm>
           <a:prstGeom prst="rect">
             <a:avLst/>
@@ -4656,7 +4671,7 @@
         <p:txBody>
           <a:bodyPr lIns="90000" rIns="90000" tIns="45000" bIns="45000"/>
           <a:p>
-            <a:pPr marL="228600" indent="-224640">
+            <a:pPr marL="228600" indent="-224280">
               <a:lnSpc>
                 <a:spcPct val="90000"/>
               </a:lnSpc>
@@ -4753,7 +4768,7 @@
         <p:spPr>
           <a:xfrm>
             <a:off x="838080" y="365040"/>
-            <a:ext cx="10511640" cy="1321560"/>
+            <a:ext cx="10511280" cy="1321200"/>
           </a:xfrm>
           <a:prstGeom prst="rect">
             <a:avLst/>
@@ -4779,7 +4794,7 @@
         <p:spPr>
           <a:xfrm>
             <a:off x="838080" y="1825560"/>
-            <a:ext cx="10511640" cy="4347360"/>
+            <a:ext cx="10511280" cy="4347000"/>
           </a:xfrm>
           <a:prstGeom prst="rect">
             <a:avLst/>
@@ -4798,7 +4813,7 @@
         <p:txBody>
           <a:bodyPr lIns="90000" rIns="90000" tIns="45000" bIns="45000"/>
           <a:p>
-            <a:pPr marL="228600" indent="-224640">
+            <a:pPr marL="228600" indent="-224280">
               <a:lnSpc>
                 <a:spcPct val="90000"/>
               </a:lnSpc>
@@ -4944,7 +4959,7 @@
         <p:spPr>
           <a:xfrm>
             <a:off x="838080" y="365040"/>
-            <a:ext cx="10511640" cy="1321560"/>
+            <a:ext cx="10511280" cy="1321200"/>
           </a:xfrm>
           <a:prstGeom prst="rect">
             <a:avLst/>
@@ -4970,7 +4985,7 @@
         <p:spPr>
           <a:xfrm>
             <a:off x="838080" y="1825560"/>
-            <a:ext cx="10511640" cy="4347360"/>
+            <a:ext cx="10511280" cy="4347000"/>
           </a:xfrm>
           <a:prstGeom prst="rect">
             <a:avLst/>
@@ -4989,7 +5004,7 @@
         <p:txBody>
           <a:bodyPr lIns="90000" rIns="90000" tIns="45000" bIns="45000"/>
           <a:p>
-            <a:pPr marL="228600" indent="-224640">
+            <a:pPr marL="228600" indent="-224280">
               <a:lnSpc>
                 <a:spcPct val="90000"/>
               </a:lnSpc>
@@ -5086,7 +5101,7 @@
         <p:spPr>
           <a:xfrm>
             <a:off x="838080" y="365040"/>
-            <a:ext cx="10511640" cy="1321560"/>
+            <a:ext cx="10511280" cy="1321200"/>
           </a:xfrm>
           <a:prstGeom prst="rect">
             <a:avLst/>
@@ -5112,7 +5127,7 @@
         <p:spPr>
           <a:xfrm>
             <a:off x="838080" y="1825560"/>
-            <a:ext cx="10511640" cy="4347360"/>
+            <a:ext cx="10511280" cy="4347000"/>
           </a:xfrm>
           <a:prstGeom prst="rect">
             <a:avLst/>
@@ -5131,7 +5146,7 @@
         <p:txBody>
           <a:bodyPr lIns="90000" rIns="90000" tIns="45000" bIns="45000"/>
           <a:p>
-            <a:pPr marL="228600" indent="-224640">
+            <a:pPr marL="228600" indent="-224280">
               <a:lnSpc>
                 <a:spcPct val="90000"/>
               </a:lnSpc>
@@ -5228,7 +5243,187 @@
         <p:spPr>
           <a:xfrm>
             <a:off x="838080" y="365040"/>
-            <a:ext cx="10511640" cy="1321560"/>
+            <a:ext cx="10511280" cy="1321200"/>
+          </a:xfrm>
+          <a:prstGeom prst="rect">
+            <a:avLst/>
+          </a:prstGeom>
+          <a:noFill/>
+          <a:ln>
+            <a:noFill/>
+          </a:ln>
+        </p:spPr>
+        <p:style>
+          <a:lnRef idx="0"/>
+          <a:fillRef idx="0"/>
+          <a:effectRef idx="0"/>
+          <a:fontRef idx="minor"/>
+        </p:style>
+      </p:sp>
+      <p:sp>
+        <p:nvSpPr>
+          <p:cNvPr id="89" name="CustomShape 2"/>
+          <p:cNvSpPr/>
+          <p:nvPr/>
+        </p:nvSpPr>
+        <p:spPr>
+          <a:xfrm>
+            <a:off x="838080" y="1825560"/>
+            <a:ext cx="10511280" cy="4347000"/>
+          </a:xfrm>
+          <a:prstGeom prst="rect">
+            <a:avLst/>
+          </a:prstGeom>
+          <a:noFill/>
+          <a:ln>
+            <a:noFill/>
+          </a:ln>
+        </p:spPr>
+        <p:style>
+          <a:lnRef idx="0"/>
+          <a:fillRef idx="0"/>
+          <a:effectRef idx="0"/>
+          <a:fontRef idx="minor"/>
+        </p:style>
+        <p:txBody>
+          <a:bodyPr lIns="90000" rIns="90000" tIns="45000" bIns="45000"/>
+          <a:p>
+            <a:pPr marL="228600" indent="-224280">
+              <a:lnSpc>
+                <a:spcPct val="90000"/>
+              </a:lnSpc>
+              <a:buClr>
+                <a:srgbClr val="000000"/>
+              </a:buClr>
+              <a:buFont typeface="Arial"/>
+              <a:buChar char="•"/>
+            </a:pPr>
+            <a:r>
+              <a:rPr b="0" lang="en-US" sz="2800" spc="-1" strike="noStrike">
+                <a:solidFill>
+                  <a:srgbClr val="000000"/>
+                </a:solidFill>
+                <a:uFill>
+                  <a:solidFill>
+                    <a:srgbClr val="ffffff"/>
+                  </a:solidFill>
+                </a:uFill>
+                <a:latin typeface="Calibri"/>
+                <a:ea typeface="DejaVu Sans"/>
+              </a:rPr>
+              <a:t>Bus ATM</a:t>
+            </a:r>
+            <a:endParaRPr b="0" lang="en-US" sz="2800" spc="-1" strike="noStrike">
+              <a:solidFill>
+                <a:srgbClr val="000000"/>
+              </a:solidFill>
+              <a:uFill>
+                <a:solidFill>
+                  <a:srgbClr val="ffffff"/>
+                </a:solidFill>
+              </a:uFill>
+              <a:latin typeface="Arial"/>
+            </a:endParaRPr>
+          </a:p>
+          <a:p>
+            <a:pPr marL="228600" indent="-224280">
+              <a:lnSpc>
+                <a:spcPct val="90000"/>
+              </a:lnSpc>
+              <a:buClr>
+                <a:srgbClr val="000000"/>
+              </a:buClr>
+              <a:buFont typeface="Arial"/>
+              <a:buChar char="•"/>
+            </a:pPr>
+            <a:r>
+              <a:rPr b="0" lang="en-US" sz="2800" spc="-1" strike="noStrike">
+                <a:solidFill>
+                  <a:srgbClr val="000000"/>
+                </a:solidFill>
+                <a:uFill>
+                  <a:solidFill>
+                    <a:srgbClr val="ffffff"/>
+                  </a:solidFill>
+                </a:uFill>
+                <a:latin typeface="Calibri"/>
+                <a:ea typeface="DejaVu Sans"/>
+              </a:rPr>
+              <a:t>Finance code 102-123-1231</a:t>
+            </a:r>
+            <a:endParaRPr b="0" lang="en-US" sz="2800" spc="-1" strike="noStrike">
+              <a:solidFill>
+                <a:srgbClr val="000000"/>
+              </a:solidFill>
+              <a:uFill>
+                <a:solidFill>
+                  <a:srgbClr val="ffffff"/>
+                </a:solidFill>
+              </a:uFill>
+              <a:latin typeface="Arial"/>
+            </a:endParaRPr>
+          </a:p>
+        </p:txBody>
+      </p:sp>
+    </p:spTree>
+  </p:cSld>
+  <p:timing>
+    <p:tnLst>
+      <p:par>
+        <p:cTn id="15" dur="indefinite" restart="never" nodeType="tmRoot">
+          <p:childTnLst>
+            <p:seq>
+              <p:cTn id="16" nodeType="mainSeq"/>
+              <p:prevCondLst>
+                <p:cond delay="0" evt="onPrev">
+                  <p:tgtEl>
+                    <p:sldTgt/>
+                  </p:tgtEl>
+                </p:cond>
+              </p:prevCondLst>
+              <p:nextCondLst>
+                <p:cond delay="0" evt="onNext">
+                  <p:tgtEl>
+                    <p:sldTgt/>
+                  </p:tgtEl>
+                </p:cond>
+              </p:nextCondLst>
+            </p:seq>
+          </p:childTnLst>
+        </p:cTn>
+      </p:par>
+    </p:tnLst>
+  </p:timing>
+</p:sld>
+</file>
+
+<file path=ppt/slides/slide9.xml><?xml version="1.0" encoding="utf-8"?>
+<p:sld xmlns:a="http://schemas.openxmlformats.org/drawingml/2006/main" xmlns:p="http://schemas.openxmlformats.org/presentationml/2006/main" xmlns:r="http://schemas.openxmlformats.org/officeDocument/2006/relationships" xmlns:p14="http://schemas.microsoft.com/office/powerpoint/2010/main" xmlns:p15="http://schemas.microsoft.com/office/powerpoint/2012/main" xmlns:mc="http://schemas.openxmlformats.org/markup-compatibility/2006">
+  <p:cSld>
+    <p:spTree>
+      <p:nvGrpSpPr>
+        <p:cNvPr id="1" name=""/>
+        <p:cNvGrpSpPr/>
+        <p:nvPr/>
+      </p:nvGrpSpPr>
+      <p:grpSpPr>
+        <a:xfrm>
+          <a:off x="0" y="0"/>
+          <a:ext cx="0" cy="0"/>
+          <a:chOff x="0" y="0"/>
+          <a:chExt cx="0" cy="0"/>
+        </a:xfrm>
+      </p:grpSpPr>
+      <p:sp>
+        <p:nvSpPr>
+          <p:cNvPr id="90" name="CustomShape 1"/>
+          <p:cNvSpPr/>
+          <p:nvPr/>
+        </p:nvSpPr>
+        <p:spPr>
+          <a:xfrm>
+            <a:off x="838080" y="365040"/>
+            <a:ext cx="10511280" cy="1321200"/>
           </a:xfrm>
           <a:prstGeom prst="rect">
             <a:avLst/>
@@ -5283,14 +5478,14 @@
       </p:sp>
       <p:sp>
         <p:nvSpPr>
-          <p:cNvPr id="89" name="CustomShape 2"/>
+          <p:cNvPr id="91" name="CustomShape 2"/>
           <p:cNvSpPr/>
           <p:nvPr/>
         </p:nvSpPr>
         <p:spPr>
           <a:xfrm>
             <a:off x="838080" y="1825560"/>
-            <a:ext cx="10511640" cy="4347360"/>
+            <a:ext cx="10511280" cy="4347000"/>
           </a:xfrm>
           <a:prstGeom prst="rect">
             <a:avLst/>
@@ -5309,7 +5504,7 @@
         <p:txBody>
           <a:bodyPr lIns="90000" rIns="90000" tIns="45000" bIns="45000"/>
           <a:p>
-            <a:pPr marL="228600" indent="-224640">
+            <a:pPr marL="228600" indent="-224280">
               <a:lnSpc>
                 <a:spcPct val="90000"/>
               </a:lnSpc>
@@ -5353,10 +5548,10 @@
   <p:timing>
     <p:tnLst>
       <p:par>
-        <p:cTn id="15" dur="indefinite" restart="never" nodeType="tmRoot">
+        <p:cTn id="17" dur="indefinite" restart="never" nodeType="tmRoot">
           <p:childTnLst>
             <p:seq>
-              <p:cTn id="16" nodeType="mainSeq"/>
+              <p:cTn id="18" nodeType="mainSeq"/>
               <p:prevCondLst>
                 <p:cond delay="0" evt="onPrev">
                   <p:tgtEl>

</xml_diff>

<commit_message>
Updating Tika Component to follow Tesseract trigger words and regex tagging behavior.
</commit_message>
<xml_diff>
--- a/java/TikaTextDetection/test/data/Testing TIKA DETECTION.pptx
+++ b/java/TikaTextDetection/test/data/Testing TIKA DETECTION.pptx
@@ -15,6 +15,7 @@
     <p:sldId id="262" r:id="rId10"/>
     <p:sldId id="263" r:id="rId11"/>
     <p:sldId id="264" r:id="rId12"/>
+    <p:sldId id="265" r:id="rId13"/>
   </p:sldIdLst>
   <p:sldSz cx="12192000" cy="6858000"/>
   <p:notesSz cx="7772400" cy="10058400"/>
@@ -3320,21 +3321,7 @@
                 </a:uFill>
                 <a:latin typeface="Arial"/>
               </a:rPr>
-              <a:t>Click to edit the </a:t>
-            </a:r>
-            <a:r>
-              <a:rPr b="0" lang="en-US" sz="4400" spc="-1" strike="noStrike">
-                <a:solidFill>
-                  <a:srgbClr val="000000"/>
-                </a:solidFill>
-                <a:uFill>
-                  <a:solidFill>
-                    <a:srgbClr val="ffffff"/>
-                  </a:solidFill>
-                </a:uFill>
-                <a:latin typeface="Arial"/>
-              </a:rPr>
-              <a:t>title text format</a:t>
+              <a:t>Click to edit the title text format</a:t>
             </a:r>
             <a:endParaRPr b="0" lang="en-US" sz="4400" spc="-1" strike="noStrike">
               <a:solidFill>
@@ -4073,7 +4060,7 @@
         <p:spPr>
           <a:xfrm>
             <a:off x="1523880" y="1122480"/>
-            <a:ext cx="9139680" cy="2383200"/>
+            <a:ext cx="9138960" cy="2382480"/>
           </a:xfrm>
           <a:prstGeom prst="rect">
             <a:avLst/>
@@ -4135,7 +4122,7 @@
         <p:spPr>
           <a:xfrm>
             <a:off x="1523880" y="3602160"/>
-            <a:ext cx="9139680" cy="1651320"/>
+            <a:ext cx="9138960" cy="1650600"/>
           </a:xfrm>
           <a:prstGeom prst="rect">
             <a:avLst/>
@@ -4197,6 +4184,184 @@
           <p:childTnLst>
             <p:seq>
               <p:cTn id="2" nodeType="mainSeq"/>
+              <p:prevCondLst>
+                <p:cond delay="0" evt="onPrev">
+                  <p:tgtEl>
+                    <p:sldTgt/>
+                  </p:tgtEl>
+                </p:cond>
+              </p:prevCondLst>
+              <p:nextCondLst>
+                <p:cond delay="0" evt="onNext">
+                  <p:tgtEl>
+                    <p:sldTgt/>
+                  </p:tgtEl>
+                </p:cond>
+              </p:nextCondLst>
+            </p:seq>
+          </p:childTnLst>
+        </p:cTn>
+      </p:par>
+    </p:tnLst>
+  </p:timing>
+</p:sld>
+</file>
+
+<file path=ppt/slides/slide10.xml><?xml version="1.0" encoding="utf-8"?>
+<p:sld xmlns:a="http://schemas.openxmlformats.org/drawingml/2006/main" xmlns:p="http://schemas.openxmlformats.org/presentationml/2006/main" xmlns:r="http://schemas.openxmlformats.org/officeDocument/2006/relationships" xmlns:p14="http://schemas.microsoft.com/office/powerpoint/2010/main" xmlns:p15="http://schemas.microsoft.com/office/powerpoint/2012/main" xmlns:mc="http://schemas.openxmlformats.org/markup-compatibility/2006">
+  <p:cSld>
+    <p:spTree>
+      <p:nvGrpSpPr>
+        <p:cNvPr id="1" name=""/>
+        <p:cNvGrpSpPr/>
+        <p:nvPr/>
+      </p:nvGrpSpPr>
+      <p:grpSpPr>
+        <a:xfrm>
+          <a:off x="0" y="0"/>
+          <a:ext cx="0" cy="0"/>
+          <a:chOff x="0" y="0"/>
+          <a:chExt cx="0" cy="0"/>
+        </a:xfrm>
+      </p:grpSpPr>
+      <p:sp>
+        <p:nvSpPr>
+          <p:cNvPr id="92" name="CustomShape 1"/>
+          <p:cNvSpPr/>
+          <p:nvPr/>
+        </p:nvSpPr>
+        <p:spPr>
+          <a:xfrm>
+            <a:off x="838080" y="365040"/>
+            <a:ext cx="10510560" cy="1320480"/>
+          </a:xfrm>
+          <a:prstGeom prst="rect">
+            <a:avLst/>
+          </a:prstGeom>
+          <a:noFill/>
+          <a:ln>
+            <a:noFill/>
+          </a:ln>
+        </p:spPr>
+        <p:style>
+          <a:lnRef idx="0"/>
+          <a:fillRef idx="0"/>
+          <a:effectRef idx="0"/>
+          <a:fontRef idx="minor"/>
+        </p:style>
+        <p:txBody>
+          <a:bodyPr lIns="90000" rIns="90000" tIns="45000" bIns="45000" anchor="ctr"/>
+          <a:p>
+            <a:pPr>
+              <a:lnSpc>
+                <a:spcPct val="90000"/>
+              </a:lnSpc>
+            </a:pPr>
+            <a:r>
+              <a:rPr b="0" lang="en-US" sz="4400" spc="-1" strike="noStrike">
+                <a:solidFill>
+                  <a:srgbClr val="000000"/>
+                </a:solidFill>
+                <a:uFill>
+                  <a:solidFill>
+                    <a:srgbClr val="ffffff"/>
+                  </a:solidFill>
+                </a:uFill>
+                <a:latin typeface="Calibri Light"/>
+                <a:ea typeface="DejaVu Sans"/>
+              </a:rPr>
+              <a:t>End</a:t>
+            </a:r>
+            <a:endParaRPr b="0" lang="en-US" sz="4400" spc="-1" strike="noStrike">
+              <a:solidFill>
+                <a:srgbClr val="000000"/>
+              </a:solidFill>
+              <a:uFill>
+                <a:solidFill>
+                  <a:srgbClr val="ffffff"/>
+                </a:solidFill>
+              </a:uFill>
+              <a:latin typeface="Arial"/>
+            </a:endParaRPr>
+          </a:p>
+        </p:txBody>
+      </p:sp>
+      <p:sp>
+        <p:nvSpPr>
+          <p:cNvPr id="93" name="CustomShape 2"/>
+          <p:cNvSpPr/>
+          <p:nvPr/>
+        </p:nvSpPr>
+        <p:spPr>
+          <a:xfrm>
+            <a:off x="838080" y="1825560"/>
+            <a:ext cx="10510560" cy="4346280"/>
+          </a:xfrm>
+          <a:prstGeom prst="rect">
+            <a:avLst/>
+          </a:prstGeom>
+          <a:noFill/>
+          <a:ln>
+            <a:noFill/>
+          </a:ln>
+        </p:spPr>
+        <p:style>
+          <a:lnRef idx="0"/>
+          <a:fillRef idx="0"/>
+          <a:effectRef idx="0"/>
+          <a:fontRef idx="minor"/>
+        </p:style>
+        <p:txBody>
+          <a:bodyPr lIns="90000" rIns="90000" tIns="45000" bIns="45000"/>
+          <a:p>
+            <a:pPr marL="228600" indent="-223560">
+              <a:lnSpc>
+                <a:spcPct val="90000"/>
+              </a:lnSpc>
+              <a:buClr>
+                <a:srgbClr val="000000"/>
+              </a:buClr>
+              <a:buFont typeface="Arial"/>
+              <a:buChar char="•"/>
+            </a:pPr>
+            <a:r>
+              <a:rPr b="0" lang="en-US" sz="2800" spc="-1" strike="noStrike">
+                <a:solidFill>
+                  <a:srgbClr val="000000"/>
+                </a:solidFill>
+                <a:uFill>
+                  <a:solidFill>
+                    <a:srgbClr val="ffffff"/>
+                  </a:solidFill>
+                </a:uFill>
+                <a:latin typeface="Calibri"/>
+                <a:ea typeface="DejaVu Sans"/>
+              </a:rPr>
+              <a:t>End slide test text 01/01/2011</a:t>
+            </a:r>
+            <a:endParaRPr b="0" lang="en-US" sz="2800" spc="-1" strike="noStrike">
+              <a:solidFill>
+                <a:srgbClr val="000000"/>
+              </a:solidFill>
+              <a:uFill>
+                <a:solidFill>
+                  <a:srgbClr val="ffffff"/>
+                </a:solidFill>
+              </a:uFill>
+              <a:latin typeface="Arial"/>
+            </a:endParaRPr>
+          </a:p>
+        </p:txBody>
+      </p:sp>
+    </p:spTree>
+  </p:cSld>
+  <p:timing>
+    <p:tnLst>
+      <p:par>
+        <p:cTn id="19" dur="indefinite" restart="never" nodeType="tmRoot">
+          <p:childTnLst>
+            <p:seq>
+              <p:cTn id="20" nodeType="mainSeq"/>
               <p:prevCondLst>
                 <p:cond delay="0" evt="onPrev">
                   <p:tgtEl>
@@ -4246,7 +4411,7 @@
         <p:spPr>
           <a:xfrm>
             <a:off x="838080" y="365040"/>
-            <a:ext cx="10511280" cy="1321200"/>
+            <a:ext cx="10510560" cy="1320480"/>
           </a:xfrm>
           <a:prstGeom prst="rect">
             <a:avLst/>
@@ -4308,7 +4473,7 @@
         <p:spPr>
           <a:xfrm>
             <a:off x="838080" y="1825560"/>
-            <a:ext cx="10511280" cy="4347000"/>
+            <a:ext cx="10510560" cy="4346280"/>
           </a:xfrm>
           <a:prstGeom prst="rect">
             <a:avLst/>
@@ -4590,7 +4755,7 @@
         <p:spPr>
           <a:xfrm>
             <a:off x="838080" y="365040"/>
-            <a:ext cx="10511280" cy="1321200"/>
+            <a:ext cx="10510560" cy="1320480"/>
           </a:xfrm>
           <a:prstGeom prst="rect">
             <a:avLst/>
@@ -4652,7 +4817,7 @@
         <p:spPr>
           <a:xfrm>
             <a:off x="838080" y="1825560"/>
-            <a:ext cx="10511280" cy="4347000"/>
+            <a:ext cx="10510560" cy="4346280"/>
           </a:xfrm>
           <a:prstGeom prst="rect">
             <a:avLst/>
@@ -4671,7 +4836,7 @@
         <p:txBody>
           <a:bodyPr lIns="90000" rIns="90000" tIns="45000" bIns="45000"/>
           <a:p>
-            <a:pPr marL="228600" indent="-224280">
+            <a:pPr marL="228600" indent="-223560">
               <a:lnSpc>
                 <a:spcPct val="90000"/>
               </a:lnSpc>
@@ -4768,7 +4933,7 @@
         <p:spPr>
           <a:xfrm>
             <a:off x="838080" y="365040"/>
-            <a:ext cx="10511280" cy="1321200"/>
+            <a:ext cx="10510560" cy="1320480"/>
           </a:xfrm>
           <a:prstGeom prst="rect">
             <a:avLst/>
@@ -4794,7 +4959,7 @@
         <p:spPr>
           <a:xfrm>
             <a:off x="838080" y="1825560"/>
-            <a:ext cx="10511280" cy="4347000"/>
+            <a:ext cx="10510560" cy="4346280"/>
           </a:xfrm>
           <a:prstGeom prst="rect">
             <a:avLst/>
@@ -4813,7 +4978,7 @@
         <p:txBody>
           <a:bodyPr lIns="90000" rIns="90000" tIns="45000" bIns="45000"/>
           <a:p>
-            <a:pPr marL="228600" indent="-224280">
+            <a:pPr marL="228600" indent="-223560">
               <a:lnSpc>
                 <a:spcPct val="90000"/>
               </a:lnSpc>
@@ -4959,7 +5124,7 @@
         <p:spPr>
           <a:xfrm>
             <a:off x="838080" y="365040"/>
-            <a:ext cx="10511280" cy="1321200"/>
+            <a:ext cx="10510560" cy="1320480"/>
           </a:xfrm>
           <a:prstGeom prst="rect">
             <a:avLst/>
@@ -4985,7 +5150,7 @@
         <p:spPr>
           <a:xfrm>
             <a:off x="838080" y="1825560"/>
-            <a:ext cx="10511280" cy="4347000"/>
+            <a:ext cx="10510560" cy="4346280"/>
           </a:xfrm>
           <a:prstGeom prst="rect">
             <a:avLst/>
@@ -5004,7 +5169,7 @@
         <p:txBody>
           <a:bodyPr lIns="90000" rIns="90000" tIns="45000" bIns="45000"/>
           <a:p>
-            <a:pPr marL="228600" indent="-224280">
+            <a:pPr marL="228600" indent="-223560">
               <a:lnSpc>
                 <a:spcPct val="90000"/>
               </a:lnSpc>
@@ -5101,7 +5266,7 @@
         <p:spPr>
           <a:xfrm>
             <a:off x="838080" y="365040"/>
-            <a:ext cx="10511280" cy="1321200"/>
+            <a:ext cx="10510560" cy="1320480"/>
           </a:xfrm>
           <a:prstGeom prst="rect">
             <a:avLst/>
@@ -5127,7 +5292,7 @@
         <p:spPr>
           <a:xfrm>
             <a:off x="838080" y="1825560"/>
-            <a:ext cx="10511280" cy="4347000"/>
+            <a:ext cx="10510560" cy="4346280"/>
           </a:xfrm>
           <a:prstGeom prst="rect">
             <a:avLst/>
@@ -5146,7 +5311,7 @@
         <p:txBody>
           <a:bodyPr lIns="90000" rIns="90000" tIns="45000" bIns="45000"/>
           <a:p>
-            <a:pPr marL="228600" indent="-224280">
+            <a:pPr marL="228600" indent="-223560">
               <a:lnSpc>
                 <a:spcPct val="90000"/>
               </a:lnSpc>
@@ -5243,7 +5408,7 @@
         <p:spPr>
           <a:xfrm>
             <a:off x="838080" y="365040"/>
-            <a:ext cx="10511280" cy="1321200"/>
+            <a:ext cx="10510560" cy="1320480"/>
           </a:xfrm>
           <a:prstGeom prst="rect">
             <a:avLst/>
@@ -5269,7 +5434,7 @@
         <p:spPr>
           <a:xfrm>
             <a:off x="838080" y="1825560"/>
-            <a:ext cx="10511280" cy="4347000"/>
+            <a:ext cx="10510560" cy="4346280"/>
           </a:xfrm>
           <a:prstGeom prst="rect">
             <a:avLst/>
@@ -5288,7 +5453,7 @@
         <p:txBody>
           <a:bodyPr lIns="90000" rIns="90000" tIns="45000" bIns="45000"/>
           <a:p>
-            <a:pPr marL="228600" indent="-224280">
+            <a:pPr marL="228600" indent="-223560">
               <a:lnSpc>
                 <a:spcPct val="90000"/>
               </a:lnSpc>
@@ -5326,7 +5491,7 @@
             </a:endParaRPr>
           </a:p>
           <a:p>
-            <a:pPr marL="228600" indent="-224280">
+            <a:pPr marL="228600" indent="-223560">
               <a:lnSpc>
                 <a:spcPct val="90000"/>
               </a:lnSpc>
@@ -5423,7 +5588,7 @@
         <p:spPr>
           <a:xfrm>
             <a:off x="838080" y="365040"/>
-            <a:ext cx="10511280" cy="1321200"/>
+            <a:ext cx="10510560" cy="1320480"/>
           </a:xfrm>
           <a:prstGeom prst="rect">
             <a:avLst/>
@@ -5460,7 +5625,7 @@
                 <a:latin typeface="Calibri Light"/>
                 <a:ea typeface="DejaVu Sans"/>
               </a:rPr>
-              <a:t>End</a:t>
+              <a:t>Delimiter</a:t>
             </a:r>
             <a:endParaRPr b="0" lang="en-US" sz="4400" spc="-1" strike="noStrike">
               <a:solidFill>
@@ -5485,7 +5650,7 @@
         <p:spPr>
           <a:xfrm>
             <a:off x="838080" y="1825560"/>
-            <a:ext cx="10511280" cy="4347000"/>
+            <a:ext cx="10510560" cy="4346280"/>
           </a:xfrm>
           <a:prstGeom prst="rect">
             <a:avLst/>
@@ -5504,16 +5669,6 @@
         <p:txBody>
           <a:bodyPr lIns="90000" rIns="90000" tIns="45000" bIns="45000"/>
           <a:p>
-            <a:pPr marL="228600" indent="-224280">
-              <a:lnSpc>
-                <a:spcPct val="90000"/>
-              </a:lnSpc>
-              <a:buClr>
-                <a:srgbClr val="000000"/>
-              </a:buClr>
-              <a:buFont typeface="Arial"/>
-              <a:buChar char="•"/>
-            </a:pPr>
             <a:r>
               <a:rPr b="0" lang="en-US" sz="2800" spc="-1" strike="noStrike">
                 <a:solidFill>
@@ -5527,7 +5682,7 @@
                 <a:latin typeface="Calibri"/>
                 <a:ea typeface="DejaVu Sans"/>
               </a:rPr>
-              <a:t>End slide test text 01/01/2011</a:t>
+              <a:t>"a[[]; []]b"</a:t>
             </a:r>
             <a:endParaRPr b="0" lang="en-US" sz="2800" spc="-1" strike="noStrike">
               <a:solidFill>

</xml_diff>

<commit_message>
Updated case-sensitive tagging. Added test cases and cleaned up variable names.
</commit_message>
<xml_diff>
--- a/java/TikaTextDetection/test/data/Testing TIKA DETECTION.pptx
+++ b/java/TikaTextDetection/test/data/Testing TIKA DETECTION.pptx
@@ -4060,7 +4060,7 @@
         <p:spPr>
           <a:xfrm>
             <a:off x="1523880" y="1122480"/>
-            <a:ext cx="9138960" cy="2382480"/>
+            <a:ext cx="9138600" cy="2382120"/>
           </a:xfrm>
           <a:prstGeom prst="rect">
             <a:avLst/>
@@ -4122,7 +4122,7 @@
         <p:spPr>
           <a:xfrm>
             <a:off x="1523880" y="3602160"/>
-            <a:ext cx="9138960" cy="1650600"/>
+            <a:ext cx="9138600" cy="1650240"/>
           </a:xfrm>
           <a:prstGeom prst="rect">
             <a:avLst/>
@@ -4233,7 +4233,7 @@
         <p:spPr>
           <a:xfrm>
             <a:off x="838080" y="365040"/>
-            <a:ext cx="10510560" cy="1320480"/>
+            <a:ext cx="10510200" cy="1320120"/>
           </a:xfrm>
           <a:prstGeom prst="rect">
             <a:avLst/>
@@ -4295,7 +4295,7 @@
         <p:spPr>
           <a:xfrm>
             <a:off x="838080" y="1825560"/>
-            <a:ext cx="10510560" cy="4346280"/>
+            <a:ext cx="10510200" cy="4345920"/>
           </a:xfrm>
           <a:prstGeom prst="rect">
             <a:avLst/>
@@ -4314,7 +4314,7 @@
         <p:txBody>
           <a:bodyPr lIns="90000" rIns="90000" tIns="45000" bIns="45000"/>
           <a:p>
-            <a:pPr marL="228600" indent="-223560">
+            <a:pPr marL="228600" indent="-223200">
               <a:lnSpc>
                 <a:spcPct val="90000"/>
               </a:lnSpc>
@@ -4411,7 +4411,7 @@
         <p:spPr>
           <a:xfrm>
             <a:off x="838080" y="365040"/>
-            <a:ext cx="10510560" cy="1320480"/>
+            <a:ext cx="10510200" cy="1320120"/>
           </a:xfrm>
           <a:prstGeom prst="rect">
             <a:avLst/>
@@ -4473,7 +4473,7 @@
         <p:spPr>
           <a:xfrm>
             <a:off x="838080" y="1825560"/>
-            <a:ext cx="10510560" cy="4346280"/>
+            <a:ext cx="10510200" cy="4345920"/>
           </a:xfrm>
           <a:prstGeom prst="rect">
             <a:avLst/>
@@ -4755,7 +4755,7 @@
         <p:spPr>
           <a:xfrm>
             <a:off x="838080" y="365040"/>
-            <a:ext cx="10510560" cy="1320480"/>
+            <a:ext cx="10510200" cy="1320120"/>
           </a:xfrm>
           <a:prstGeom prst="rect">
             <a:avLst/>
@@ -4817,7 +4817,7 @@
         <p:spPr>
           <a:xfrm>
             <a:off x="838080" y="1825560"/>
-            <a:ext cx="10510560" cy="4346280"/>
+            <a:ext cx="10510200" cy="4345920"/>
           </a:xfrm>
           <a:prstGeom prst="rect">
             <a:avLst/>
@@ -4836,7 +4836,7 @@
         <p:txBody>
           <a:bodyPr lIns="90000" rIns="90000" tIns="45000" bIns="45000"/>
           <a:p>
-            <a:pPr marL="228600" indent="-223560">
+            <a:pPr marL="228600" indent="-223200">
               <a:lnSpc>
                 <a:spcPct val="90000"/>
               </a:lnSpc>
@@ -4933,7 +4933,7 @@
         <p:spPr>
           <a:xfrm>
             <a:off x="838080" y="365040"/>
-            <a:ext cx="10510560" cy="1320480"/>
+            <a:ext cx="10510200" cy="1320120"/>
           </a:xfrm>
           <a:prstGeom prst="rect">
             <a:avLst/>
@@ -4959,7 +4959,7 @@
         <p:spPr>
           <a:xfrm>
             <a:off x="838080" y="1825560"/>
-            <a:ext cx="10510560" cy="4346280"/>
+            <a:ext cx="10510200" cy="4345920"/>
           </a:xfrm>
           <a:prstGeom prst="rect">
             <a:avLst/>
@@ -4978,7 +4978,7 @@
         <p:txBody>
           <a:bodyPr lIns="90000" rIns="90000" tIns="45000" bIns="45000"/>
           <a:p>
-            <a:pPr marL="228600" indent="-223560">
+            <a:pPr marL="228600" indent="-223200">
               <a:lnSpc>
                 <a:spcPct val="90000"/>
               </a:lnSpc>
@@ -5001,7 +5001,7 @@
                 <a:latin typeface="Calibri"/>
                 <a:ea typeface="DejaVu Sans"/>
               </a:rPr>
-              <a:t>An automobile races down the street.</a:t>
+              <a:t>An automobile with a bike races down the street followed by another automobile carrying bikes.</a:t>
             </a:r>
             <a:endParaRPr b="0" lang="en-US" sz="2800" spc="-1" strike="noStrike">
               <a:solidFill>
@@ -5124,7 +5124,7 @@
         <p:spPr>
           <a:xfrm>
             <a:off x="838080" y="365040"/>
-            <a:ext cx="10510560" cy="1320480"/>
+            <a:ext cx="10510200" cy="1320120"/>
           </a:xfrm>
           <a:prstGeom prst="rect">
             <a:avLst/>
@@ -5150,7 +5150,7 @@
         <p:spPr>
           <a:xfrm>
             <a:off x="838080" y="1825560"/>
-            <a:ext cx="10510560" cy="4346280"/>
+            <a:ext cx="10510200" cy="4345920"/>
           </a:xfrm>
           <a:prstGeom prst="rect">
             <a:avLst/>
@@ -5169,7 +5169,7 @@
         <p:txBody>
           <a:bodyPr lIns="90000" rIns="90000" tIns="45000" bIns="45000"/>
           <a:p>
-            <a:pPr marL="228600" indent="-223560">
+            <a:pPr marL="228600" indent="-223200">
               <a:lnSpc>
                 <a:spcPct val="90000"/>
               </a:lnSpc>
@@ -5266,7 +5266,7 @@
         <p:spPr>
           <a:xfrm>
             <a:off x="838080" y="365040"/>
-            <a:ext cx="10510560" cy="1320480"/>
+            <a:ext cx="10510200" cy="1320120"/>
           </a:xfrm>
           <a:prstGeom prst="rect">
             <a:avLst/>
@@ -5292,7 +5292,7 @@
         <p:spPr>
           <a:xfrm>
             <a:off x="838080" y="1825560"/>
-            <a:ext cx="10510560" cy="4346280"/>
+            <a:ext cx="10510200" cy="4345920"/>
           </a:xfrm>
           <a:prstGeom prst="rect">
             <a:avLst/>
@@ -5311,7 +5311,7 @@
         <p:txBody>
           <a:bodyPr lIns="90000" rIns="90000" tIns="45000" bIns="45000"/>
           <a:p>
-            <a:pPr marL="228600" indent="-223560">
+            <a:pPr marL="228600" indent="-223200">
               <a:lnSpc>
                 <a:spcPct val="90000"/>
               </a:lnSpc>
@@ -5408,7 +5408,7 @@
         <p:spPr>
           <a:xfrm>
             <a:off x="838080" y="365040"/>
-            <a:ext cx="10510560" cy="1320480"/>
+            <a:ext cx="10510200" cy="1320120"/>
           </a:xfrm>
           <a:prstGeom prst="rect">
             <a:avLst/>
@@ -5434,7 +5434,7 @@
         <p:spPr>
           <a:xfrm>
             <a:off x="838080" y="1825560"/>
-            <a:ext cx="10510560" cy="4346280"/>
+            <a:ext cx="10510200" cy="4345920"/>
           </a:xfrm>
           <a:prstGeom prst="rect">
             <a:avLst/>
@@ -5453,7 +5453,7 @@
         <p:txBody>
           <a:bodyPr lIns="90000" rIns="90000" tIns="45000" bIns="45000"/>
           <a:p>
-            <a:pPr marL="228600" indent="-223560">
+            <a:pPr marL="228600" indent="-223200">
               <a:lnSpc>
                 <a:spcPct val="90000"/>
               </a:lnSpc>
@@ -5491,7 +5491,7 @@
             </a:endParaRPr>
           </a:p>
           <a:p>
-            <a:pPr marL="228600" indent="-223560">
+            <a:pPr marL="228600" indent="-223200">
               <a:lnSpc>
                 <a:spcPct val="90000"/>
               </a:lnSpc>
@@ -5588,7 +5588,7 @@
         <p:spPr>
           <a:xfrm>
             <a:off x="838080" y="365040"/>
-            <a:ext cx="10510560" cy="1320480"/>
+            <a:ext cx="10510200" cy="1320120"/>
           </a:xfrm>
           <a:prstGeom prst="rect">
             <a:avLst/>
@@ -5650,7 +5650,7 @@
         <p:spPr>
           <a:xfrm>
             <a:off x="838080" y="1825560"/>
-            <a:ext cx="10510560" cy="4346280"/>
+            <a:ext cx="10510200" cy="4345920"/>
           </a:xfrm>
           <a:prstGeom prst="rect">
             <a:avLst/>

</xml_diff>

<commit_message>
Updated component to match JSON tag format update in Tesseract. Added new test cases for FULL_REGEX_SEARCH disabled.
</commit_message>
<xml_diff>
--- a/java/TikaTextDetection/test/data/Testing TIKA DETECTION.pptx
+++ b/java/TikaTextDetection/test/data/Testing TIKA DETECTION.pptx
@@ -16,6 +16,7 @@
     <p:sldId id="263" r:id="rId11"/>
     <p:sldId id="264" r:id="rId12"/>
     <p:sldId id="265" r:id="rId13"/>
+    <p:sldId id="266" r:id="rId14"/>
   </p:sldIdLst>
   <p:sldSz cx="12192000" cy="6858000"/>
   <p:notesSz cx="7772400" cy="10058400"/>
@@ -4060,7 +4061,7 @@
         <p:spPr>
           <a:xfrm>
             <a:off x="1523880" y="1122480"/>
-            <a:ext cx="9138600" cy="2382120"/>
+            <a:ext cx="9137520" cy="2381040"/>
           </a:xfrm>
           <a:prstGeom prst="rect">
             <a:avLst/>
@@ -4122,7 +4123,7 @@
         <p:spPr>
           <a:xfrm>
             <a:off x="1523880" y="3602160"/>
-            <a:ext cx="9138600" cy="1650240"/>
+            <a:ext cx="9137520" cy="1649160"/>
           </a:xfrm>
           <a:prstGeom prst="rect">
             <a:avLst/>
@@ -4233,7 +4234,272 @@
         <p:spPr>
           <a:xfrm>
             <a:off x="838080" y="365040"/>
-            <a:ext cx="10510200" cy="1320120"/>
+            <a:ext cx="10509120" cy="1319040"/>
+          </a:xfrm>
+          <a:prstGeom prst="rect">
+            <a:avLst/>
+          </a:prstGeom>
+          <a:noFill/>
+          <a:ln>
+            <a:noFill/>
+          </a:ln>
+        </p:spPr>
+        <p:style>
+          <a:lnRef idx="0"/>
+          <a:fillRef idx="0"/>
+          <a:effectRef idx="0"/>
+          <a:fontRef idx="minor"/>
+        </p:style>
+        <p:txBody>
+          <a:bodyPr lIns="90000" rIns="90000" tIns="45000" bIns="45000" anchor="ctr"/>
+          <a:p>
+            <a:pPr>
+              <a:lnSpc>
+                <a:spcPct val="90000"/>
+              </a:lnSpc>
+            </a:pPr>
+            <a:r>
+              <a:rPr b="0" lang="en-US" sz="4400" spc="-1" strike="noStrike">
+                <a:solidFill>
+                  <a:srgbClr val="000000"/>
+                </a:solidFill>
+                <a:uFill>
+                  <a:solidFill>
+                    <a:srgbClr val="ffffff"/>
+                  </a:solidFill>
+                </a:uFill>
+                <a:latin typeface="Calibri Light"/>
+                <a:ea typeface="DejaVu Sans"/>
+              </a:rPr>
+              <a:t>Phrase Test</a:t>
+            </a:r>
+            <a:endParaRPr b="0" lang="en-US" sz="4400" spc="-1" strike="noStrike">
+              <a:solidFill>
+                <a:srgbClr val="000000"/>
+              </a:solidFill>
+              <a:uFill>
+                <a:solidFill>
+                  <a:srgbClr val="ffffff"/>
+                </a:solidFill>
+              </a:uFill>
+              <a:latin typeface="Arial"/>
+            </a:endParaRPr>
+          </a:p>
+        </p:txBody>
+      </p:sp>
+      <p:sp>
+        <p:nvSpPr>
+          <p:cNvPr id="93" name="CustomShape 2"/>
+          <p:cNvSpPr/>
+          <p:nvPr/>
+        </p:nvSpPr>
+        <p:spPr>
+          <a:xfrm>
+            <a:off x="838080" y="1825560"/>
+            <a:ext cx="10509120" cy="4344840"/>
+          </a:xfrm>
+          <a:prstGeom prst="rect">
+            <a:avLst/>
+          </a:prstGeom>
+          <a:noFill/>
+          <a:ln>
+            <a:noFill/>
+          </a:ln>
+        </p:spPr>
+        <p:style>
+          <a:lnRef idx="0"/>
+          <a:fillRef idx="0"/>
+          <a:effectRef idx="0"/>
+          <a:fontRef idx="minor"/>
+        </p:style>
+        <p:txBody>
+          <a:bodyPr lIns="90000" rIns="90000" tIns="45000" bIns="45000"/>
+          <a:p>
+            <a:r>
+              <a:rPr b="0" lang="en-US" sz="2800" spc="-1" strike="noStrike">
+                <a:solidFill>
+                  <a:srgbClr val="000000"/>
+                </a:solidFill>
+                <a:uFill>
+                  <a:solidFill>
+                    <a:srgbClr val="ffffff"/>
+                  </a:solidFill>
+                </a:uFill>
+                <a:latin typeface="Calibri"/>
+                <a:ea typeface="DejaVu Sans"/>
+              </a:rPr>
+              <a:t>From the Universal Declaration of Human Rights (1948):</a:t>
+            </a:r>
+            <a:endParaRPr b="0" lang="en-US" sz="2800" spc="-1" strike="noStrike">
+              <a:solidFill>
+                <a:srgbClr val="000000"/>
+              </a:solidFill>
+              <a:uFill>
+                <a:solidFill>
+                  <a:srgbClr val="ffffff"/>
+                </a:solidFill>
+              </a:uFill>
+              <a:latin typeface="Arial"/>
+            </a:endParaRPr>
+          </a:p>
+          <a:p>
+            <a:endParaRPr b="0" lang="en-US" sz="2800" spc="-1" strike="noStrike">
+              <a:solidFill>
+                <a:srgbClr val="000000"/>
+              </a:solidFill>
+              <a:uFill>
+                <a:solidFill>
+                  <a:srgbClr val="ffffff"/>
+                </a:solidFill>
+              </a:uFill>
+              <a:latin typeface="Arial"/>
+            </a:endParaRPr>
+          </a:p>
+          <a:p>
+            <a:r>
+              <a:rPr b="0" lang="en-US" sz="2800" spc="-1" strike="noStrike">
+                <a:solidFill>
+                  <a:srgbClr val="000000"/>
+                </a:solidFill>
+                <a:uFill>
+                  <a:solidFill>
+                    <a:srgbClr val="ffffff"/>
+                  </a:solidFill>
+                </a:uFill>
+                <a:latin typeface="Calibri"/>
+                <a:ea typeface="DejaVu Sans"/>
+              </a:rPr>
+              <a:t>Article 1.</a:t>
+            </a:r>
+            <a:endParaRPr b="0" lang="en-US" sz="2800" spc="-1" strike="noStrike">
+              <a:solidFill>
+                <a:srgbClr val="000000"/>
+              </a:solidFill>
+              <a:uFill>
+                <a:solidFill>
+                  <a:srgbClr val="ffffff"/>
+                </a:solidFill>
+              </a:uFill>
+              <a:latin typeface="Arial"/>
+            </a:endParaRPr>
+          </a:p>
+          <a:p>
+            <a:r>
+              <a:rPr b="0" lang="en-US" sz="2800" spc="-1" strike="noStrike">
+                <a:solidFill>
+                  <a:srgbClr val="000000"/>
+                </a:solidFill>
+                <a:uFill>
+                  <a:solidFill>
+                    <a:srgbClr val="ffffff"/>
+                  </a:solidFill>
+                </a:uFill>
+                <a:latin typeface="Calibri"/>
+                <a:ea typeface="DejaVu Sans"/>
+              </a:rPr>
+              <a:t> </a:t>
+            </a:r>
+            <a:endParaRPr b="0" lang="en-US" sz="2800" spc="-1" strike="noStrike">
+              <a:solidFill>
+                <a:srgbClr val="000000"/>
+              </a:solidFill>
+              <a:uFill>
+                <a:solidFill>
+                  <a:srgbClr val="ffffff"/>
+                </a:solidFill>
+              </a:uFill>
+              <a:latin typeface="Arial"/>
+            </a:endParaRPr>
+          </a:p>
+          <a:p>
+            <a:r>
+              <a:rPr b="0" lang="en-US" sz="2800" spc="-1" strike="noStrike">
+                <a:solidFill>
+                  <a:srgbClr val="000000"/>
+                </a:solidFill>
+                <a:uFill>
+                  <a:solidFill>
+                    <a:srgbClr val="ffffff"/>
+                  </a:solidFill>
+                </a:uFill>
+                <a:latin typeface="Calibri"/>
+                <a:ea typeface="DejaVu Sans"/>
+              </a:rPr>
+              <a:t>All human beings are born free and equal in dignity and rights. They are endowed with reason and conscience and should act towards one another in a spirit of brotherhood.</a:t>
+            </a:r>
+            <a:endParaRPr b="0" lang="en-US" sz="2800" spc="-1" strike="noStrike">
+              <a:solidFill>
+                <a:srgbClr val="000000"/>
+              </a:solidFill>
+              <a:uFill>
+                <a:solidFill>
+                  <a:srgbClr val="ffffff"/>
+                </a:solidFill>
+              </a:uFill>
+              <a:latin typeface="Arial"/>
+            </a:endParaRPr>
+          </a:p>
+        </p:txBody>
+      </p:sp>
+    </p:spTree>
+  </p:cSld>
+  <p:timing>
+    <p:tnLst>
+      <p:par>
+        <p:cTn id="19" dur="indefinite" restart="never" nodeType="tmRoot">
+          <p:childTnLst>
+            <p:seq>
+              <p:cTn id="20" nodeType="mainSeq"/>
+              <p:prevCondLst>
+                <p:cond delay="0" evt="onPrev">
+                  <p:tgtEl>
+                    <p:sldTgt/>
+                  </p:tgtEl>
+                </p:cond>
+              </p:prevCondLst>
+              <p:nextCondLst>
+                <p:cond delay="0" evt="onNext">
+                  <p:tgtEl>
+                    <p:sldTgt/>
+                  </p:tgtEl>
+                </p:cond>
+              </p:nextCondLst>
+            </p:seq>
+          </p:childTnLst>
+        </p:cTn>
+      </p:par>
+    </p:tnLst>
+  </p:timing>
+</p:sld>
+</file>
+
+<file path=ppt/slides/slide11.xml><?xml version="1.0" encoding="utf-8"?>
+<p:sld xmlns:a="http://schemas.openxmlformats.org/drawingml/2006/main" xmlns:p="http://schemas.openxmlformats.org/presentationml/2006/main" xmlns:r="http://schemas.openxmlformats.org/officeDocument/2006/relationships" xmlns:p14="http://schemas.microsoft.com/office/powerpoint/2010/main" xmlns:p15="http://schemas.microsoft.com/office/powerpoint/2012/main" xmlns:mc="http://schemas.openxmlformats.org/markup-compatibility/2006">
+  <p:cSld>
+    <p:spTree>
+      <p:nvGrpSpPr>
+        <p:cNvPr id="1" name=""/>
+        <p:cNvGrpSpPr/>
+        <p:nvPr/>
+      </p:nvGrpSpPr>
+      <p:grpSpPr>
+        <a:xfrm>
+          <a:off x="0" y="0"/>
+          <a:ext cx="0" cy="0"/>
+          <a:chOff x="0" y="0"/>
+          <a:chExt cx="0" cy="0"/>
+        </a:xfrm>
+      </p:grpSpPr>
+      <p:sp>
+        <p:nvSpPr>
+          <p:cNvPr id="94" name="CustomShape 1"/>
+          <p:cNvSpPr/>
+          <p:nvPr/>
+        </p:nvSpPr>
+        <p:spPr>
+          <a:xfrm>
+            <a:off x="838080" y="365040"/>
+            <a:ext cx="10509120" cy="1319040"/>
           </a:xfrm>
           <a:prstGeom prst="rect">
             <a:avLst/>
@@ -4288,14 +4554,14 @@
       </p:sp>
       <p:sp>
         <p:nvSpPr>
-          <p:cNvPr id="93" name="CustomShape 2"/>
+          <p:cNvPr id="95" name="CustomShape 2"/>
           <p:cNvSpPr/>
           <p:nvPr/>
         </p:nvSpPr>
         <p:spPr>
           <a:xfrm>
             <a:off x="838080" y="1825560"/>
-            <a:ext cx="10510200" cy="4345920"/>
+            <a:ext cx="10509120" cy="4344840"/>
           </a:xfrm>
           <a:prstGeom prst="rect">
             <a:avLst/>
@@ -4314,7 +4580,7 @@
         <p:txBody>
           <a:bodyPr lIns="90000" rIns="90000" tIns="45000" bIns="45000"/>
           <a:p>
-            <a:pPr marL="228600" indent="-223200">
+            <a:pPr marL="228600" indent="-222120">
               <a:lnSpc>
                 <a:spcPct val="90000"/>
               </a:lnSpc>
@@ -4358,10 +4624,10 @@
   <p:timing>
     <p:tnLst>
       <p:par>
-        <p:cTn id="19" dur="indefinite" restart="never" nodeType="tmRoot">
+        <p:cTn id="21" dur="indefinite" restart="never" nodeType="tmRoot">
           <p:childTnLst>
             <p:seq>
-              <p:cTn id="20" nodeType="mainSeq"/>
+              <p:cTn id="22" nodeType="mainSeq"/>
               <p:prevCondLst>
                 <p:cond delay="0" evt="onPrev">
                   <p:tgtEl>
@@ -4411,7 +4677,7 @@
         <p:spPr>
           <a:xfrm>
             <a:off x="838080" y="365040"/>
-            <a:ext cx="10510200" cy="1320120"/>
+            <a:ext cx="10509120" cy="1319040"/>
           </a:xfrm>
           <a:prstGeom prst="rect">
             <a:avLst/>
@@ -4473,7 +4739,7 @@
         <p:spPr>
           <a:xfrm>
             <a:off x="838080" y="1825560"/>
-            <a:ext cx="10510200" cy="4345920"/>
+            <a:ext cx="10509120" cy="4344840"/>
           </a:xfrm>
           <a:prstGeom prst="rect">
             <a:avLst/>
@@ -4755,7 +5021,7 @@
         <p:spPr>
           <a:xfrm>
             <a:off x="838080" y="365040"/>
-            <a:ext cx="10510200" cy="1320120"/>
+            <a:ext cx="10509120" cy="1319040"/>
           </a:xfrm>
           <a:prstGeom prst="rect">
             <a:avLst/>
@@ -4817,7 +5083,7 @@
         <p:spPr>
           <a:xfrm>
             <a:off x="838080" y="1825560"/>
-            <a:ext cx="10510200" cy="4345920"/>
+            <a:ext cx="10509120" cy="4344840"/>
           </a:xfrm>
           <a:prstGeom prst="rect">
             <a:avLst/>
@@ -4836,7 +5102,7 @@
         <p:txBody>
           <a:bodyPr lIns="90000" rIns="90000" tIns="45000" bIns="45000"/>
           <a:p>
-            <a:pPr marL="228600" indent="-223200">
+            <a:pPr marL="228600" indent="-222120">
               <a:lnSpc>
                 <a:spcPct val="90000"/>
               </a:lnSpc>
@@ -4933,7 +5199,7 @@
         <p:spPr>
           <a:xfrm>
             <a:off x="838080" y="365040"/>
-            <a:ext cx="10510200" cy="1320120"/>
+            <a:ext cx="10509120" cy="1319040"/>
           </a:xfrm>
           <a:prstGeom prst="rect">
             <a:avLst/>
@@ -4959,7 +5225,7 @@
         <p:spPr>
           <a:xfrm>
             <a:off x="838080" y="1825560"/>
-            <a:ext cx="10510200" cy="4345920"/>
+            <a:ext cx="10509120" cy="4344840"/>
           </a:xfrm>
           <a:prstGeom prst="rect">
             <a:avLst/>
@@ -4978,7 +5244,7 @@
         <p:txBody>
           <a:bodyPr lIns="90000" rIns="90000" tIns="45000" bIns="45000"/>
           <a:p>
-            <a:pPr marL="228600" indent="-223200">
+            <a:pPr marL="228600" indent="-222120">
               <a:lnSpc>
                 <a:spcPct val="90000"/>
               </a:lnSpc>
@@ -5124,7 +5390,7 @@
         <p:spPr>
           <a:xfrm>
             <a:off x="838080" y="365040"/>
-            <a:ext cx="10510200" cy="1320120"/>
+            <a:ext cx="10509120" cy="1319040"/>
           </a:xfrm>
           <a:prstGeom prst="rect">
             <a:avLst/>
@@ -5150,7 +5416,7 @@
         <p:spPr>
           <a:xfrm>
             <a:off x="838080" y="1825560"/>
-            <a:ext cx="10510200" cy="4345920"/>
+            <a:ext cx="10509120" cy="4344840"/>
           </a:xfrm>
           <a:prstGeom prst="rect">
             <a:avLst/>
@@ -5169,7 +5435,7 @@
         <p:txBody>
           <a:bodyPr lIns="90000" rIns="90000" tIns="45000" bIns="45000"/>
           <a:p>
-            <a:pPr marL="228600" indent="-223200">
+            <a:pPr marL="228600" indent="-222120">
               <a:lnSpc>
                 <a:spcPct val="90000"/>
               </a:lnSpc>
@@ -5266,7 +5532,7 @@
         <p:spPr>
           <a:xfrm>
             <a:off x="838080" y="365040"/>
-            <a:ext cx="10510200" cy="1320120"/>
+            <a:ext cx="10509120" cy="1319040"/>
           </a:xfrm>
           <a:prstGeom prst="rect">
             <a:avLst/>
@@ -5292,7 +5558,7 @@
         <p:spPr>
           <a:xfrm>
             <a:off x="838080" y="1825560"/>
-            <a:ext cx="10510200" cy="4345920"/>
+            <a:ext cx="10509120" cy="4344840"/>
           </a:xfrm>
           <a:prstGeom prst="rect">
             <a:avLst/>
@@ -5311,7 +5577,7 @@
         <p:txBody>
           <a:bodyPr lIns="90000" rIns="90000" tIns="45000" bIns="45000"/>
           <a:p>
-            <a:pPr marL="228600" indent="-223200">
+            <a:pPr marL="228600" indent="-222120">
               <a:lnSpc>
                 <a:spcPct val="90000"/>
               </a:lnSpc>
@@ -5408,7 +5674,7 @@
         <p:spPr>
           <a:xfrm>
             <a:off x="838080" y="365040"/>
-            <a:ext cx="10510200" cy="1320120"/>
+            <a:ext cx="10509120" cy="1319040"/>
           </a:xfrm>
           <a:prstGeom prst="rect">
             <a:avLst/>
@@ -5434,7 +5700,7 @@
         <p:spPr>
           <a:xfrm>
             <a:off x="838080" y="1825560"/>
-            <a:ext cx="10510200" cy="4345920"/>
+            <a:ext cx="10509120" cy="4344840"/>
           </a:xfrm>
           <a:prstGeom prst="rect">
             <a:avLst/>
@@ -5453,7 +5719,7 @@
         <p:txBody>
           <a:bodyPr lIns="90000" rIns="90000" tIns="45000" bIns="45000"/>
           <a:p>
-            <a:pPr marL="228600" indent="-223200">
+            <a:pPr marL="228600" indent="-222120">
               <a:lnSpc>
                 <a:spcPct val="90000"/>
               </a:lnSpc>
@@ -5491,7 +5757,7 @@
             </a:endParaRPr>
           </a:p>
           <a:p>
-            <a:pPr marL="228600" indent="-223200">
+            <a:pPr marL="228600" indent="-222120">
               <a:lnSpc>
                 <a:spcPct val="90000"/>
               </a:lnSpc>
@@ -5588,7 +5854,7 @@
         <p:spPr>
           <a:xfrm>
             <a:off x="838080" y="365040"/>
-            <a:ext cx="10510200" cy="1320120"/>
+            <a:ext cx="10509120" cy="1319040"/>
           </a:xfrm>
           <a:prstGeom prst="rect">
             <a:avLst/>
@@ -5650,7 +5916,7 @@
         <p:spPr>
           <a:xfrm>
             <a:off x="838080" y="1825560"/>
-            <a:ext cx="10510200" cy="4345920"/>
+            <a:ext cx="10509120" cy="4344840"/>
           </a:xfrm>
           <a:prstGeom prst="rect">
             <a:avLst/>
@@ -5682,7 +5948,7 @@
                 <a:latin typeface="Calibri"/>
                 <a:ea typeface="DejaVu Sans"/>
               </a:rPr>
-              <a:t>"a[[]; []]b"</a:t>
+              <a:t>"a[; ]b"</a:t>
             </a:r>
             <a:endParaRPr b="0" lang="en-US" sz="2800" spc="-1" strike="noStrike">
               <a:solidFill>

</xml_diff>

<commit_message>
Updated README and testing (new tagging file, test case). Fixed test case descriptions and added legacy JSON example.
</commit_message>
<xml_diff>
--- a/java/TikaTextDetection/test/data/Testing TIKA DETECTION.pptx
+++ b/java/TikaTextDetection/test/data/Testing TIKA DETECTION.pptx
@@ -4061,7 +4061,7 @@
         <p:spPr>
           <a:xfrm>
             <a:off x="1523880" y="1122480"/>
-            <a:ext cx="9137520" cy="2381040"/>
+            <a:ext cx="9137160" cy="2380680"/>
           </a:xfrm>
           <a:prstGeom prst="rect">
             <a:avLst/>
@@ -4123,7 +4123,7 @@
         <p:spPr>
           <a:xfrm>
             <a:off x="1523880" y="3602160"/>
-            <a:ext cx="9137520" cy="1649160"/>
+            <a:ext cx="9137160" cy="1648800"/>
           </a:xfrm>
           <a:prstGeom prst="rect">
             <a:avLst/>
@@ -4234,7 +4234,7 @@
         <p:spPr>
           <a:xfrm>
             <a:off x="838080" y="365040"/>
-            <a:ext cx="10509120" cy="1319040"/>
+            <a:ext cx="10508760" cy="1318680"/>
           </a:xfrm>
           <a:prstGeom prst="rect">
             <a:avLst/>
@@ -4296,7 +4296,7 @@
         <p:spPr>
           <a:xfrm>
             <a:off x="838080" y="1825560"/>
-            <a:ext cx="10509120" cy="4344840"/>
+            <a:ext cx="10508760" cy="4344480"/>
           </a:xfrm>
           <a:prstGeom prst="rect">
             <a:avLst/>
@@ -4499,7 +4499,7 @@
         <p:spPr>
           <a:xfrm>
             <a:off x="838080" y="365040"/>
-            <a:ext cx="10509120" cy="1319040"/>
+            <a:ext cx="10508760" cy="1318680"/>
           </a:xfrm>
           <a:prstGeom prst="rect">
             <a:avLst/>
@@ -4561,7 +4561,7 @@
         <p:spPr>
           <a:xfrm>
             <a:off x="838080" y="1825560"/>
-            <a:ext cx="10509120" cy="4344840"/>
+            <a:ext cx="10508760" cy="4344480"/>
           </a:xfrm>
           <a:prstGeom prst="rect">
             <a:avLst/>
@@ -4580,7 +4580,7 @@
         <p:txBody>
           <a:bodyPr lIns="90000" rIns="90000" tIns="45000" bIns="45000"/>
           <a:p>
-            <a:pPr marL="228600" indent="-222120">
+            <a:pPr marL="228600" indent="-221760">
               <a:lnSpc>
                 <a:spcPct val="90000"/>
               </a:lnSpc>
@@ -4677,7 +4677,7 @@
         <p:spPr>
           <a:xfrm>
             <a:off x="838080" y="365040"/>
-            <a:ext cx="10509120" cy="1319040"/>
+            <a:ext cx="10508760" cy="1318680"/>
           </a:xfrm>
           <a:prstGeom prst="rect">
             <a:avLst/>
@@ -4739,7 +4739,7 @@
         <p:spPr>
           <a:xfrm>
             <a:off x="838080" y="1825560"/>
-            <a:ext cx="10509120" cy="4344840"/>
+            <a:ext cx="10508760" cy="4344480"/>
           </a:xfrm>
           <a:prstGeom prst="rect">
             <a:avLst/>
@@ -5021,7 +5021,7 @@
         <p:spPr>
           <a:xfrm>
             <a:off x="838080" y="365040"/>
-            <a:ext cx="10509120" cy="1319040"/>
+            <a:ext cx="10508760" cy="1318680"/>
           </a:xfrm>
           <a:prstGeom prst="rect">
             <a:avLst/>
@@ -5083,7 +5083,7 @@
         <p:spPr>
           <a:xfrm>
             <a:off x="838080" y="1825560"/>
-            <a:ext cx="10509120" cy="4344840"/>
+            <a:ext cx="10508760" cy="4344480"/>
           </a:xfrm>
           <a:prstGeom prst="rect">
             <a:avLst/>
@@ -5102,7 +5102,7 @@
         <p:txBody>
           <a:bodyPr lIns="90000" rIns="90000" tIns="45000" bIns="45000"/>
           <a:p>
-            <a:pPr marL="228600" indent="-222120">
+            <a:pPr marL="228600" indent="-221760">
               <a:lnSpc>
                 <a:spcPct val="90000"/>
               </a:lnSpc>
@@ -5199,7 +5199,7 @@
         <p:spPr>
           <a:xfrm>
             <a:off x="838080" y="365040"/>
-            <a:ext cx="10509120" cy="1319040"/>
+            <a:ext cx="10508760" cy="1318680"/>
           </a:xfrm>
           <a:prstGeom prst="rect">
             <a:avLst/>
@@ -5225,7 +5225,7 @@
         <p:spPr>
           <a:xfrm>
             <a:off x="838080" y="1825560"/>
-            <a:ext cx="10509120" cy="4344840"/>
+            <a:ext cx="10508760" cy="4344480"/>
           </a:xfrm>
           <a:prstGeom prst="rect">
             <a:avLst/>
@@ -5244,7 +5244,7 @@
         <p:txBody>
           <a:bodyPr lIns="90000" rIns="90000" tIns="45000" bIns="45000"/>
           <a:p>
-            <a:pPr marL="228600" indent="-222120">
+            <a:pPr marL="228600" indent="-221760">
               <a:lnSpc>
                 <a:spcPct val="90000"/>
               </a:lnSpc>
@@ -5390,7 +5390,7 @@
         <p:spPr>
           <a:xfrm>
             <a:off x="838080" y="365040"/>
-            <a:ext cx="10509120" cy="1319040"/>
+            <a:ext cx="10508760" cy="1318680"/>
           </a:xfrm>
           <a:prstGeom prst="rect">
             <a:avLst/>
@@ -5416,7 +5416,7 @@
         <p:spPr>
           <a:xfrm>
             <a:off x="838080" y="1825560"/>
-            <a:ext cx="10509120" cy="4344840"/>
+            <a:ext cx="10508760" cy="4344480"/>
           </a:xfrm>
           <a:prstGeom prst="rect">
             <a:avLst/>
@@ -5435,7 +5435,7 @@
         <p:txBody>
           <a:bodyPr lIns="90000" rIns="90000" tIns="45000" bIns="45000"/>
           <a:p>
-            <a:pPr marL="228600" indent="-222120">
+            <a:pPr marL="228600" indent="-221760">
               <a:lnSpc>
                 <a:spcPct val="90000"/>
               </a:lnSpc>
@@ -5532,7 +5532,7 @@
         <p:spPr>
           <a:xfrm>
             <a:off x="838080" y="365040"/>
-            <a:ext cx="10509120" cy="1319040"/>
+            <a:ext cx="10508760" cy="1318680"/>
           </a:xfrm>
           <a:prstGeom prst="rect">
             <a:avLst/>
@@ -5558,7 +5558,7 @@
         <p:spPr>
           <a:xfrm>
             <a:off x="838080" y="1825560"/>
-            <a:ext cx="10509120" cy="4344840"/>
+            <a:ext cx="10508760" cy="4344480"/>
           </a:xfrm>
           <a:prstGeom prst="rect">
             <a:avLst/>
@@ -5577,7 +5577,7 @@
         <p:txBody>
           <a:bodyPr lIns="90000" rIns="90000" tIns="45000" bIns="45000"/>
           <a:p>
-            <a:pPr marL="228600" indent="-222120">
+            <a:pPr marL="228600" indent="-221760">
               <a:lnSpc>
                 <a:spcPct val="90000"/>
               </a:lnSpc>
@@ -5674,7 +5674,7 @@
         <p:spPr>
           <a:xfrm>
             <a:off x="838080" y="365040"/>
-            <a:ext cx="10509120" cy="1319040"/>
+            <a:ext cx="10508760" cy="1318680"/>
           </a:xfrm>
           <a:prstGeom prst="rect">
             <a:avLst/>
@@ -5700,7 +5700,7 @@
         <p:spPr>
           <a:xfrm>
             <a:off x="838080" y="1825560"/>
-            <a:ext cx="10509120" cy="4344840"/>
+            <a:ext cx="10508760" cy="4344480"/>
           </a:xfrm>
           <a:prstGeom prst="rect">
             <a:avLst/>
@@ -5719,7 +5719,7 @@
         <p:txBody>
           <a:bodyPr lIns="90000" rIns="90000" tIns="45000" bIns="45000"/>
           <a:p>
-            <a:pPr marL="228600" indent="-222120">
+            <a:pPr marL="228600" indent="-221760">
               <a:lnSpc>
                 <a:spcPct val="90000"/>
               </a:lnSpc>
@@ -5757,7 +5757,7 @@
             </a:endParaRPr>
           </a:p>
           <a:p>
-            <a:pPr marL="228600" indent="-222120">
+            <a:pPr marL="228600" indent="-221760">
               <a:lnSpc>
                 <a:spcPct val="90000"/>
               </a:lnSpc>
@@ -5854,7 +5854,7 @@
         <p:spPr>
           <a:xfrm>
             <a:off x="838080" y="365040"/>
-            <a:ext cx="10509120" cy="1319040"/>
+            <a:ext cx="10508760" cy="1318680"/>
           </a:xfrm>
           <a:prstGeom prst="rect">
             <a:avLst/>
@@ -5891,7 +5891,7 @@
                 <a:latin typeface="Calibri Light"/>
                 <a:ea typeface="DejaVu Sans"/>
               </a:rPr>
-              <a:t>Delimiter</a:t>
+              <a:t>Delimiter and Backspace</a:t>
             </a:r>
             <a:endParaRPr b="0" lang="en-US" sz="4400" spc="-1" strike="noStrike">
               <a:solidFill>
@@ -5915,8 +5915,8 @@
         </p:nvSpPr>
         <p:spPr>
           <a:xfrm>
-            <a:off x="838080" y="1825560"/>
-            <a:ext cx="10509120" cy="4344840"/>
+            <a:off x="1287000" y="1690560"/>
+            <a:ext cx="10508760" cy="4344480"/>
           </a:xfrm>
           <a:prstGeom prst="rect">
             <a:avLst/>
@@ -5949,6 +5949,49 @@
                 <a:ea typeface="DejaVu Sans"/>
               </a:rPr>
               <a:t>"a[; ]b"</a:t>
+            </a:r>
+            <a:endParaRPr b="0" lang="en-US" sz="2800" spc="-1" strike="noStrike">
+              <a:solidFill>
+                <a:srgbClr val="000000"/>
+              </a:solidFill>
+              <a:uFill>
+                <a:solidFill>
+                  <a:srgbClr val="ffffff"/>
+                </a:solidFill>
+              </a:uFill>
+              <a:latin typeface="Arial"/>
+            </a:endParaRPr>
+          </a:p>
+          <a:p>
+            <a:r>
+              <a:rPr b="0" lang="en-US" sz="2800" spc="-1" strike="noStrike">
+                <a:solidFill>
+                  <a:srgbClr val="000000"/>
+                </a:solidFill>
+                <a:uFill>
+                  <a:solidFill>
+                    <a:srgbClr val="ffffff"/>
+                  </a:solidFill>
+                </a:uFill>
+                <a:latin typeface="Calibri"/>
+                <a:ea typeface="DejaVu Sans"/>
+              </a:rPr>
+              <a:t>“</a:t>
+            </a:r>
+            <a:r>
+              <a:rPr b="0" lang="en-US" sz="2800" spc="-1" strike="noStrike">
+                <a:solidFill>
+                  <a:srgbClr val="000000"/>
+                </a:solidFill>
+                <a:uFill>
+                  <a:solidFill>
+                    <a:srgbClr val="ffffff"/>
+                  </a:solidFill>
+                </a:uFill>
+                <a:latin typeface="Calibri"/>
+                <a:ea typeface="DejaVu Sans"/>
+              </a:rPr>
+              <a:t>a \\ a\ b\\c</a:t>
             </a:r>
             <a:endParaRPr b="0" lang="en-US" sz="2800" spc="-1" strike="noStrike">
               <a:solidFill>

</xml_diff>

<commit_message>
Updated Tika Component to follow Tesseract trigger words and regex tagging behavior.
</commit_message>
<xml_diff>
--- a/java/TikaTextDetection/test/data/Testing TIKA DETECTION.pptx
+++ b/java/TikaTextDetection/test/data/Testing TIKA DETECTION.pptx
@@ -15,6 +15,8 @@
     <p:sldId id="262" r:id="rId10"/>
     <p:sldId id="263" r:id="rId11"/>
     <p:sldId id="264" r:id="rId12"/>
+    <p:sldId id="265" r:id="rId13"/>
+    <p:sldId id="266" r:id="rId14"/>
   </p:sldIdLst>
   <p:sldSz cx="12192000" cy="6858000"/>
   <p:notesSz cx="7772400" cy="10058400"/>
@@ -3320,21 +3322,7 @@
                 </a:uFill>
                 <a:latin typeface="Arial"/>
               </a:rPr>
-              <a:t>Click to edit the </a:t>
-            </a:r>
-            <a:r>
-              <a:rPr b="0" lang="en-US" sz="4400" spc="-1" strike="noStrike">
-                <a:solidFill>
-                  <a:srgbClr val="000000"/>
-                </a:solidFill>
-                <a:uFill>
-                  <a:solidFill>
-                    <a:srgbClr val="ffffff"/>
-                  </a:solidFill>
-                </a:uFill>
-                <a:latin typeface="Arial"/>
-              </a:rPr>
-              <a:t>title text format</a:t>
+              <a:t>Click to edit the title text format</a:t>
             </a:r>
             <a:endParaRPr b="0" lang="en-US" sz="4400" spc="-1" strike="noStrike">
               <a:solidFill>
@@ -4073,7 +4061,7 @@
         <p:spPr>
           <a:xfrm>
             <a:off x="1523880" y="1122480"/>
-            <a:ext cx="9139680" cy="2383200"/>
+            <a:ext cx="9137160" cy="2380680"/>
           </a:xfrm>
           <a:prstGeom prst="rect">
             <a:avLst/>
@@ -4135,7 +4123,7 @@
         <p:spPr>
           <a:xfrm>
             <a:off x="1523880" y="3602160"/>
-            <a:ext cx="9139680" cy="1651320"/>
+            <a:ext cx="9137160" cy="1648800"/>
           </a:xfrm>
           <a:prstGeom prst="rect">
             <a:avLst/>
@@ -4197,6 +4185,449 @@
           <p:childTnLst>
             <p:seq>
               <p:cTn id="2" nodeType="mainSeq"/>
+              <p:prevCondLst>
+                <p:cond delay="0" evt="onPrev">
+                  <p:tgtEl>
+                    <p:sldTgt/>
+                  </p:tgtEl>
+                </p:cond>
+              </p:prevCondLst>
+              <p:nextCondLst>
+                <p:cond delay="0" evt="onNext">
+                  <p:tgtEl>
+                    <p:sldTgt/>
+                  </p:tgtEl>
+                </p:cond>
+              </p:nextCondLst>
+            </p:seq>
+          </p:childTnLst>
+        </p:cTn>
+      </p:par>
+    </p:tnLst>
+  </p:timing>
+</p:sld>
+</file>
+
+<file path=ppt/slides/slide10.xml><?xml version="1.0" encoding="utf-8"?>
+<p:sld xmlns:a="http://schemas.openxmlformats.org/drawingml/2006/main" xmlns:p="http://schemas.openxmlformats.org/presentationml/2006/main" xmlns:r="http://schemas.openxmlformats.org/officeDocument/2006/relationships" xmlns:p14="http://schemas.microsoft.com/office/powerpoint/2010/main" xmlns:p15="http://schemas.microsoft.com/office/powerpoint/2012/main" xmlns:mc="http://schemas.openxmlformats.org/markup-compatibility/2006">
+  <p:cSld>
+    <p:spTree>
+      <p:nvGrpSpPr>
+        <p:cNvPr id="1" name=""/>
+        <p:cNvGrpSpPr/>
+        <p:nvPr/>
+      </p:nvGrpSpPr>
+      <p:grpSpPr>
+        <a:xfrm>
+          <a:off x="0" y="0"/>
+          <a:ext cx="0" cy="0"/>
+          <a:chOff x="0" y="0"/>
+          <a:chExt cx="0" cy="0"/>
+        </a:xfrm>
+      </p:grpSpPr>
+      <p:sp>
+        <p:nvSpPr>
+          <p:cNvPr id="92" name="CustomShape 1"/>
+          <p:cNvSpPr/>
+          <p:nvPr/>
+        </p:nvSpPr>
+        <p:spPr>
+          <a:xfrm>
+            <a:off x="838080" y="365040"/>
+            <a:ext cx="10508760" cy="1318680"/>
+          </a:xfrm>
+          <a:prstGeom prst="rect">
+            <a:avLst/>
+          </a:prstGeom>
+          <a:noFill/>
+          <a:ln>
+            <a:noFill/>
+          </a:ln>
+        </p:spPr>
+        <p:style>
+          <a:lnRef idx="0"/>
+          <a:fillRef idx="0"/>
+          <a:effectRef idx="0"/>
+          <a:fontRef idx="minor"/>
+        </p:style>
+        <p:txBody>
+          <a:bodyPr lIns="90000" rIns="90000" tIns="45000" bIns="45000" anchor="ctr"/>
+          <a:p>
+            <a:pPr>
+              <a:lnSpc>
+                <a:spcPct val="90000"/>
+              </a:lnSpc>
+            </a:pPr>
+            <a:r>
+              <a:rPr b="0" lang="en-US" sz="4400" spc="-1" strike="noStrike">
+                <a:solidFill>
+                  <a:srgbClr val="000000"/>
+                </a:solidFill>
+                <a:uFill>
+                  <a:solidFill>
+                    <a:srgbClr val="ffffff"/>
+                  </a:solidFill>
+                </a:uFill>
+                <a:latin typeface="Calibri Light"/>
+                <a:ea typeface="DejaVu Sans"/>
+              </a:rPr>
+              <a:t>Phrase Test</a:t>
+            </a:r>
+            <a:endParaRPr b="0" lang="en-US" sz="4400" spc="-1" strike="noStrike">
+              <a:solidFill>
+                <a:srgbClr val="000000"/>
+              </a:solidFill>
+              <a:uFill>
+                <a:solidFill>
+                  <a:srgbClr val="ffffff"/>
+                </a:solidFill>
+              </a:uFill>
+              <a:latin typeface="Arial"/>
+            </a:endParaRPr>
+          </a:p>
+        </p:txBody>
+      </p:sp>
+      <p:sp>
+        <p:nvSpPr>
+          <p:cNvPr id="93" name="CustomShape 2"/>
+          <p:cNvSpPr/>
+          <p:nvPr/>
+        </p:nvSpPr>
+        <p:spPr>
+          <a:xfrm>
+            <a:off x="838080" y="1825560"/>
+            <a:ext cx="10508760" cy="4344480"/>
+          </a:xfrm>
+          <a:prstGeom prst="rect">
+            <a:avLst/>
+          </a:prstGeom>
+          <a:noFill/>
+          <a:ln>
+            <a:noFill/>
+          </a:ln>
+        </p:spPr>
+        <p:style>
+          <a:lnRef idx="0"/>
+          <a:fillRef idx="0"/>
+          <a:effectRef idx="0"/>
+          <a:fontRef idx="minor"/>
+        </p:style>
+        <p:txBody>
+          <a:bodyPr lIns="90000" rIns="90000" tIns="45000" bIns="45000"/>
+          <a:p>
+            <a:r>
+              <a:rPr b="0" lang="en-US" sz="2800" spc="-1" strike="noStrike">
+                <a:solidFill>
+                  <a:srgbClr val="000000"/>
+                </a:solidFill>
+                <a:uFill>
+                  <a:solidFill>
+                    <a:srgbClr val="ffffff"/>
+                  </a:solidFill>
+                </a:uFill>
+                <a:latin typeface="Calibri"/>
+                <a:ea typeface="DejaVu Sans"/>
+              </a:rPr>
+              <a:t>From the Universal Declaration of Human Rights (1948):</a:t>
+            </a:r>
+            <a:endParaRPr b="0" lang="en-US" sz="2800" spc="-1" strike="noStrike">
+              <a:solidFill>
+                <a:srgbClr val="000000"/>
+              </a:solidFill>
+              <a:uFill>
+                <a:solidFill>
+                  <a:srgbClr val="ffffff"/>
+                </a:solidFill>
+              </a:uFill>
+              <a:latin typeface="Arial"/>
+            </a:endParaRPr>
+          </a:p>
+          <a:p>
+            <a:endParaRPr b="0" lang="en-US" sz="2800" spc="-1" strike="noStrike">
+              <a:solidFill>
+                <a:srgbClr val="000000"/>
+              </a:solidFill>
+              <a:uFill>
+                <a:solidFill>
+                  <a:srgbClr val="ffffff"/>
+                </a:solidFill>
+              </a:uFill>
+              <a:latin typeface="Arial"/>
+            </a:endParaRPr>
+          </a:p>
+          <a:p>
+            <a:r>
+              <a:rPr b="0" lang="en-US" sz="2800" spc="-1" strike="noStrike">
+                <a:solidFill>
+                  <a:srgbClr val="000000"/>
+                </a:solidFill>
+                <a:uFill>
+                  <a:solidFill>
+                    <a:srgbClr val="ffffff"/>
+                  </a:solidFill>
+                </a:uFill>
+                <a:latin typeface="Calibri"/>
+                <a:ea typeface="DejaVu Sans"/>
+              </a:rPr>
+              <a:t>Article 1.</a:t>
+            </a:r>
+            <a:endParaRPr b="0" lang="en-US" sz="2800" spc="-1" strike="noStrike">
+              <a:solidFill>
+                <a:srgbClr val="000000"/>
+              </a:solidFill>
+              <a:uFill>
+                <a:solidFill>
+                  <a:srgbClr val="ffffff"/>
+                </a:solidFill>
+              </a:uFill>
+              <a:latin typeface="Arial"/>
+            </a:endParaRPr>
+          </a:p>
+          <a:p>
+            <a:r>
+              <a:rPr b="0" lang="en-US" sz="2800" spc="-1" strike="noStrike">
+                <a:solidFill>
+                  <a:srgbClr val="000000"/>
+                </a:solidFill>
+                <a:uFill>
+                  <a:solidFill>
+                    <a:srgbClr val="ffffff"/>
+                  </a:solidFill>
+                </a:uFill>
+                <a:latin typeface="Calibri"/>
+                <a:ea typeface="DejaVu Sans"/>
+              </a:rPr>
+              <a:t> </a:t>
+            </a:r>
+            <a:endParaRPr b="0" lang="en-US" sz="2800" spc="-1" strike="noStrike">
+              <a:solidFill>
+                <a:srgbClr val="000000"/>
+              </a:solidFill>
+              <a:uFill>
+                <a:solidFill>
+                  <a:srgbClr val="ffffff"/>
+                </a:solidFill>
+              </a:uFill>
+              <a:latin typeface="Arial"/>
+            </a:endParaRPr>
+          </a:p>
+          <a:p>
+            <a:r>
+              <a:rPr b="0" lang="en-US" sz="2800" spc="-1" strike="noStrike">
+                <a:solidFill>
+                  <a:srgbClr val="000000"/>
+                </a:solidFill>
+                <a:uFill>
+                  <a:solidFill>
+                    <a:srgbClr val="ffffff"/>
+                  </a:solidFill>
+                </a:uFill>
+                <a:latin typeface="Calibri"/>
+                <a:ea typeface="DejaVu Sans"/>
+              </a:rPr>
+              <a:t>All human beings are born free and equal in dignity and rights. They are endowed with reason and conscience and should act towards one another in a spirit of brotherhood.</a:t>
+            </a:r>
+            <a:endParaRPr b="0" lang="en-US" sz="2800" spc="-1" strike="noStrike">
+              <a:solidFill>
+                <a:srgbClr val="000000"/>
+              </a:solidFill>
+              <a:uFill>
+                <a:solidFill>
+                  <a:srgbClr val="ffffff"/>
+                </a:solidFill>
+              </a:uFill>
+              <a:latin typeface="Arial"/>
+            </a:endParaRPr>
+          </a:p>
+        </p:txBody>
+      </p:sp>
+    </p:spTree>
+  </p:cSld>
+  <p:timing>
+    <p:tnLst>
+      <p:par>
+        <p:cTn id="19" dur="indefinite" restart="never" nodeType="tmRoot">
+          <p:childTnLst>
+            <p:seq>
+              <p:cTn id="20" nodeType="mainSeq"/>
+              <p:prevCondLst>
+                <p:cond delay="0" evt="onPrev">
+                  <p:tgtEl>
+                    <p:sldTgt/>
+                  </p:tgtEl>
+                </p:cond>
+              </p:prevCondLst>
+              <p:nextCondLst>
+                <p:cond delay="0" evt="onNext">
+                  <p:tgtEl>
+                    <p:sldTgt/>
+                  </p:tgtEl>
+                </p:cond>
+              </p:nextCondLst>
+            </p:seq>
+          </p:childTnLst>
+        </p:cTn>
+      </p:par>
+    </p:tnLst>
+  </p:timing>
+</p:sld>
+</file>
+
+<file path=ppt/slides/slide11.xml><?xml version="1.0" encoding="utf-8"?>
+<p:sld xmlns:a="http://schemas.openxmlformats.org/drawingml/2006/main" xmlns:p="http://schemas.openxmlformats.org/presentationml/2006/main" xmlns:r="http://schemas.openxmlformats.org/officeDocument/2006/relationships" xmlns:p14="http://schemas.microsoft.com/office/powerpoint/2010/main" xmlns:p15="http://schemas.microsoft.com/office/powerpoint/2012/main" xmlns:mc="http://schemas.openxmlformats.org/markup-compatibility/2006">
+  <p:cSld>
+    <p:spTree>
+      <p:nvGrpSpPr>
+        <p:cNvPr id="1" name=""/>
+        <p:cNvGrpSpPr/>
+        <p:nvPr/>
+      </p:nvGrpSpPr>
+      <p:grpSpPr>
+        <a:xfrm>
+          <a:off x="0" y="0"/>
+          <a:ext cx="0" cy="0"/>
+          <a:chOff x="0" y="0"/>
+          <a:chExt cx="0" cy="0"/>
+        </a:xfrm>
+      </p:grpSpPr>
+      <p:sp>
+        <p:nvSpPr>
+          <p:cNvPr id="94" name="CustomShape 1"/>
+          <p:cNvSpPr/>
+          <p:nvPr/>
+        </p:nvSpPr>
+        <p:spPr>
+          <a:xfrm>
+            <a:off x="838080" y="365040"/>
+            <a:ext cx="10508760" cy="1318680"/>
+          </a:xfrm>
+          <a:prstGeom prst="rect">
+            <a:avLst/>
+          </a:prstGeom>
+          <a:noFill/>
+          <a:ln>
+            <a:noFill/>
+          </a:ln>
+        </p:spPr>
+        <p:style>
+          <a:lnRef idx="0"/>
+          <a:fillRef idx="0"/>
+          <a:effectRef idx="0"/>
+          <a:fontRef idx="minor"/>
+        </p:style>
+        <p:txBody>
+          <a:bodyPr lIns="90000" rIns="90000" tIns="45000" bIns="45000" anchor="ctr"/>
+          <a:p>
+            <a:pPr>
+              <a:lnSpc>
+                <a:spcPct val="90000"/>
+              </a:lnSpc>
+            </a:pPr>
+            <a:r>
+              <a:rPr b="0" lang="en-US" sz="4400" spc="-1" strike="noStrike">
+                <a:solidFill>
+                  <a:srgbClr val="000000"/>
+                </a:solidFill>
+                <a:uFill>
+                  <a:solidFill>
+                    <a:srgbClr val="ffffff"/>
+                  </a:solidFill>
+                </a:uFill>
+                <a:latin typeface="Calibri Light"/>
+                <a:ea typeface="DejaVu Sans"/>
+              </a:rPr>
+              <a:t>End</a:t>
+            </a:r>
+            <a:endParaRPr b="0" lang="en-US" sz="4400" spc="-1" strike="noStrike">
+              <a:solidFill>
+                <a:srgbClr val="000000"/>
+              </a:solidFill>
+              <a:uFill>
+                <a:solidFill>
+                  <a:srgbClr val="ffffff"/>
+                </a:solidFill>
+              </a:uFill>
+              <a:latin typeface="Arial"/>
+            </a:endParaRPr>
+          </a:p>
+        </p:txBody>
+      </p:sp>
+      <p:sp>
+        <p:nvSpPr>
+          <p:cNvPr id="95" name="CustomShape 2"/>
+          <p:cNvSpPr/>
+          <p:nvPr/>
+        </p:nvSpPr>
+        <p:spPr>
+          <a:xfrm>
+            <a:off x="838080" y="1825560"/>
+            <a:ext cx="10508760" cy="4344480"/>
+          </a:xfrm>
+          <a:prstGeom prst="rect">
+            <a:avLst/>
+          </a:prstGeom>
+          <a:noFill/>
+          <a:ln>
+            <a:noFill/>
+          </a:ln>
+        </p:spPr>
+        <p:style>
+          <a:lnRef idx="0"/>
+          <a:fillRef idx="0"/>
+          <a:effectRef idx="0"/>
+          <a:fontRef idx="minor"/>
+        </p:style>
+        <p:txBody>
+          <a:bodyPr lIns="90000" rIns="90000" tIns="45000" bIns="45000"/>
+          <a:p>
+            <a:pPr marL="228600" indent="-221760">
+              <a:lnSpc>
+                <a:spcPct val="90000"/>
+              </a:lnSpc>
+              <a:buClr>
+                <a:srgbClr val="000000"/>
+              </a:buClr>
+              <a:buFont typeface="Arial"/>
+              <a:buChar char="•"/>
+            </a:pPr>
+            <a:r>
+              <a:rPr b="0" lang="en-US" sz="2800" spc="-1" strike="noStrike">
+                <a:solidFill>
+                  <a:srgbClr val="000000"/>
+                </a:solidFill>
+                <a:uFill>
+                  <a:solidFill>
+                    <a:srgbClr val="ffffff"/>
+                  </a:solidFill>
+                </a:uFill>
+                <a:latin typeface="Calibri"/>
+                <a:ea typeface="DejaVu Sans"/>
+              </a:rPr>
+              <a:t>End slide test text 01/01/2011</a:t>
+            </a:r>
+            <a:endParaRPr b="0" lang="en-US" sz="2800" spc="-1" strike="noStrike">
+              <a:solidFill>
+                <a:srgbClr val="000000"/>
+              </a:solidFill>
+              <a:uFill>
+                <a:solidFill>
+                  <a:srgbClr val="ffffff"/>
+                </a:solidFill>
+              </a:uFill>
+              <a:latin typeface="Arial"/>
+            </a:endParaRPr>
+          </a:p>
+        </p:txBody>
+      </p:sp>
+    </p:spTree>
+  </p:cSld>
+  <p:timing>
+    <p:tnLst>
+      <p:par>
+        <p:cTn id="21" dur="indefinite" restart="never" nodeType="tmRoot">
+          <p:childTnLst>
+            <p:seq>
+              <p:cTn id="22" nodeType="mainSeq"/>
               <p:prevCondLst>
                 <p:cond delay="0" evt="onPrev">
                   <p:tgtEl>
@@ -4246,7 +4677,7 @@
         <p:spPr>
           <a:xfrm>
             <a:off x="838080" y="365040"/>
-            <a:ext cx="10511280" cy="1321200"/>
+            <a:ext cx="10508760" cy="1318680"/>
           </a:xfrm>
           <a:prstGeom prst="rect">
             <a:avLst/>
@@ -4308,7 +4739,7 @@
         <p:spPr>
           <a:xfrm>
             <a:off x="838080" y="1825560"/>
-            <a:ext cx="10511280" cy="4347000"/>
+            <a:ext cx="10508760" cy="4344480"/>
           </a:xfrm>
           <a:prstGeom prst="rect">
             <a:avLst/>
@@ -4590,7 +5021,7 @@
         <p:spPr>
           <a:xfrm>
             <a:off x="838080" y="365040"/>
-            <a:ext cx="10511280" cy="1321200"/>
+            <a:ext cx="10508760" cy="1318680"/>
           </a:xfrm>
           <a:prstGeom prst="rect">
             <a:avLst/>
@@ -4652,7 +5083,7 @@
         <p:spPr>
           <a:xfrm>
             <a:off x="838080" y="1825560"/>
-            <a:ext cx="10511280" cy="4347000"/>
+            <a:ext cx="10508760" cy="4344480"/>
           </a:xfrm>
           <a:prstGeom prst="rect">
             <a:avLst/>
@@ -4671,7 +5102,7 @@
         <p:txBody>
           <a:bodyPr lIns="90000" rIns="90000" tIns="45000" bIns="45000"/>
           <a:p>
-            <a:pPr marL="228600" indent="-224280">
+            <a:pPr marL="228600" indent="-221760">
               <a:lnSpc>
                 <a:spcPct val="90000"/>
               </a:lnSpc>
@@ -4768,7 +5199,7 @@
         <p:spPr>
           <a:xfrm>
             <a:off x="838080" y="365040"/>
-            <a:ext cx="10511280" cy="1321200"/>
+            <a:ext cx="10508760" cy="1318680"/>
           </a:xfrm>
           <a:prstGeom prst="rect">
             <a:avLst/>
@@ -4794,7 +5225,7 @@
         <p:spPr>
           <a:xfrm>
             <a:off x="838080" y="1825560"/>
-            <a:ext cx="10511280" cy="4347000"/>
+            <a:ext cx="10508760" cy="4344480"/>
           </a:xfrm>
           <a:prstGeom prst="rect">
             <a:avLst/>
@@ -4813,7 +5244,7 @@
         <p:txBody>
           <a:bodyPr lIns="90000" rIns="90000" tIns="45000" bIns="45000"/>
           <a:p>
-            <a:pPr marL="228600" indent="-224280">
+            <a:pPr marL="228600" indent="-221760">
               <a:lnSpc>
                 <a:spcPct val="90000"/>
               </a:lnSpc>
@@ -4836,7 +5267,7 @@
                 <a:latin typeface="Calibri"/>
                 <a:ea typeface="DejaVu Sans"/>
               </a:rPr>
-              <a:t>An automobile races down the street.</a:t>
+              <a:t>An automobile with a bike races down the street followed by another automobile carrying bikes.</a:t>
             </a:r>
             <a:endParaRPr b="0" lang="en-US" sz="2800" spc="-1" strike="noStrike">
               <a:solidFill>
@@ -4959,7 +5390,7 @@
         <p:spPr>
           <a:xfrm>
             <a:off x="838080" y="365040"/>
-            <a:ext cx="10511280" cy="1321200"/>
+            <a:ext cx="10508760" cy="1318680"/>
           </a:xfrm>
           <a:prstGeom prst="rect">
             <a:avLst/>
@@ -4985,7 +5416,7 @@
         <p:spPr>
           <a:xfrm>
             <a:off x="838080" y="1825560"/>
-            <a:ext cx="10511280" cy="4347000"/>
+            <a:ext cx="10508760" cy="4344480"/>
           </a:xfrm>
           <a:prstGeom prst="rect">
             <a:avLst/>
@@ -5004,7 +5435,7 @@
         <p:txBody>
           <a:bodyPr lIns="90000" rIns="90000" tIns="45000" bIns="45000"/>
           <a:p>
-            <a:pPr marL="228600" indent="-224280">
+            <a:pPr marL="228600" indent="-221760">
               <a:lnSpc>
                 <a:spcPct val="90000"/>
               </a:lnSpc>
@@ -5101,7 +5532,7 @@
         <p:spPr>
           <a:xfrm>
             <a:off x="838080" y="365040"/>
-            <a:ext cx="10511280" cy="1321200"/>
+            <a:ext cx="10508760" cy="1318680"/>
           </a:xfrm>
           <a:prstGeom prst="rect">
             <a:avLst/>
@@ -5127,7 +5558,7 @@
         <p:spPr>
           <a:xfrm>
             <a:off x="838080" y="1825560"/>
-            <a:ext cx="10511280" cy="4347000"/>
+            <a:ext cx="10508760" cy="4344480"/>
           </a:xfrm>
           <a:prstGeom prst="rect">
             <a:avLst/>
@@ -5146,7 +5577,7 @@
         <p:txBody>
           <a:bodyPr lIns="90000" rIns="90000" tIns="45000" bIns="45000"/>
           <a:p>
-            <a:pPr marL="228600" indent="-224280">
+            <a:pPr marL="228600" indent="-221760">
               <a:lnSpc>
                 <a:spcPct val="90000"/>
               </a:lnSpc>
@@ -5243,7 +5674,7 @@
         <p:spPr>
           <a:xfrm>
             <a:off x="838080" y="365040"/>
-            <a:ext cx="10511280" cy="1321200"/>
+            <a:ext cx="10508760" cy="1318680"/>
           </a:xfrm>
           <a:prstGeom prst="rect">
             <a:avLst/>
@@ -5269,7 +5700,7 @@
         <p:spPr>
           <a:xfrm>
             <a:off x="838080" y="1825560"/>
-            <a:ext cx="10511280" cy="4347000"/>
+            <a:ext cx="10508760" cy="4344480"/>
           </a:xfrm>
           <a:prstGeom prst="rect">
             <a:avLst/>
@@ -5288,7 +5719,7 @@
         <p:txBody>
           <a:bodyPr lIns="90000" rIns="90000" tIns="45000" bIns="45000"/>
           <a:p>
-            <a:pPr marL="228600" indent="-224280">
+            <a:pPr marL="228600" indent="-221760">
               <a:lnSpc>
                 <a:spcPct val="90000"/>
               </a:lnSpc>
@@ -5326,7 +5757,7 @@
             </a:endParaRPr>
           </a:p>
           <a:p>
-            <a:pPr marL="228600" indent="-224280">
+            <a:pPr marL="228600" indent="-221760">
               <a:lnSpc>
                 <a:spcPct val="90000"/>
               </a:lnSpc>
@@ -5423,7 +5854,7 @@
         <p:spPr>
           <a:xfrm>
             <a:off x="838080" y="365040"/>
-            <a:ext cx="10511280" cy="1321200"/>
+            <a:ext cx="10508760" cy="1318680"/>
           </a:xfrm>
           <a:prstGeom prst="rect">
             <a:avLst/>
@@ -5460,7 +5891,7 @@
                 <a:latin typeface="Calibri Light"/>
                 <a:ea typeface="DejaVu Sans"/>
               </a:rPr>
-              <a:t>End</a:t>
+              <a:t>Delimiter and Backspace</a:t>
             </a:r>
             <a:endParaRPr b="0" lang="en-US" sz="4400" spc="-1" strike="noStrike">
               <a:solidFill>
@@ -5484,8 +5915,8 @@
         </p:nvSpPr>
         <p:spPr>
           <a:xfrm>
-            <a:off x="838080" y="1825560"/>
-            <a:ext cx="10511280" cy="4347000"/>
+            <a:off x="1287000" y="1690560"/>
+            <a:ext cx="10508760" cy="4344480"/>
           </a:xfrm>
           <a:prstGeom prst="rect">
             <a:avLst/>
@@ -5504,16 +5935,6 @@
         <p:txBody>
           <a:bodyPr lIns="90000" rIns="90000" tIns="45000" bIns="45000"/>
           <a:p>
-            <a:pPr marL="228600" indent="-224280">
-              <a:lnSpc>
-                <a:spcPct val="90000"/>
-              </a:lnSpc>
-              <a:buClr>
-                <a:srgbClr val="000000"/>
-              </a:buClr>
-              <a:buFont typeface="Arial"/>
-              <a:buChar char="•"/>
-            </a:pPr>
             <a:r>
               <a:rPr b="0" lang="en-US" sz="2800" spc="-1" strike="noStrike">
                 <a:solidFill>
@@ -5527,7 +5948,50 @@
                 <a:latin typeface="Calibri"/>
                 <a:ea typeface="DejaVu Sans"/>
               </a:rPr>
-              <a:t>End slide test text 01/01/2011</a:t>
+              <a:t>"a[; ]b"</a:t>
+            </a:r>
+            <a:endParaRPr b="0" lang="en-US" sz="2800" spc="-1" strike="noStrike">
+              <a:solidFill>
+                <a:srgbClr val="000000"/>
+              </a:solidFill>
+              <a:uFill>
+                <a:solidFill>
+                  <a:srgbClr val="ffffff"/>
+                </a:solidFill>
+              </a:uFill>
+              <a:latin typeface="Arial"/>
+            </a:endParaRPr>
+          </a:p>
+          <a:p>
+            <a:r>
+              <a:rPr b="0" lang="en-US" sz="2800" spc="-1" strike="noStrike">
+                <a:solidFill>
+                  <a:srgbClr val="000000"/>
+                </a:solidFill>
+                <a:uFill>
+                  <a:solidFill>
+                    <a:srgbClr val="ffffff"/>
+                  </a:solidFill>
+                </a:uFill>
+                <a:latin typeface="Calibri"/>
+                <a:ea typeface="DejaVu Sans"/>
+              </a:rPr>
+              <a:t>“</a:t>
+            </a:r>
+            <a:r>
+              <a:rPr b="0" lang="en-US" sz="2800" spc="-1" strike="noStrike">
+                <a:solidFill>
+                  <a:srgbClr val="000000"/>
+                </a:solidFill>
+                <a:uFill>
+                  <a:solidFill>
+                    <a:srgbClr val="ffffff"/>
+                  </a:solidFill>
+                </a:uFill>
+                <a:latin typeface="Calibri"/>
+                <a:ea typeface="DejaVu Sans"/>
+              </a:rPr>
+              <a:t>a \\ a\ b\\c</a:t>
             </a:r>
             <a:endParaRPr b="0" lang="en-US" sz="2800" spc="-1" strike="noStrike">
               <a:solidFill>

</xml_diff>